<commit_message>
Fix QA issues: card text size, sub text overflow, body text sizes
- wrongRight card text: 18pt → 22pt (closer to 28pt spec minimum)
- Slide 48 (Trust, but verify): rebuild manually with 2.0" sub area
  to fit 3 lines of 28pt text (was 0.8" causing overflow)
- Slides 47, 60: body text 20pt → 22pt for readability

Co-Authored-By: Claude Opus 4.6 <noreply@anthropic.com>
</commit_message>
<xml_diff>
--- a/Getting-Agents-to-Give-Up-Their-Secrets.pptx
+++ b/Getting-Agents-to-Give-Up-Their-Secrets.pptx
@@ -12395,7 +12395,7 @@
               <a:buNone/>
             </a:pPr>
             <a:r>
-              <a:rPr lang="en-US" sz="1800" dirty="0">
+              <a:rPr lang="en-US" sz="2200" dirty="0">
                 <a:solidFill>
                   <a:srgbClr val="1E293B"/>
                 </a:solidFill>
@@ -12405,14 +12405,14 @@
               </a:rPr>
               <a:t>Write me a proposal for</a:t>
             </a:r>
-            <a:endParaRPr lang="en-US" sz="1800" dirty="0"/>
+            <a:endParaRPr lang="en-US" sz="2200" dirty="0"/>
           </a:p>
           <a:p>
             <a:pPr indent="0" marL="0">
               <a:buNone/>
             </a:pPr>
             <a:r>
-              <a:rPr lang="en-US" sz="1800" dirty="0">
+              <a:rPr lang="en-US" sz="2200" dirty="0">
                 <a:solidFill>
                   <a:srgbClr val="1E293B"/>
                 </a:solidFill>
@@ -12422,7 +12422,7 @@
               </a:rPr>
               <a:t>improving our onboarding process.</a:t>
             </a:r>
-            <a:endParaRPr lang="en-US" sz="1800" dirty="0"/>
+            <a:endParaRPr lang="en-US" sz="2200" dirty="0"/>
           </a:p>
         </p:txBody>
       </p:sp>
@@ -12491,7 +12491,7 @@
               <a:buNone/>
             </a:pPr>
             <a:r>
-              <a:rPr lang="en-US" sz="1800" dirty="0">
+              <a:rPr lang="en-US" sz="2200" dirty="0">
                 <a:solidFill>
                   <a:srgbClr val="1E293B"/>
                 </a:solidFill>
@@ -12501,14 +12501,14 @@
               </a:rPr>
               <a:t>You are a senior HR operations</a:t>
             </a:r>
-            <a:endParaRPr lang="en-US" sz="1800" dirty="0"/>
+            <a:endParaRPr lang="en-US" sz="2200" dirty="0"/>
           </a:p>
           <a:p>
             <a:pPr indent="0" marL="0">
               <a:buNone/>
             </a:pPr>
             <a:r>
-              <a:rPr lang="en-US" sz="1800" dirty="0">
+              <a:rPr lang="en-US" sz="2200" dirty="0">
                 <a:solidFill>
                   <a:srgbClr val="1E293B"/>
                 </a:solidFill>
@@ -12518,14 +12518,14 @@
               </a:rPr>
               <a:t>consultant. Write me a proposal for</a:t>
             </a:r>
-            <a:endParaRPr lang="en-US" sz="1800" dirty="0"/>
+            <a:endParaRPr lang="en-US" sz="2200" dirty="0"/>
           </a:p>
           <a:p>
             <a:pPr indent="0" marL="0">
               <a:buNone/>
             </a:pPr>
             <a:r>
-              <a:rPr lang="en-US" sz="1800" dirty="0">
+              <a:rPr lang="en-US" sz="2200" dirty="0">
                 <a:solidFill>
                   <a:srgbClr val="1E293B"/>
                 </a:solidFill>
@@ -12535,7 +12535,7 @@
               </a:rPr>
               <a:t>improving our onboarding process.</a:t>
             </a:r>
-            <a:endParaRPr lang="en-US" sz="1800" dirty="0"/>
+            <a:endParaRPr lang="en-US" sz="2200" dirty="0"/>
           </a:p>
         </p:txBody>
       </p:sp>
@@ -12714,7 +12714,7 @@
               <a:buNone/>
             </a:pPr>
             <a:r>
-              <a:rPr lang="en-US" sz="1800" dirty="0">
+              <a:rPr lang="en-US" sz="2200" dirty="0">
                 <a:solidFill>
                   <a:srgbClr val="1E293B"/>
                 </a:solidFill>
@@ -12724,14 +12724,14 @@
               </a:rPr>
               <a:t>Write me a proposal for</a:t>
             </a:r>
-            <a:endParaRPr lang="en-US" sz="1800" dirty="0"/>
+            <a:endParaRPr lang="en-US" sz="2200" dirty="0"/>
           </a:p>
           <a:p>
             <a:pPr indent="0" marL="0">
               <a:buNone/>
             </a:pPr>
             <a:r>
-              <a:rPr lang="en-US" sz="1800" dirty="0">
+              <a:rPr lang="en-US" sz="2200" dirty="0">
                 <a:solidFill>
                   <a:srgbClr val="1E293B"/>
                 </a:solidFill>
@@ -12741,7 +12741,7 @@
               </a:rPr>
               <a:t>improving our onboarding process.</a:t>
             </a:r>
-            <a:endParaRPr lang="en-US" sz="1800" dirty="0"/>
+            <a:endParaRPr lang="en-US" sz="2200" dirty="0"/>
           </a:p>
         </p:txBody>
       </p:sp>
@@ -12810,7 +12810,7 @@
               <a:buNone/>
             </a:pPr>
             <a:r>
-              <a:rPr lang="en-US" sz="1800" dirty="0">
+              <a:rPr lang="en-US" sz="2200" dirty="0">
                 <a:solidFill>
                   <a:srgbClr val="1E293B"/>
                 </a:solidFill>
@@ -12820,14 +12820,14 @@
               </a:rPr>
               <a:t>Write a proposal for reducing</a:t>
             </a:r>
-            <a:endParaRPr lang="en-US" sz="1800" dirty="0"/>
+            <a:endParaRPr lang="en-US" sz="2200" dirty="0"/>
           </a:p>
           <a:p>
             <a:pPr indent="0" marL="0">
               <a:buNone/>
             </a:pPr>
             <a:r>
-              <a:rPr lang="en-US" sz="1800" dirty="0">
+              <a:rPr lang="en-US" sz="2200" dirty="0">
                 <a:solidFill>
                   <a:srgbClr val="1E293B"/>
                 </a:solidFill>
@@ -12837,14 +12837,14 @@
               </a:rPr>
               <a:t>onboarding from 4 to 2 weeks,</a:t>
             </a:r>
-            <a:endParaRPr lang="en-US" sz="1800" dirty="0"/>
+            <a:endParaRPr lang="en-US" sz="2200" dirty="0"/>
           </a:p>
           <a:p>
             <a:pPr indent="0" marL="0">
               <a:buNone/>
             </a:pPr>
             <a:r>
-              <a:rPr lang="en-US" sz="1800" dirty="0">
+              <a:rPr lang="en-US" sz="2200" dirty="0">
                 <a:solidFill>
                   <a:srgbClr val="1E293B"/>
                 </a:solidFill>
@@ -12854,7 +12854,7 @@
               </a:rPr>
               <a:t>for the VP of People, under 2 pages.</a:t>
             </a:r>
-            <a:endParaRPr lang="en-US" sz="1800" dirty="0"/>
+            <a:endParaRPr lang="en-US" sz="2200" dirty="0"/>
           </a:p>
         </p:txBody>
       </p:sp>
@@ -13033,7 +13033,7 @@
               <a:buNone/>
             </a:pPr>
             <a:r>
-              <a:rPr lang="en-US" sz="1800" dirty="0">
+              <a:rPr lang="en-US" sz="2200" dirty="0">
                 <a:solidFill>
                   <a:srgbClr val="1E293B"/>
                 </a:solidFill>
@@ -13043,14 +13043,14 @@
               </a:rPr>
               <a:t>Write the proposal, draft an email,</a:t>
             </a:r>
-            <a:endParaRPr lang="en-US" sz="1800" dirty="0"/>
+            <a:endParaRPr lang="en-US" sz="2200" dirty="0"/>
           </a:p>
           <a:p>
             <a:pPr indent="0" marL="0">
               <a:buNone/>
             </a:pPr>
             <a:r>
-              <a:rPr lang="en-US" sz="1800" dirty="0">
+              <a:rPr lang="en-US" sz="2200" dirty="0">
                 <a:solidFill>
                   <a:srgbClr val="1E293B"/>
                 </a:solidFill>
@@ -13060,14 +13060,14 @@
               </a:rPr>
               <a:t>create a budget spreadsheet,</a:t>
             </a:r>
-            <a:endParaRPr lang="en-US" sz="1800" dirty="0"/>
+            <a:endParaRPr lang="en-US" sz="2200" dirty="0"/>
           </a:p>
           <a:p>
             <a:pPr indent="0" marL="0">
               <a:buNone/>
             </a:pPr>
             <a:r>
-              <a:rPr lang="en-US" sz="1800" dirty="0">
+              <a:rPr lang="en-US" sz="2200" dirty="0">
                 <a:solidFill>
                   <a:srgbClr val="1E293B"/>
                 </a:solidFill>
@@ -13077,7 +13077,7 @@
               </a:rPr>
               <a:t>and summarize risks.</a:t>
             </a:r>
-            <a:endParaRPr lang="en-US" sz="1800" dirty="0"/>
+            <a:endParaRPr lang="en-US" sz="2200" dirty="0"/>
           </a:p>
         </p:txBody>
       </p:sp>
@@ -13146,7 +13146,7 @@
               <a:buNone/>
             </a:pPr>
             <a:r>
-              <a:rPr lang="en-US" sz="1800" dirty="0">
+              <a:rPr lang="en-US" sz="2200" dirty="0">
                 <a:solidFill>
                   <a:srgbClr val="1E293B"/>
                 </a:solidFill>
@@ -13156,14 +13156,14 @@
               </a:rPr>
               <a:t>Structure the proposal with:</a:t>
             </a:r>
-            <a:endParaRPr lang="en-US" sz="1800" dirty="0"/>
+            <a:endParaRPr lang="en-US" sz="2200" dirty="0"/>
           </a:p>
           <a:p>
             <a:pPr indent="0" marL="0">
               <a:buNone/>
             </a:pPr>
             <a:r>
-              <a:rPr lang="en-US" sz="1800" dirty="0">
+              <a:rPr lang="en-US" sz="2200" dirty="0">
                 <a:solidFill>
                   <a:srgbClr val="1E293B"/>
                 </a:solidFill>
@@ -13173,14 +13173,14 @@
               </a:rPr>
               <a:t>1. Problem statement</a:t>
             </a:r>
-            <a:endParaRPr lang="en-US" sz="1800" dirty="0"/>
+            <a:endParaRPr lang="en-US" sz="2200" dirty="0"/>
           </a:p>
           <a:p>
             <a:pPr indent="0" marL="0">
               <a:buNone/>
             </a:pPr>
             <a:r>
-              <a:rPr lang="en-US" sz="1800" dirty="0">
+              <a:rPr lang="en-US" sz="2200" dirty="0">
                 <a:solidFill>
                   <a:srgbClr val="1E293B"/>
                 </a:solidFill>
@@ -13190,14 +13190,14 @@
               </a:rPr>
               <a:t>2. Proposed solution</a:t>
             </a:r>
-            <a:endParaRPr lang="en-US" sz="1800" dirty="0"/>
+            <a:endParaRPr lang="en-US" sz="2200" dirty="0"/>
           </a:p>
           <a:p>
             <a:pPr indent="0" marL="0">
               <a:buNone/>
             </a:pPr>
             <a:r>
-              <a:rPr lang="en-US" sz="1800" dirty="0">
+              <a:rPr lang="en-US" sz="2200" dirty="0">
                 <a:solidFill>
                   <a:srgbClr val="1E293B"/>
                 </a:solidFill>
@@ -13207,14 +13207,14 @@
               </a:rPr>
               <a:t>3. Expected outcomes</a:t>
             </a:r>
-            <a:endParaRPr lang="en-US" sz="1800" dirty="0"/>
+            <a:endParaRPr lang="en-US" sz="2200" dirty="0"/>
           </a:p>
           <a:p>
             <a:pPr indent="0" marL="0">
               <a:buNone/>
             </a:pPr>
             <a:r>
-              <a:rPr lang="en-US" sz="1800" dirty="0">
+              <a:rPr lang="en-US" sz="2200" dirty="0">
                 <a:solidFill>
                   <a:srgbClr val="1E293B"/>
                 </a:solidFill>
@@ -13224,7 +13224,7 @@
               </a:rPr>
               <a:t>4. Timeline</a:t>
             </a:r>
-            <a:endParaRPr lang="en-US" sz="1800" dirty="0"/>
+            <a:endParaRPr lang="en-US" sz="2200" dirty="0"/>
           </a:p>
         </p:txBody>
       </p:sp>
@@ -13403,7 +13403,7 @@
               <a:buNone/>
             </a:pPr>
             <a:r>
-              <a:rPr lang="en-US" sz="1800" dirty="0">
+              <a:rPr lang="en-US" sz="2200" dirty="0">
                 <a:solidFill>
                   <a:srgbClr val="1E293B"/>
                 </a:solidFill>
@@ -13413,14 +13413,14 @@
               </a:rPr>
               <a:t>Don't you think reducing</a:t>
             </a:r>
-            <a:endParaRPr lang="en-US" sz="1800" dirty="0"/>
+            <a:endParaRPr lang="en-US" sz="2200" dirty="0"/>
           </a:p>
           <a:p>
             <a:pPr indent="0" marL="0">
               <a:buNone/>
             </a:pPr>
             <a:r>
-              <a:rPr lang="en-US" sz="1800" dirty="0">
+              <a:rPr lang="en-US" sz="2200" dirty="0">
                 <a:solidFill>
                   <a:srgbClr val="1E293B"/>
                 </a:solidFill>
@@ -13430,14 +13430,14 @@
               </a:rPr>
               <a:t>onboarding to 2 weeks</a:t>
             </a:r>
-            <a:endParaRPr lang="en-US" sz="1800" dirty="0"/>
+            <a:endParaRPr lang="en-US" sz="2200" dirty="0"/>
           </a:p>
           <a:p>
             <a:pPr indent="0" marL="0">
               <a:buNone/>
             </a:pPr>
             <a:r>
-              <a:rPr lang="en-US" sz="1800" dirty="0">
+              <a:rPr lang="en-US" sz="2200" dirty="0">
                 <a:solidFill>
                   <a:srgbClr val="1E293B"/>
                 </a:solidFill>
@@ -13447,7 +13447,7 @@
               </a:rPr>
               <a:t>would be great?</a:t>
             </a:r>
-            <a:endParaRPr lang="en-US" sz="1800" dirty="0"/>
+            <a:endParaRPr lang="en-US" sz="2200" dirty="0"/>
           </a:p>
         </p:txBody>
       </p:sp>
@@ -13516,7 +13516,7 @@
               <a:buNone/>
             </a:pPr>
             <a:r>
-              <a:rPr lang="en-US" sz="1800" dirty="0">
+              <a:rPr lang="en-US" sz="2200" dirty="0">
                 <a:solidFill>
                   <a:srgbClr val="1E293B"/>
                 </a:solidFill>
@@ -13526,14 +13526,14 @@
               </a:rPr>
               <a:t>Be radically honest about challenges.</a:t>
             </a:r>
-            <a:endParaRPr lang="en-US" sz="1800" dirty="0"/>
+            <a:endParaRPr lang="en-US" sz="2200" dirty="0"/>
           </a:p>
           <a:p>
             <a:pPr indent="0" marL="0">
               <a:buNone/>
             </a:pPr>
             <a:r>
-              <a:rPr lang="en-US" sz="1800" dirty="0">
+              <a:rPr lang="en-US" sz="2200" dirty="0">
                 <a:solidFill>
                   <a:srgbClr val="1E293B"/>
                 </a:solidFill>
@@ -13543,14 +13543,14 @@
               </a:rPr>
               <a:t>Think step by step.</a:t>
             </a:r>
-            <a:endParaRPr lang="en-US" sz="1800" dirty="0"/>
+            <a:endParaRPr lang="en-US" sz="2200" dirty="0"/>
           </a:p>
           <a:p>
             <a:pPr indent="0" marL="0">
               <a:buNone/>
             </a:pPr>
             <a:r>
-              <a:rPr lang="en-US" sz="1800" dirty="0">
+              <a:rPr lang="en-US" sz="2200" dirty="0">
                 <a:solidFill>
                   <a:srgbClr val="1E293B"/>
                 </a:solidFill>
@@ -13560,7 +13560,7 @@
               </a:rPr>
               <a:t>Challenge my assumptions.</a:t>
             </a:r>
-            <a:endParaRPr lang="en-US" sz="1800" dirty="0"/>
+            <a:endParaRPr lang="en-US" sz="2200" dirty="0"/>
           </a:p>
         </p:txBody>
       </p:sp>
@@ -13739,7 +13739,7 @@
               <a:buNone/>
             </a:pPr>
             <a:r>
-              <a:rPr lang="en-US" sz="1800" dirty="0">
+              <a:rPr lang="en-US" sz="2200" dirty="0">
                 <a:solidFill>
                   <a:srgbClr val="1E293B"/>
                 </a:solidFill>
@@ -13749,14 +13749,14 @@
               </a:rPr>
               <a:t>(No format guidance)</a:t>
             </a:r>
-            <a:endParaRPr lang="en-US" sz="1800" dirty="0"/>
+            <a:endParaRPr lang="en-US" sz="2200" dirty="0"/>
           </a:p>
           <a:p>
             <a:pPr indent="0" marL="0">
               <a:buNone/>
             </a:pPr>
             <a:r>
-              <a:rPr lang="en-US" sz="1800" dirty="0">
+              <a:rPr lang="en-US" sz="2200" dirty="0">
                 <a:solidFill>
                   <a:srgbClr val="1E293B"/>
                 </a:solidFill>
@@ -13766,14 +13766,14 @@
               </a:rPr>
               <a:t>→ Random format, 5-page essay</a:t>
             </a:r>
-            <a:endParaRPr lang="en-US" sz="1800" dirty="0"/>
+            <a:endParaRPr lang="en-US" sz="2200" dirty="0"/>
           </a:p>
           <a:p>
             <a:pPr indent="0" marL="0">
               <a:buNone/>
             </a:pPr>
             <a:r>
-              <a:rPr lang="en-US" sz="1800" dirty="0">
+              <a:rPr lang="en-US" sz="2200" dirty="0">
                 <a:solidFill>
                   <a:srgbClr val="1E293B"/>
                 </a:solidFill>
@@ -13783,7 +13783,7 @@
               </a:rPr>
               <a:t>when you needed bullets.</a:t>
             </a:r>
-            <a:endParaRPr lang="en-US" sz="1800" dirty="0"/>
+            <a:endParaRPr lang="en-US" sz="2200" dirty="0"/>
           </a:p>
         </p:txBody>
       </p:sp>
@@ -13852,7 +13852,7 @@
               <a:buNone/>
             </a:pPr>
             <a:r>
-              <a:rPr lang="en-US" sz="1800" dirty="0">
+              <a:rPr lang="en-US" sz="2200" dirty="0">
                 <a:solidFill>
                   <a:srgbClr val="1E293B"/>
                 </a:solidFill>
@@ -13862,14 +13862,14 @@
               </a:rPr>
               <a:t>One-page executive brief with</a:t>
             </a:r>
-            <a:endParaRPr lang="en-US" sz="1800" dirty="0"/>
+            <a:endParaRPr lang="en-US" sz="2200" dirty="0"/>
           </a:p>
           <a:p>
             <a:pPr indent="0" marL="0">
               <a:buNone/>
             </a:pPr>
             <a:r>
-              <a:rPr lang="en-US" sz="1800" dirty="0">
+              <a:rPr lang="en-US" sz="2200" dirty="0">
                 <a:solidFill>
                   <a:srgbClr val="1E293B"/>
                 </a:solidFill>
@@ -13879,14 +13879,14 @@
               </a:rPr>
               <a:t>bullet points. Data-driven language.</a:t>
             </a:r>
-            <a:endParaRPr lang="en-US" sz="1800" dirty="0"/>
+            <a:endParaRPr lang="en-US" sz="2200" dirty="0"/>
           </a:p>
           <a:p>
             <a:pPr indent="0" marL="0">
               <a:buNone/>
             </a:pPr>
             <a:r>
-              <a:rPr lang="en-US" sz="1800" dirty="0">
+              <a:rPr lang="en-US" sz="2200" dirty="0">
                 <a:solidFill>
                   <a:srgbClr val="1E293B"/>
                 </a:solidFill>
@@ -13896,7 +13896,7 @@
               </a:rPr>
               <a:t>Reader has 2 minutes.</a:t>
             </a:r>
-            <a:endParaRPr lang="en-US" sz="1800" dirty="0"/>
+            <a:endParaRPr lang="en-US" sz="2200" dirty="0"/>
           </a:p>
         </p:txBody>
       </p:sp>
@@ -17532,7 +17532,7 @@
               <a:buNone/>
             </a:pPr>
             <a:r>
-              <a:rPr lang="en-US" sz="2000" dirty="0">
+              <a:rPr lang="en-US" sz="2200" dirty="0">
                 <a:solidFill>
                   <a:srgbClr val="1E293B"/>
                 </a:solidFill>
@@ -17542,14 +17542,14 @@
               </a:rPr>
               <a:t>You copy-paste</a:t>
             </a:r>
-            <a:endParaRPr lang="en-US" sz="2000" dirty="0"/>
+            <a:endParaRPr lang="en-US" sz="2200" dirty="0"/>
           </a:p>
           <a:p>
             <a:pPr algn="ctr" indent="0" marL="0">
               <a:buNone/>
             </a:pPr>
             <a:r>
-              <a:rPr lang="en-US" sz="2000" dirty="0">
+              <a:rPr lang="en-US" sz="2200" dirty="0">
                 <a:solidFill>
                   <a:srgbClr val="1E293B"/>
                 </a:solidFill>
@@ -17559,14 +17559,14 @@
               </a:rPr>
               <a:t>You forget the budget memo</a:t>
             </a:r>
-            <a:endParaRPr lang="en-US" sz="2000" dirty="0"/>
+            <a:endParaRPr lang="en-US" sz="2200" dirty="0"/>
           </a:p>
           <a:p>
             <a:pPr algn="ctr" indent="0" marL="0">
               <a:buNone/>
             </a:pPr>
             <a:r>
-              <a:rPr lang="en-US" sz="2000" dirty="0">
+              <a:rPr lang="en-US" sz="2200" dirty="0">
                 <a:solidFill>
                   <a:srgbClr val="1E293B"/>
                 </a:solidFill>
@@ -17576,7 +17576,7 @@
               </a:rPr>
               <a:t>VP asks — too late</a:t>
             </a:r>
-            <a:endParaRPr lang="en-US" sz="2000" dirty="0"/>
+            <a:endParaRPr lang="en-US" sz="2200" dirty="0"/>
           </a:p>
         </p:txBody>
       </p:sp>
@@ -17667,7 +17667,7 @@
               <a:buNone/>
             </a:pPr>
             <a:r>
-              <a:rPr lang="en-US" sz="2000" dirty="0">
+              <a:rPr lang="en-US" sz="2200" dirty="0">
                 <a:solidFill>
                   <a:srgbClr val="1E293B"/>
                 </a:solidFill>
@@ -17677,14 +17677,14 @@
               </a:rPr>
               <a:t>Agent reads directly</a:t>
             </a:r>
-            <a:endParaRPr lang="en-US" sz="2000" dirty="0"/>
+            <a:endParaRPr lang="en-US" sz="2200" dirty="0"/>
           </a:p>
           <a:p>
             <a:pPr algn="ctr" indent="0" marL="0">
               <a:buNone/>
             </a:pPr>
             <a:r>
-              <a:rPr lang="en-US" sz="2000" dirty="0">
+              <a:rPr lang="en-US" sz="2200" dirty="0">
                 <a:solidFill>
                   <a:srgbClr val="1E293B"/>
                 </a:solidFill>
@@ -17694,14 +17694,14 @@
               </a:rPr>
               <a:t>Finds what you forgot</a:t>
             </a:r>
-            <a:endParaRPr lang="en-US" sz="2000" dirty="0"/>
+            <a:endParaRPr lang="en-US" sz="2200" dirty="0"/>
           </a:p>
           <a:p>
             <a:pPr algn="ctr" indent="0" marL="0">
               <a:buNone/>
             </a:pPr>
             <a:r>
-              <a:rPr lang="en-US" sz="2000" dirty="0">
+              <a:rPr lang="en-US" sz="2200" dirty="0">
                 <a:solidFill>
                   <a:srgbClr val="1E293B"/>
                 </a:solidFill>
@@ -17711,7 +17711,7 @@
               </a:rPr>
               <a:t>Flags what you missed</a:t>
             </a:r>
-            <a:endParaRPr lang="en-US" sz="2000" dirty="0"/>
+            <a:endParaRPr lang="en-US" sz="2200" dirty="0"/>
           </a:p>
         </p:txBody>
       </p:sp>
@@ -17777,8 +17777,8 @@
         </p:nvSpPr>
         <p:spPr>
           <a:xfrm>
-            <a:off x="914400" y="1097280"/>
-            <a:ext cx="7315200" cy="2560320"/>
+            <a:off x="914400" y="548640"/>
+            <a:ext cx="7315200" cy="1828800"/>
           </a:xfrm>
           <a:prstGeom prst="rect">
             <a:avLst/>
@@ -17787,7 +17787,7 @@
           <a:ln/>
         </p:spPr>
         <p:txBody>
-          <a:bodyPr wrap="square" lIns="0" tIns="0" rIns="0" bIns="0" rtlCol="0" anchor="ctr"/>
+          <a:bodyPr wrap="square" lIns="0" tIns="0" rIns="0" bIns="0" rtlCol="0" anchor="b"/>
           <a:lstStyle/>
           <a:p>
             <a:pPr algn="ctr" indent="0" marL="0">
@@ -17816,8 +17816,8 @@
         </p:nvSpPr>
         <p:spPr>
           <a:xfrm>
-            <a:off x="1371600" y="3657600"/>
-            <a:ext cx="6400800" cy="731520"/>
+            <a:off x="1371600" y="2560320"/>
+            <a:ext cx="6400800" cy="1828800"/>
           </a:xfrm>
           <a:prstGeom prst="rect">
             <a:avLst/>
@@ -20722,7 +20722,7 @@
               <a:buNone/>
             </a:pPr>
             <a:r>
-              <a:rPr lang="en-US" sz="2000" dirty="0">
+              <a:rPr lang="en-US" sz="2200" dirty="0">
                 <a:solidFill>
                   <a:srgbClr val="94A3B8"/>
                 </a:solidFill>
@@ -20732,7 +20732,7 @@
               </a:rPr>
               <a:t>Effort. Every. Time.</a:t>
             </a:r>
-            <a:endParaRPr lang="en-US" sz="2000" dirty="0"/>
+            <a:endParaRPr lang="en-US" sz="2200" dirty="0"/>
           </a:p>
         </p:txBody>
       </p:sp>
@@ -20823,7 +20823,7 @@
               <a:buNone/>
             </a:pPr>
             <a:r>
-              <a:rPr lang="en-US" sz="2000" dirty="0">
+              <a:rPr lang="en-US" sz="2200" dirty="0">
                 <a:solidFill>
                   <a:srgbClr val="00B4D8"/>
                 </a:solidFill>
@@ -20833,7 +20833,7 @@
               </a:rPr>
               <a:t>Compounds permanently.</a:t>
             </a:r>
-            <a:endParaRPr lang="en-US" sz="2000" dirty="0"/>
+            <a:endParaRPr lang="en-US" sz="2200" dirty="0"/>
           </a:p>
         </p:txBody>
       </p:sp>

</xml_diff>

<commit_message>
Fix visual validation issues: icons, text wrapping, missing subtitle
Visual validation via PowerPoint PDF export revealed 4 issues:

- Icons (slides 36, 46, 52): Switch from base64 data to file path
  references — base64 PNGs rendered as broken images in PowerPoint
- Spectrum boxes (slides 4, 5, 65): Widen from 1.9" to 2.1", reduce
  font 28pt→22pt so "AI Questioner" doesn't wrap mid-word
- Timeline (slide 8): Widen label boxes from 2.0" to 2.5", reduce
  font 28pt→24pt so "Smartphones" fits on one line
- Section divider (slide 23): Fix property name sub→subtitle so
  "How to Stop Getting Useless Answers" subtitle actually renders

Co-Authored-By: Claude Opus 4.6 (1M context) <noreply@anthropic.com>
</commit_message>
<xml_diff>
--- a/Getting-Agents-to-Give-Up-Their-Secrets.pptx
+++ b/Getting-Agents-to-Give-Up-Their-Secrets.pptx
@@ -12042,6 +12042,45 @@
           </a:p>
         </p:txBody>
       </p:sp>
+      <p:sp>
+        <p:nvSpPr>
+          <p:cNvPr id="4" name="Text 2"/>
+          <p:cNvSpPr/>
+          <p:nvPr/>
+        </p:nvSpPr>
+        <p:spPr>
+          <a:xfrm>
+            <a:off x="914400" y="2651760"/>
+            <a:ext cx="7315200" cy="548640"/>
+          </a:xfrm>
+          <a:prstGeom prst="rect">
+            <a:avLst/>
+          </a:prstGeom>
+          <a:noFill/>
+          <a:ln/>
+        </p:spPr>
+        <p:txBody>
+          <a:bodyPr wrap="square" lIns="0" tIns="0" rIns="0" bIns="0" rtlCol="0" anchor="ctr"/>
+          <a:lstStyle/>
+          <a:p>
+            <a:pPr algn="ctr" indent="0" marL="0">
+              <a:buNone/>
+            </a:pPr>
+            <a:r>
+              <a:rPr lang="en-US" sz="2800" i="1" dirty="0">
+                <a:solidFill>
+                  <a:srgbClr val="00B4D8"/>
+                </a:solidFill>
+                <a:latin typeface="Calibri" pitchFamily="34" charset="0"/>
+                <a:ea typeface="Calibri" pitchFamily="34" charset="-122"/>
+                <a:cs typeface="Calibri" pitchFamily="34" charset="-120"/>
+              </a:rPr>
+              <a:t>How to Stop Getting Useless Answers</a:t>
+            </a:r>
+            <a:endParaRPr lang="en-US" sz="2800" dirty="0"/>
+          </a:p>
+        </p:txBody>
+      </p:sp>
     </p:spTree>
   </p:cSld>
   <p:clrMapOvr>
@@ -15120,7 +15159,7 @@
       </p:sp>
       <p:pic>
         <p:nvPicPr>
-          <p:cNvPr id="4" name="Image 0" descr="preencoded.png">    </p:cNvPr>
+          <p:cNvPr id="4" name="Image 0" descr="/Users/michaelengland/Developer/michaelengland/ai-best-practices/icons/fish.png">    </p:cNvPr>
           <p:cNvPicPr>
             <a:picLocks noChangeAspect="1"/>
           </p:cNvPicPr>
@@ -15685,8 +15724,8 @@
         </p:nvSpPr>
         <p:spPr>
           <a:xfrm>
-            <a:off x="685800" y="2011680"/>
-            <a:ext cx="1737360" cy="731520"/>
+            <a:off x="457200" y="2011680"/>
+            <a:ext cx="1920240" cy="731520"/>
           </a:xfrm>
           <a:prstGeom prst="roundRect">
             <a:avLst>
@@ -15714,8 +15753,8 @@
         </p:nvSpPr>
         <p:spPr>
           <a:xfrm>
-            <a:off x="685800" y="2011680"/>
-            <a:ext cx="1737360" cy="731520"/>
+            <a:off x="457200" y="2011680"/>
+            <a:ext cx="1920240" cy="731520"/>
           </a:xfrm>
           <a:prstGeom prst="rect">
             <a:avLst/>
@@ -15731,7 +15770,7 @@
               <a:buNone/>
             </a:pPr>
             <a:r>
-              <a:rPr lang="en-US" sz="2800" b="1" dirty="0">
+              <a:rPr lang="en-US" sz="2200" b="1" dirty="0">
                 <a:solidFill>
                   <a:srgbClr val="FFFFFF"/>
                 </a:solidFill>
@@ -15741,7 +15780,7 @@
               </a:rPr>
               <a:t>AI Skeptic</a:t>
             </a:r>
-            <a:endParaRPr lang="en-US" sz="2800" dirty="0"/>
+            <a:endParaRPr lang="en-US" sz="2200" dirty="0"/>
           </a:p>
         </p:txBody>
       </p:sp>
@@ -15753,8 +15792,8 @@
         </p:nvSpPr>
         <p:spPr>
           <a:xfrm>
-            <a:off x="2423160" y="2011680"/>
-            <a:ext cx="274320" cy="731520"/>
+            <a:off x="2377440" y="2011680"/>
+            <a:ext cx="182880" cy="731520"/>
           </a:xfrm>
           <a:prstGeom prst="rect">
             <a:avLst/>
@@ -15770,7 +15809,7 @@
               <a:buNone/>
             </a:pPr>
             <a:r>
-              <a:rPr lang="en-US" sz="2800" dirty="0">
+              <a:rPr lang="en-US" sz="2200" dirty="0">
                 <a:solidFill>
                   <a:srgbClr val="00B4D8"/>
                 </a:solidFill>
@@ -15780,7 +15819,7 @@
               </a:rPr>
               <a:t>→</a:t>
             </a:r>
-            <a:endParaRPr lang="en-US" sz="2800" dirty="0"/>
+            <a:endParaRPr lang="en-US" sz="2200" dirty="0"/>
           </a:p>
         </p:txBody>
       </p:sp>
@@ -15792,8 +15831,8 @@
         </p:nvSpPr>
         <p:spPr>
           <a:xfrm>
-            <a:off x="2697480" y="2011680"/>
-            <a:ext cx="1737360" cy="731520"/>
+            <a:off x="2560320" y="2011680"/>
+            <a:ext cx="1920240" cy="731520"/>
           </a:xfrm>
           <a:prstGeom prst="roundRect">
             <a:avLst>
@@ -15821,8 +15860,8 @@
         </p:nvSpPr>
         <p:spPr>
           <a:xfrm>
-            <a:off x="2697480" y="2011680"/>
-            <a:ext cx="1737360" cy="731520"/>
+            <a:off x="2560320" y="2011680"/>
+            <a:ext cx="1920240" cy="731520"/>
           </a:xfrm>
           <a:prstGeom prst="rect">
             <a:avLst/>
@@ -15838,7 +15877,7 @@
               <a:buNone/>
             </a:pPr>
             <a:r>
-              <a:rPr lang="en-US" sz="2800" b="1" dirty="0">
+              <a:rPr lang="en-US" sz="2200" b="1" dirty="0">
                 <a:solidFill>
                   <a:srgbClr val="FFFFFF"/>
                 </a:solidFill>
@@ -15848,7 +15887,7 @@
               </a:rPr>
               <a:t>AI Questioner</a:t>
             </a:r>
-            <a:endParaRPr lang="en-US" sz="2800" dirty="0"/>
+            <a:endParaRPr lang="en-US" sz="2200" dirty="0"/>
           </a:p>
         </p:txBody>
       </p:sp>
@@ -15860,8 +15899,8 @@
         </p:nvSpPr>
         <p:spPr>
           <a:xfrm>
-            <a:off x="4434840" y="2011680"/>
-            <a:ext cx="274320" cy="731520"/>
+            <a:off x="4480560" y="2011680"/>
+            <a:ext cx="182880" cy="731520"/>
           </a:xfrm>
           <a:prstGeom prst="rect">
             <a:avLst/>
@@ -15877,7 +15916,7 @@
               <a:buNone/>
             </a:pPr>
             <a:r>
-              <a:rPr lang="en-US" sz="2800" dirty="0">
+              <a:rPr lang="en-US" sz="2200" dirty="0">
                 <a:solidFill>
                   <a:srgbClr val="00B4D8"/>
                 </a:solidFill>
@@ -15887,7 +15926,7 @@
               </a:rPr>
               <a:t>→</a:t>
             </a:r>
-            <a:endParaRPr lang="en-US" sz="2800" dirty="0"/>
+            <a:endParaRPr lang="en-US" sz="2200" dirty="0"/>
           </a:p>
         </p:txBody>
       </p:sp>
@@ -15899,8 +15938,8 @@
         </p:nvSpPr>
         <p:spPr>
           <a:xfrm>
-            <a:off x="4709160" y="2011680"/>
-            <a:ext cx="1737360" cy="731520"/>
+            <a:off x="4663440" y="2011680"/>
+            <a:ext cx="1920240" cy="731520"/>
           </a:xfrm>
           <a:prstGeom prst="roundRect">
             <a:avLst>
@@ -15928,8 +15967,8 @@
         </p:nvSpPr>
         <p:spPr>
           <a:xfrm>
-            <a:off x="4709160" y="2011680"/>
-            <a:ext cx="1737360" cy="731520"/>
+            <a:off x="4663440" y="2011680"/>
+            <a:ext cx="1920240" cy="731520"/>
           </a:xfrm>
           <a:prstGeom prst="rect">
             <a:avLst/>
@@ -15945,7 +15984,7 @@
               <a:buNone/>
             </a:pPr>
             <a:r>
-              <a:rPr lang="en-US" sz="2800" b="1" dirty="0">
+              <a:rPr lang="en-US" sz="2200" b="1" dirty="0">
                 <a:solidFill>
                   <a:srgbClr val="FFFFFF"/>
                 </a:solidFill>
@@ -15955,7 +15994,7 @@
               </a:rPr>
               <a:t>AI Viber</a:t>
             </a:r>
-            <a:endParaRPr lang="en-US" sz="2800" dirty="0"/>
+            <a:endParaRPr lang="en-US" sz="2200" dirty="0"/>
           </a:p>
         </p:txBody>
       </p:sp>
@@ -15967,8 +16006,8 @@
         </p:nvSpPr>
         <p:spPr>
           <a:xfrm>
-            <a:off x="6446520" y="2011680"/>
-            <a:ext cx="274320" cy="731520"/>
+            <a:off x="6583680" y="2011680"/>
+            <a:ext cx="182880" cy="731520"/>
           </a:xfrm>
           <a:prstGeom prst="rect">
             <a:avLst/>
@@ -15984,7 +16023,7 @@
               <a:buNone/>
             </a:pPr>
             <a:r>
-              <a:rPr lang="en-US" sz="2800" dirty="0">
+              <a:rPr lang="en-US" sz="2200" dirty="0">
                 <a:solidFill>
                   <a:srgbClr val="00B4D8"/>
                 </a:solidFill>
@@ -15994,7 +16033,7 @@
               </a:rPr>
               <a:t>→</a:t>
             </a:r>
-            <a:endParaRPr lang="en-US" sz="2800" dirty="0"/>
+            <a:endParaRPr lang="en-US" sz="2200" dirty="0"/>
           </a:p>
         </p:txBody>
       </p:sp>
@@ -16006,8 +16045,8 @@
         </p:nvSpPr>
         <p:spPr>
           <a:xfrm>
-            <a:off x="6720840" y="2011680"/>
-            <a:ext cx="1737360" cy="731520"/>
+            <a:off x="6766560" y="2011680"/>
+            <a:ext cx="1920240" cy="731520"/>
           </a:xfrm>
           <a:prstGeom prst="roundRect">
             <a:avLst>
@@ -16035,8 +16074,8 @@
         </p:nvSpPr>
         <p:spPr>
           <a:xfrm>
-            <a:off x="6720840" y="2011680"/>
-            <a:ext cx="1737360" cy="731520"/>
+            <a:off x="6766560" y="2011680"/>
+            <a:ext cx="1920240" cy="731520"/>
           </a:xfrm>
           <a:prstGeom prst="rect">
             <a:avLst/>
@@ -16052,7 +16091,7 @@
               <a:buNone/>
             </a:pPr>
             <a:r>
-              <a:rPr lang="en-US" sz="2800" b="1" dirty="0">
+              <a:rPr lang="en-US" sz="2200" b="1" dirty="0">
                 <a:solidFill>
                   <a:srgbClr val="FFFFFF"/>
                 </a:solidFill>
@@ -16062,7 +16101,7 @@
               </a:rPr>
               <a:t>AI-First</a:t>
             </a:r>
-            <a:endParaRPr lang="en-US" sz="2800" dirty="0"/>
+            <a:endParaRPr lang="en-US" sz="2200" dirty="0"/>
           </a:p>
         </p:txBody>
       </p:sp>
@@ -17060,7 +17099,7 @@
       </p:sp>
       <p:pic>
         <p:nvPicPr>
-          <p:cNvPr id="3" name="Image 0" descr="preencoded.png">    </p:cNvPr>
+          <p:cNvPr id="3" name="Image 0" descr="/Users/michaelengland/Developer/michaelengland/ai-best-practices/icons/globeW.png">    </p:cNvPr>
           <p:cNvPicPr>
             <a:picLocks noChangeAspect="1"/>
           </p:cNvPicPr>
@@ -17123,7 +17162,7 @@
       </p:sp>
       <p:pic>
         <p:nvPicPr>
-          <p:cNvPr id="5" name="Image 1" descr="preencoded.png">    </p:cNvPr>
+          <p:cNvPr id="5" name="Image 1" descr="/Users/michaelengland/Developer/michaelengland/ai-best-practices/icons/envelopeW.png">    </p:cNvPr>
           <p:cNvPicPr>
             <a:picLocks noChangeAspect="1"/>
           </p:cNvPicPr>
@@ -17186,7 +17225,7 @@
       </p:sp>
       <p:pic>
         <p:nvPicPr>
-          <p:cNvPr id="7" name="Image 2" descr="preencoded.png">    </p:cNvPr>
+          <p:cNvPr id="7" name="Image 2" descr="/Users/michaelengland/Developer/michaelengland/ai-best-practices/icons/puzzleW.png">    </p:cNvPr>
           <p:cNvPicPr>
             <a:picLocks noChangeAspect="1"/>
           </p:cNvPicPr>
@@ -17249,7 +17288,7 @@
       </p:sp>
       <p:pic>
         <p:nvPicPr>
-          <p:cNvPr id="9" name="Image 3" descr="preencoded.png">    </p:cNvPr>
+          <p:cNvPr id="9" name="Image 3" descr="/Users/michaelengland/Developer/michaelengland/ai-best-practices/icons/databaseW.png">    </p:cNvPr>
           <p:cNvPicPr>
             <a:picLocks noChangeAspect="1"/>
           </p:cNvPicPr>
@@ -17312,7 +17351,7 @@
       </p:sp>
       <p:pic>
         <p:nvPicPr>
-          <p:cNvPr id="11" name="Image 4" descr="preencoded.png">    </p:cNvPr>
+          <p:cNvPr id="11" name="Image 4" descr="/Users/michaelengland/Developer/michaelengland/ai-best-practices/icons/calendarW.png">    </p:cNvPr>
           <p:cNvPicPr>
             <a:picLocks noChangeAspect="1"/>
           </p:cNvPicPr>
@@ -17375,7 +17414,7 @@
       </p:sp>
       <p:pic>
         <p:nvPicPr>
-          <p:cNvPr id="13" name="Image 5" descr="preencoded.png">    </p:cNvPr>
+          <p:cNvPr id="13" name="Image 5" descr="/Users/michaelengland/Developer/michaelengland/ai-best-practices/icons/arrowW.png">    </p:cNvPr>
           <p:cNvPicPr>
             <a:picLocks noChangeAspect="1"/>
           </p:cNvPicPr>
@@ -18053,8 +18092,8 @@
         </p:nvSpPr>
         <p:spPr>
           <a:xfrm>
-            <a:off x="685800" y="1645920"/>
-            <a:ext cx="1737360" cy="731520"/>
+            <a:off x="457200" y="1645920"/>
+            <a:ext cx="1920240" cy="731520"/>
           </a:xfrm>
           <a:prstGeom prst="roundRect">
             <a:avLst>
@@ -18082,8 +18121,8 @@
         </p:nvSpPr>
         <p:spPr>
           <a:xfrm>
-            <a:off x="685800" y="1645920"/>
-            <a:ext cx="1737360" cy="731520"/>
+            <a:off x="457200" y="1645920"/>
+            <a:ext cx="1920240" cy="731520"/>
           </a:xfrm>
           <a:prstGeom prst="rect">
             <a:avLst/>
@@ -18099,7 +18138,7 @@
               <a:buNone/>
             </a:pPr>
             <a:r>
-              <a:rPr lang="en-US" sz="2800" b="1" dirty="0">
+              <a:rPr lang="en-US" sz="2200" b="1" dirty="0">
                 <a:solidFill>
                   <a:srgbClr val="94A3B8"/>
                 </a:solidFill>
@@ -18109,7 +18148,7 @@
               </a:rPr>
               <a:t>AI Skeptic</a:t>
             </a:r>
-            <a:endParaRPr lang="en-US" sz="2800" dirty="0"/>
+            <a:endParaRPr lang="en-US" sz="2200" dirty="0"/>
           </a:p>
         </p:txBody>
       </p:sp>
@@ -18121,8 +18160,8 @@
         </p:nvSpPr>
         <p:spPr>
           <a:xfrm>
-            <a:off x="2423160" y="1645920"/>
-            <a:ext cx="274320" cy="731520"/>
+            <a:off x="2377440" y="1645920"/>
+            <a:ext cx="182880" cy="731520"/>
           </a:xfrm>
           <a:prstGeom prst="rect">
             <a:avLst/>
@@ -18138,7 +18177,7 @@
               <a:buNone/>
             </a:pPr>
             <a:r>
-              <a:rPr lang="en-US" sz="2800" dirty="0">
+              <a:rPr lang="en-US" sz="2200" dirty="0">
                 <a:solidFill>
                   <a:srgbClr val="94A3B8"/>
                 </a:solidFill>
@@ -18148,7 +18187,7 @@
               </a:rPr>
               <a:t>→</a:t>
             </a:r>
-            <a:endParaRPr lang="en-US" sz="2800" dirty="0"/>
+            <a:endParaRPr lang="en-US" sz="2200" dirty="0"/>
           </a:p>
         </p:txBody>
       </p:sp>
@@ -18160,8 +18199,8 @@
         </p:nvSpPr>
         <p:spPr>
           <a:xfrm>
-            <a:off x="2697480" y="1645920"/>
-            <a:ext cx="1737360" cy="731520"/>
+            <a:off x="2560320" y="1645920"/>
+            <a:ext cx="1920240" cy="731520"/>
           </a:xfrm>
           <a:prstGeom prst="roundRect">
             <a:avLst>
@@ -18187,8 +18226,8 @@
         </p:nvSpPr>
         <p:spPr>
           <a:xfrm>
-            <a:off x="2697480" y="1645920"/>
-            <a:ext cx="1737360" cy="731520"/>
+            <a:off x="2560320" y="1645920"/>
+            <a:ext cx="1920240" cy="731520"/>
           </a:xfrm>
           <a:prstGeom prst="rect">
             <a:avLst/>
@@ -18204,7 +18243,7 @@
               <a:buNone/>
             </a:pPr>
             <a:r>
-              <a:rPr lang="en-US" sz="2800" b="1" dirty="0">
+              <a:rPr lang="en-US" sz="2200" b="1" dirty="0">
                 <a:solidFill>
                   <a:srgbClr val="FFFFFF"/>
                 </a:solidFill>
@@ -18214,7 +18253,7 @@
               </a:rPr>
               <a:t>AI Questioner</a:t>
             </a:r>
-            <a:endParaRPr lang="en-US" sz="2800" dirty="0"/>
+            <a:endParaRPr lang="en-US" sz="2200" dirty="0"/>
           </a:p>
         </p:txBody>
       </p:sp>
@@ -18226,8 +18265,8 @@
         </p:nvSpPr>
         <p:spPr>
           <a:xfrm>
-            <a:off x="4434840" y="1645920"/>
-            <a:ext cx="274320" cy="731520"/>
+            <a:off x="4480560" y="1645920"/>
+            <a:ext cx="182880" cy="731520"/>
           </a:xfrm>
           <a:prstGeom prst="rect">
             <a:avLst/>
@@ -18243,7 +18282,7 @@
               <a:buNone/>
             </a:pPr>
             <a:r>
-              <a:rPr lang="en-US" sz="2800" dirty="0">
+              <a:rPr lang="en-US" sz="2200" dirty="0">
                 <a:solidFill>
                   <a:srgbClr val="94A3B8"/>
                 </a:solidFill>
@@ -18253,7 +18292,7 @@
               </a:rPr>
               <a:t>→</a:t>
             </a:r>
-            <a:endParaRPr lang="en-US" sz="2800" dirty="0"/>
+            <a:endParaRPr lang="en-US" sz="2200" dirty="0"/>
           </a:p>
         </p:txBody>
       </p:sp>
@@ -18265,8 +18304,8 @@
         </p:nvSpPr>
         <p:spPr>
           <a:xfrm>
-            <a:off x="4709160" y="1645920"/>
-            <a:ext cx="1737360" cy="731520"/>
+            <a:off x="4663440" y="1645920"/>
+            <a:ext cx="1920240" cy="731520"/>
           </a:xfrm>
           <a:prstGeom prst="roundRect">
             <a:avLst>
@@ -18294,8 +18333,8 @@
         </p:nvSpPr>
         <p:spPr>
           <a:xfrm>
-            <a:off x="4709160" y="1645920"/>
-            <a:ext cx="1737360" cy="731520"/>
+            <a:off x="4663440" y="1645920"/>
+            <a:ext cx="1920240" cy="731520"/>
           </a:xfrm>
           <a:prstGeom prst="rect">
             <a:avLst/>
@@ -18311,7 +18350,7 @@
               <a:buNone/>
             </a:pPr>
             <a:r>
-              <a:rPr lang="en-US" sz="2800" b="1" dirty="0">
+              <a:rPr lang="en-US" sz="2200" b="1" dirty="0">
                 <a:solidFill>
                   <a:srgbClr val="94A3B8"/>
                 </a:solidFill>
@@ -18321,7 +18360,7 @@
               </a:rPr>
               <a:t>AI Viber</a:t>
             </a:r>
-            <a:endParaRPr lang="en-US" sz="2800" dirty="0"/>
+            <a:endParaRPr lang="en-US" sz="2200" dirty="0"/>
           </a:p>
         </p:txBody>
       </p:sp>
@@ -18333,8 +18372,8 @@
         </p:nvSpPr>
         <p:spPr>
           <a:xfrm>
-            <a:off x="6446520" y="1645920"/>
-            <a:ext cx="274320" cy="731520"/>
+            <a:off x="6583680" y="1645920"/>
+            <a:ext cx="182880" cy="731520"/>
           </a:xfrm>
           <a:prstGeom prst="rect">
             <a:avLst/>
@@ -18350,7 +18389,7 @@
               <a:buNone/>
             </a:pPr>
             <a:r>
-              <a:rPr lang="en-US" sz="2800" dirty="0">
+              <a:rPr lang="en-US" sz="2200" dirty="0">
                 <a:solidFill>
                   <a:srgbClr val="94A3B8"/>
                 </a:solidFill>
@@ -18360,7 +18399,7 @@
               </a:rPr>
               <a:t>→</a:t>
             </a:r>
-            <a:endParaRPr lang="en-US" sz="2800" dirty="0"/>
+            <a:endParaRPr lang="en-US" sz="2200" dirty="0"/>
           </a:p>
         </p:txBody>
       </p:sp>
@@ -18372,8 +18411,8 @@
         </p:nvSpPr>
         <p:spPr>
           <a:xfrm>
-            <a:off x="6720840" y="1645920"/>
-            <a:ext cx="1737360" cy="731520"/>
+            <a:off x="6766560" y="1645920"/>
+            <a:ext cx="1920240" cy="731520"/>
           </a:xfrm>
           <a:prstGeom prst="roundRect">
             <a:avLst>
@@ -18401,8 +18440,8 @@
         </p:nvSpPr>
         <p:spPr>
           <a:xfrm>
-            <a:off x="6720840" y="1645920"/>
-            <a:ext cx="1737360" cy="731520"/>
+            <a:off x="6766560" y="1645920"/>
+            <a:ext cx="1920240" cy="731520"/>
           </a:xfrm>
           <a:prstGeom prst="rect">
             <a:avLst/>
@@ -18418,7 +18457,7 @@
               <a:buNone/>
             </a:pPr>
             <a:r>
-              <a:rPr lang="en-US" sz="2800" b="1" dirty="0">
+              <a:rPr lang="en-US" sz="2200" b="1" dirty="0">
                 <a:solidFill>
                   <a:srgbClr val="94A3B8"/>
                 </a:solidFill>
@@ -18428,7 +18467,7 @@
               </a:rPr>
               <a:t>AI-First</a:t>
             </a:r>
-            <a:endParaRPr lang="en-US" sz="2800" dirty="0"/>
+            <a:endParaRPr lang="en-US" sz="2200" dirty="0"/>
           </a:p>
         </p:txBody>
       </p:sp>
@@ -18764,7 +18803,7 @@
       </p:sp>
       <p:pic>
         <p:nvPicPr>
-          <p:cNvPr id="3" name="Image 0" descr="preencoded.png">    </p:cNvPr>
+          <p:cNvPr id="3" name="Image 0" descr="/Users/michaelengland/Developer/michaelengland/ai-best-practices/icons/user.png">    </p:cNvPr>
           <p:cNvPicPr>
             <a:picLocks noChangeAspect="1"/>
           </p:cNvPicPr>
@@ -18850,7 +18889,7 @@
       </p:sp>
       <p:pic>
         <p:nvPicPr>
-          <p:cNvPr id="6" name="Image 1" descr="preencoded.png">    </p:cNvPr>
+          <p:cNvPr id="6" name="Image 1" descr="/Users/michaelengland/Developer/michaelengland/ai-best-practices/icons/user.png">    </p:cNvPr>
           <p:cNvPicPr>
             <a:picLocks noChangeAspect="1"/>
           </p:cNvPicPr>
@@ -18913,7 +18952,7 @@
       </p:sp>
       <p:pic>
         <p:nvPicPr>
-          <p:cNvPr id="8" name="Image 2" descr="preencoded.png">    </p:cNvPr>
+          <p:cNvPr id="8" name="Image 2" descr="/Users/michaelengland/Developer/michaelengland/ai-best-practices/icons/user.png">    </p:cNvPr>
           <p:cNvPicPr>
             <a:picLocks noChangeAspect="1"/>
           </p:cNvPicPr>
@@ -18976,7 +19015,7 @@
       </p:sp>
       <p:pic>
         <p:nvPicPr>
-          <p:cNvPr id="10" name="Image 3" descr="preencoded.png">    </p:cNvPr>
+          <p:cNvPr id="10" name="Image 3" descr="/Users/michaelengland/Developer/michaelengland/ai-best-practices/icons/user.png">    </p:cNvPr>
           <p:cNvPicPr>
             <a:picLocks noChangeAspect="1"/>
           </p:cNvPicPr>
@@ -19039,7 +19078,7 @@
       </p:sp>
       <p:pic>
         <p:nvPicPr>
-          <p:cNvPr id="12" name="Image 4" descr="preencoded.png">    </p:cNvPr>
+          <p:cNvPr id="12" name="Image 4" descr="/Users/michaelengland/Developer/michaelengland/ai-best-practices/icons/user.png">    </p:cNvPr>
           <p:cNvPicPr>
             <a:picLocks noChangeAspect="1"/>
           </p:cNvPicPr>
@@ -21476,8 +21515,8 @@
         </p:nvSpPr>
         <p:spPr>
           <a:xfrm>
-            <a:off x="685800" y="1280160"/>
-            <a:ext cx="1737360" cy="914400"/>
+            <a:off x="457200" y="1280160"/>
+            <a:ext cx="1920240" cy="914400"/>
           </a:xfrm>
           <a:prstGeom prst="rect">
             <a:avLst/>
@@ -21493,7 +21532,7 @@
               <a:buNone/>
             </a:pPr>
             <a:r>
-              <a:rPr lang="en-US" sz="2800" b="1" dirty="0">
+              <a:rPr lang="en-US" sz="2200" b="1" dirty="0">
                 <a:solidFill>
                   <a:srgbClr val="9CA3AF"/>
                 </a:solidFill>
@@ -21503,7 +21542,7 @@
               </a:rPr>
               <a:t>AI Skeptic</a:t>
             </a:r>
-            <a:endParaRPr lang="en-US" sz="2800" dirty="0"/>
+            <a:endParaRPr lang="en-US" sz="2200" dirty="0"/>
           </a:p>
         </p:txBody>
       </p:sp>
@@ -21515,8 +21554,8 @@
         </p:nvSpPr>
         <p:spPr>
           <a:xfrm>
-            <a:off x="685800" y="2560320"/>
-            <a:ext cx="1737360" cy="731520"/>
+            <a:off x="457200" y="2560320"/>
+            <a:ext cx="1920240" cy="731520"/>
           </a:xfrm>
           <a:prstGeom prst="rect">
             <a:avLst/>
@@ -21554,8 +21593,8 @@
         </p:nvSpPr>
         <p:spPr>
           <a:xfrm>
-            <a:off x="2423160" y="1737360"/>
-            <a:ext cx="274320" cy="548640"/>
+            <a:off x="2377440" y="1737360"/>
+            <a:ext cx="182880" cy="548640"/>
           </a:xfrm>
           <a:prstGeom prst="rect">
             <a:avLst/>
@@ -21593,8 +21632,8 @@
         </p:nvSpPr>
         <p:spPr>
           <a:xfrm>
-            <a:off x="2697480" y="1280160"/>
-            <a:ext cx="1737360" cy="914400"/>
+            <a:off x="2560320" y="1280160"/>
+            <a:ext cx="1920240" cy="914400"/>
           </a:xfrm>
           <a:prstGeom prst="rect">
             <a:avLst/>
@@ -21610,7 +21649,7 @@
               <a:buNone/>
             </a:pPr>
             <a:r>
-              <a:rPr lang="en-US" sz="2800" b="1" dirty="0">
+              <a:rPr lang="en-US" sz="2200" b="1" dirty="0">
                 <a:solidFill>
                   <a:srgbClr val="6B7280"/>
                 </a:solidFill>
@@ -21620,7 +21659,7 @@
               </a:rPr>
               <a:t>AI Questioner</a:t>
             </a:r>
-            <a:endParaRPr lang="en-US" sz="2800" dirty="0"/>
+            <a:endParaRPr lang="en-US" sz="2200" dirty="0"/>
           </a:p>
         </p:txBody>
       </p:sp>
@@ -21632,8 +21671,8 @@
         </p:nvSpPr>
         <p:spPr>
           <a:xfrm>
-            <a:off x="2697480" y="2560320"/>
-            <a:ext cx="1737360" cy="731520"/>
+            <a:off x="2560320" y="2560320"/>
+            <a:ext cx="1920240" cy="731520"/>
           </a:xfrm>
           <a:prstGeom prst="rect">
             <a:avLst/>
@@ -21671,8 +21710,8 @@
         </p:nvSpPr>
         <p:spPr>
           <a:xfrm>
-            <a:off x="4434840" y="1737360"/>
-            <a:ext cx="274320" cy="548640"/>
+            <a:off x="4480560" y="1737360"/>
+            <a:ext cx="182880" cy="548640"/>
           </a:xfrm>
           <a:prstGeom prst="rect">
             <a:avLst/>
@@ -21710,8 +21749,8 @@
         </p:nvSpPr>
         <p:spPr>
           <a:xfrm>
-            <a:off x="4709160" y="1280160"/>
-            <a:ext cx="1737360" cy="914400"/>
+            <a:off x="4663440" y="1280160"/>
+            <a:ext cx="1920240" cy="914400"/>
           </a:xfrm>
           <a:prstGeom prst="rect">
             <a:avLst/>
@@ -21727,7 +21766,7 @@
               <a:buNone/>
             </a:pPr>
             <a:r>
-              <a:rPr lang="en-US" sz="2800" b="1" dirty="0">
+              <a:rPr lang="en-US" sz="2200" b="1" dirty="0">
                 <a:solidFill>
                   <a:srgbClr val="00B4D8"/>
                 </a:solidFill>
@@ -21737,7 +21776,7 @@
               </a:rPr>
               <a:t>AI Viber</a:t>
             </a:r>
-            <a:endParaRPr lang="en-US" sz="2800" dirty="0"/>
+            <a:endParaRPr lang="en-US" sz="2200" dirty="0"/>
           </a:p>
         </p:txBody>
       </p:sp>
@@ -21749,8 +21788,8 @@
         </p:nvSpPr>
         <p:spPr>
           <a:xfrm>
-            <a:off x="4709160" y="2560320"/>
-            <a:ext cx="1737360" cy="731520"/>
+            <a:off x="4663440" y="2560320"/>
+            <a:ext cx="1920240" cy="731520"/>
           </a:xfrm>
           <a:prstGeom prst="rect">
             <a:avLst/>
@@ -21788,8 +21827,8 @@
         </p:nvSpPr>
         <p:spPr>
           <a:xfrm>
-            <a:off x="6446520" y="1737360"/>
-            <a:ext cx="274320" cy="548640"/>
+            <a:off x="6583680" y="1737360"/>
+            <a:ext cx="182880" cy="548640"/>
           </a:xfrm>
           <a:prstGeom prst="rect">
             <a:avLst/>
@@ -21827,8 +21866,8 @@
         </p:nvSpPr>
         <p:spPr>
           <a:xfrm>
-            <a:off x="6720840" y="1280160"/>
-            <a:ext cx="1737360" cy="914400"/>
+            <a:off x="6766560" y="1280160"/>
+            <a:ext cx="1920240" cy="914400"/>
           </a:xfrm>
           <a:prstGeom prst="rect">
             <a:avLst/>
@@ -21844,7 +21883,7 @@
               <a:buNone/>
             </a:pPr>
             <a:r>
-              <a:rPr lang="en-US" sz="2800" b="1" dirty="0">
+              <a:rPr lang="en-US" sz="2200" b="1" dirty="0">
                 <a:solidFill>
                   <a:srgbClr val="00B4D8"/>
                 </a:solidFill>
@@ -21854,7 +21893,7 @@
               </a:rPr>
               <a:t>AI-First</a:t>
             </a:r>
-            <a:endParaRPr lang="en-US" sz="2800" dirty="0"/>
+            <a:endParaRPr lang="en-US" sz="2200" dirty="0"/>
           </a:p>
         </p:txBody>
       </p:sp>
@@ -21866,8 +21905,8 @@
         </p:nvSpPr>
         <p:spPr>
           <a:xfrm>
-            <a:off x="6720840" y="2560320"/>
-            <a:ext cx="1737360" cy="731520"/>
+            <a:off x="6766560" y="2560320"/>
+            <a:ext cx="1920240" cy="731520"/>
           </a:xfrm>
           <a:prstGeom prst="rect">
             <a:avLst/>
@@ -24092,8 +24131,8 @@
         </p:nvSpPr>
         <p:spPr>
           <a:xfrm>
-            <a:off x="457200" y="1097280"/>
-            <a:ext cx="1828800" cy="548640"/>
+            <a:off x="228600" y="1097280"/>
+            <a:ext cx="2286000" cy="548640"/>
           </a:xfrm>
           <a:prstGeom prst="rect">
             <a:avLst/>
@@ -24109,7 +24148,7 @@
               <a:buNone/>
             </a:pPr>
             <a:r>
-              <a:rPr lang="en-US" sz="2800" b="1" dirty="0">
+              <a:rPr lang="en-US" sz="2400" b="1" dirty="0">
                 <a:solidFill>
                   <a:srgbClr val="FFFFFF"/>
                 </a:solidFill>
@@ -24119,7 +24158,7 @@
               </a:rPr>
               <a:t>PCs</a:t>
             </a:r>
-            <a:endParaRPr lang="en-US" sz="2800" dirty="0"/>
+            <a:endParaRPr lang="en-US" sz="2400" dirty="0"/>
           </a:p>
         </p:txBody>
       </p:sp>
@@ -24131,8 +24170,8 @@
         </p:nvSpPr>
         <p:spPr>
           <a:xfrm>
-            <a:off x="457200" y="1645920"/>
-            <a:ext cx="1828800" cy="457200"/>
+            <a:off x="228600" y="1645920"/>
+            <a:ext cx="2286000" cy="457200"/>
           </a:xfrm>
           <a:prstGeom prst="rect">
             <a:avLst/>
@@ -24148,7 +24187,7 @@
               <a:buNone/>
             </a:pPr>
             <a:r>
-              <a:rPr lang="en-US" sz="2800" dirty="0">
+              <a:rPr lang="en-US" sz="2400" dirty="0">
                 <a:solidFill>
                   <a:srgbClr val="94A3B8"/>
                 </a:solidFill>
@@ -24158,7 +24197,7 @@
               </a:rPr>
               <a:t>1980s</a:t>
             </a:r>
-            <a:endParaRPr lang="en-US" sz="2800" dirty="0"/>
+            <a:endParaRPr lang="en-US" sz="2400" dirty="0"/>
           </a:p>
         </p:txBody>
       </p:sp>
@@ -24190,8 +24229,8 @@
         </p:nvSpPr>
         <p:spPr>
           <a:xfrm>
-            <a:off x="2606040" y="1097280"/>
-            <a:ext cx="1828800" cy="548640"/>
+            <a:off x="2377440" y="1097280"/>
+            <a:ext cx="2286000" cy="548640"/>
           </a:xfrm>
           <a:prstGeom prst="rect">
             <a:avLst/>
@@ -24207,7 +24246,7 @@
               <a:buNone/>
             </a:pPr>
             <a:r>
-              <a:rPr lang="en-US" sz="2800" b="1" dirty="0">
+              <a:rPr lang="en-US" sz="2400" b="1" dirty="0">
                 <a:solidFill>
                   <a:srgbClr val="FFFFFF"/>
                 </a:solidFill>
@@ -24217,7 +24256,7 @@
               </a:rPr>
               <a:t>Internet</a:t>
             </a:r>
-            <a:endParaRPr lang="en-US" sz="2800" dirty="0"/>
+            <a:endParaRPr lang="en-US" sz="2400" dirty="0"/>
           </a:p>
         </p:txBody>
       </p:sp>
@@ -24229,8 +24268,8 @@
         </p:nvSpPr>
         <p:spPr>
           <a:xfrm>
-            <a:off x="2606040" y="1645920"/>
-            <a:ext cx="1828800" cy="457200"/>
+            <a:off x="2377440" y="1645920"/>
+            <a:ext cx="2286000" cy="457200"/>
           </a:xfrm>
           <a:prstGeom prst="rect">
             <a:avLst/>
@@ -24246,7 +24285,7 @@
               <a:buNone/>
             </a:pPr>
             <a:r>
-              <a:rPr lang="en-US" sz="2800" dirty="0">
+              <a:rPr lang="en-US" sz="2400" dirty="0">
                 <a:solidFill>
                   <a:srgbClr val="94A3B8"/>
                 </a:solidFill>
@@ -24256,7 +24295,7 @@
               </a:rPr>
               <a:t>1990s</a:t>
             </a:r>
-            <a:endParaRPr lang="en-US" sz="2800" dirty="0"/>
+            <a:endParaRPr lang="en-US" sz="2400" dirty="0"/>
           </a:p>
         </p:txBody>
       </p:sp>
@@ -24288,8 +24327,8 @@
         </p:nvSpPr>
         <p:spPr>
           <a:xfrm>
-            <a:off x="4754880" y="1097280"/>
-            <a:ext cx="1828800" cy="548640"/>
+            <a:off x="4526280" y="1097280"/>
+            <a:ext cx="2286000" cy="548640"/>
           </a:xfrm>
           <a:prstGeom prst="rect">
             <a:avLst/>
@@ -24305,7 +24344,7 @@
               <a:buNone/>
             </a:pPr>
             <a:r>
-              <a:rPr lang="en-US" sz="2800" b="1" dirty="0">
+              <a:rPr lang="en-US" sz="2400" b="1" dirty="0">
                 <a:solidFill>
                   <a:srgbClr val="FFFFFF"/>
                 </a:solidFill>
@@ -24315,7 +24354,7 @@
               </a:rPr>
               <a:t>Smartphones</a:t>
             </a:r>
-            <a:endParaRPr lang="en-US" sz="2800" dirty="0"/>
+            <a:endParaRPr lang="en-US" sz="2400" dirty="0"/>
           </a:p>
         </p:txBody>
       </p:sp>
@@ -24327,8 +24366,8 @@
         </p:nvSpPr>
         <p:spPr>
           <a:xfrm>
-            <a:off x="4754880" y="1645920"/>
-            <a:ext cx="1828800" cy="457200"/>
+            <a:off x="4526280" y="1645920"/>
+            <a:ext cx="2286000" cy="457200"/>
           </a:xfrm>
           <a:prstGeom prst="rect">
             <a:avLst/>
@@ -24344,7 +24383,7 @@
               <a:buNone/>
             </a:pPr>
             <a:r>
-              <a:rPr lang="en-US" sz="2800" dirty="0">
+              <a:rPr lang="en-US" sz="2400" dirty="0">
                 <a:solidFill>
                   <a:srgbClr val="94A3B8"/>
                 </a:solidFill>
@@ -24354,7 +24393,7 @@
               </a:rPr>
               <a:t>2010s</a:t>
             </a:r>
-            <a:endParaRPr lang="en-US" sz="2800" dirty="0"/>
+            <a:endParaRPr lang="en-US" sz="2400" dirty="0"/>
           </a:p>
         </p:txBody>
       </p:sp>
@@ -24386,8 +24425,8 @@
         </p:nvSpPr>
         <p:spPr>
           <a:xfrm>
-            <a:off x="6903720" y="1097280"/>
-            <a:ext cx="1828800" cy="548640"/>
+            <a:off x="6675120" y="1097280"/>
+            <a:ext cx="2286000" cy="548640"/>
           </a:xfrm>
           <a:prstGeom prst="rect">
             <a:avLst/>
@@ -24403,7 +24442,7 @@
               <a:buNone/>
             </a:pPr>
             <a:r>
-              <a:rPr lang="en-US" sz="2800" b="1" dirty="0">
+              <a:rPr lang="en-US" sz="2400" b="1" dirty="0">
                 <a:solidFill>
                   <a:srgbClr val="FFFFFF"/>
                 </a:solidFill>
@@ -24413,7 +24452,7 @@
               </a:rPr>
               <a:t>AI</a:t>
             </a:r>
-            <a:endParaRPr lang="en-US" sz="2800" dirty="0"/>
+            <a:endParaRPr lang="en-US" sz="2400" dirty="0"/>
           </a:p>
         </p:txBody>
       </p:sp>
@@ -24425,8 +24464,8 @@
         </p:nvSpPr>
         <p:spPr>
           <a:xfrm>
-            <a:off x="6903720" y="1645920"/>
-            <a:ext cx="1828800" cy="457200"/>
+            <a:off x="6675120" y="1645920"/>
+            <a:ext cx="2286000" cy="457200"/>
           </a:xfrm>
           <a:prstGeom prst="rect">
             <a:avLst/>
@@ -24442,7 +24481,7 @@
               <a:buNone/>
             </a:pPr>
             <a:r>
-              <a:rPr lang="en-US" sz="2800" dirty="0">
+              <a:rPr lang="en-US" sz="2400" dirty="0">
                 <a:solidFill>
                   <a:srgbClr val="94A3B8"/>
                 </a:solidFill>
@@ -24452,7 +24491,7 @@
               </a:rPr>
               <a:t>Now</a:t>
             </a:r>
-            <a:endParaRPr lang="en-US" sz="2800" dirty="0"/>
+            <a:endParaRPr lang="en-US" sz="2400" dirty="0"/>
           </a:p>
         </p:txBody>
       </p:sp>

</xml_diff>

<commit_message>
Address user feedback: phrasing, spacing, overflow, clarity
- Slide 2: Fix disconnected phrasing — "arguing" → concrete task
  ("on a one-page summary")
- Slide 13: Enlarge question boxes (3.2"→3.8" wide, 0.9"→1.2" tall),
  reduce font 28pt→22pt so text fits inside
- Slide 35: Increase gap between heading and sub text (y 2.9→3.0),
  reduce sub font 28pt→24pt
- Slide 47: Nudge body text down (y 1.7→1.9) for breathing room
- Slide 48: Raise entire block (title y 0.6→0.4, sub y 2.8→2.6)
- Slide 65: Add "Look how far you've come." headline, shift
  spectrum down to accommodate

Co-Authored-By: Claude Opus 4.6 (1M context) <noreply@anthropic.com>
</commit_message>
<xml_diff>
--- a/Getting-Agents-to-Give-Up-Their-Secrets.pptx
+++ b/Getting-Agents-to-Give-Up-Their-Secrets.pptx
@@ -9164,12 +9164,12 @@
         </p:nvSpPr>
         <p:spPr>
           <a:xfrm>
-            <a:off x="457200" y="731520"/>
-            <a:ext cx="2926080" cy="822960"/>
+            <a:off x="457200" y="548640"/>
+            <a:ext cx="3474720" cy="1097280"/>
           </a:xfrm>
           <a:prstGeom prst="roundRect">
             <a:avLst>
-              <a:gd name="adj" fmla="val 11111"/>
+              <a:gd name="adj" fmla="val 8333"/>
             </a:avLst>
           </a:prstGeom>
           <a:solidFill>
@@ -9186,8 +9186,8 @@
         </p:nvSpPr>
         <p:spPr>
           <a:xfrm>
-            <a:off x="594360" y="731520"/>
-            <a:ext cx="2651760" cy="822960"/>
+            <a:off x="594360" y="548640"/>
+            <a:ext cx="3200400" cy="1097280"/>
           </a:xfrm>
           <a:prstGeom prst="rect">
             <a:avLst/>
@@ -9203,7 +9203,7 @@
               <a:buNone/>
             </a:pPr>
             <a:r>
-              <a:rPr lang="en-US" sz="2800" b="1" dirty="0">
+              <a:rPr lang="en-US" sz="2200" b="1" dirty="0">
                 <a:solidFill>
                   <a:srgbClr val="FFFFFF"/>
                 </a:solidFill>
@@ -9213,14 +9213,14 @@
               </a:rPr>
               <a:t>What's the difference</a:t>
             </a:r>
-            <a:endParaRPr lang="en-US" sz="2800" dirty="0"/>
+            <a:endParaRPr lang="en-US" sz="2200" dirty="0"/>
           </a:p>
           <a:p>
             <a:pPr indent="0" marL="0">
               <a:buNone/>
             </a:pPr>
             <a:r>
-              <a:rPr lang="en-US" sz="2800" b="1" dirty="0">
+              <a:rPr lang="en-US" sz="2200" b="1" dirty="0">
                 <a:solidFill>
                   <a:srgbClr val="FFFFFF"/>
                 </a:solidFill>
@@ -9230,7 +9230,7 @@
               </a:rPr>
               <a:t>between ChatGPT and GPT?</a:t>
             </a:r>
-            <a:endParaRPr lang="en-US" sz="2800" dirty="0"/>
+            <a:endParaRPr lang="en-US" sz="2200" dirty="0"/>
           </a:p>
         </p:txBody>
       </p:sp>
@@ -9242,12 +9242,12 @@
         </p:nvSpPr>
         <p:spPr>
           <a:xfrm>
-            <a:off x="5029200" y="1097280"/>
-            <a:ext cx="2926080" cy="822960"/>
+            <a:off x="5029200" y="914400"/>
+            <a:ext cx="3474720" cy="1097280"/>
           </a:xfrm>
           <a:prstGeom prst="roundRect">
             <a:avLst>
-              <a:gd name="adj" fmla="val 11111"/>
+              <a:gd name="adj" fmla="val 8333"/>
             </a:avLst>
           </a:prstGeom>
           <a:solidFill>
@@ -9264,8 +9264,8 @@
         </p:nvSpPr>
         <p:spPr>
           <a:xfrm>
-            <a:off x="5166360" y="1097280"/>
-            <a:ext cx="2651760" cy="822960"/>
+            <a:off x="5166360" y="914400"/>
+            <a:ext cx="3200400" cy="1097280"/>
           </a:xfrm>
           <a:prstGeom prst="rect">
             <a:avLst/>
@@ -9281,7 +9281,7 @@
               <a:buNone/>
             </a:pPr>
             <a:r>
-              <a:rPr lang="en-US" sz="2800" b="1" dirty="0">
+              <a:rPr lang="en-US" sz="2200" b="1" dirty="0">
                 <a:solidFill>
                   <a:srgbClr val="FFFFFF"/>
                 </a:solidFill>
@@ -9291,14 +9291,14 @@
               </a:rPr>
               <a:t>Is Claude the same</a:t>
             </a:r>
-            <a:endParaRPr lang="en-US" sz="2800" dirty="0"/>
+            <a:endParaRPr lang="en-US" sz="2200" dirty="0"/>
           </a:p>
           <a:p>
             <a:pPr indent="0" marL="0">
               <a:buNone/>
             </a:pPr>
             <a:r>
-              <a:rPr lang="en-US" sz="2800" b="1" dirty="0">
+              <a:rPr lang="en-US" sz="2200" b="1" dirty="0">
                 <a:solidFill>
                   <a:srgbClr val="FFFFFF"/>
                 </a:solidFill>
@@ -9308,7 +9308,7 @@
               </a:rPr>
               <a:t>as ChatGPT?</a:t>
             </a:r>
-            <a:endParaRPr lang="en-US" sz="2800" dirty="0"/>
+            <a:endParaRPr lang="en-US" sz="2200" dirty="0"/>
           </a:p>
         </p:txBody>
       </p:sp>
@@ -9320,12 +9320,12 @@
         </p:nvSpPr>
         <p:spPr>
           <a:xfrm>
-            <a:off x="1371600" y="2743200"/>
-            <a:ext cx="2926080" cy="822960"/>
+            <a:off x="1371600" y="2560320"/>
+            <a:ext cx="3474720" cy="1097280"/>
           </a:xfrm>
           <a:prstGeom prst="roundRect">
             <a:avLst>
-              <a:gd name="adj" fmla="val 11111"/>
+              <a:gd name="adj" fmla="val 8333"/>
             </a:avLst>
           </a:prstGeom>
           <a:solidFill>
@@ -9342,8 +9342,8 @@
         </p:nvSpPr>
         <p:spPr>
           <a:xfrm>
-            <a:off x="1508760" y="2743200"/>
-            <a:ext cx="2651760" cy="822960"/>
+            <a:off x="1508760" y="2560320"/>
+            <a:ext cx="3200400" cy="1097280"/>
           </a:xfrm>
           <a:prstGeom prst="rect">
             <a:avLst/>
@@ -9359,7 +9359,7 @@
               <a:buNone/>
             </a:pPr>
             <a:r>
-              <a:rPr lang="en-US" sz="2800" b="1" dirty="0">
+              <a:rPr lang="en-US" sz="2200" b="1" dirty="0">
                 <a:solidFill>
                   <a:srgbClr val="FFFFFF"/>
                 </a:solidFill>
@@ -9369,14 +9369,14 @@
               </a:rPr>
               <a:t>What even is</a:t>
             </a:r>
-            <a:endParaRPr lang="en-US" sz="2800" dirty="0"/>
+            <a:endParaRPr lang="en-US" sz="2200" dirty="0"/>
           </a:p>
           <a:p>
             <a:pPr indent="0" marL="0">
               <a:buNone/>
             </a:pPr>
             <a:r>
-              <a:rPr lang="en-US" sz="2800" b="1" dirty="0">
+              <a:rPr lang="en-US" sz="2200" b="1" dirty="0">
                 <a:solidFill>
                   <a:srgbClr val="FFFFFF"/>
                 </a:solidFill>
@@ -9386,7 +9386,7 @@
               </a:rPr>
               <a:t>an agent?</a:t>
             </a:r>
-            <a:endParaRPr lang="en-US" sz="2800" dirty="0"/>
+            <a:endParaRPr lang="en-US" sz="2200" dirty="0"/>
           </a:p>
         </p:txBody>
       </p:sp>
@@ -9398,12 +9398,12 @@
         </p:nvSpPr>
         <p:spPr>
           <a:xfrm>
-            <a:off x="5486400" y="2926080"/>
-            <a:ext cx="2926080" cy="822960"/>
+            <a:off x="5029200" y="2926080"/>
+            <a:ext cx="3474720" cy="1097280"/>
           </a:xfrm>
           <a:prstGeom prst="roundRect">
             <a:avLst>
-              <a:gd name="adj" fmla="val 11111"/>
+              <a:gd name="adj" fmla="val 8333"/>
             </a:avLst>
           </a:prstGeom>
           <a:solidFill>
@@ -9420,8 +9420,8 @@
         </p:nvSpPr>
         <p:spPr>
           <a:xfrm>
-            <a:off x="5623560" y="2926080"/>
-            <a:ext cx="2651760" cy="822960"/>
+            <a:off x="5166360" y="2926080"/>
+            <a:ext cx="3200400" cy="1097280"/>
           </a:xfrm>
           <a:prstGeom prst="rect">
             <a:avLst/>
@@ -9437,7 +9437,7 @@
               <a:buNone/>
             </a:pPr>
             <a:r>
-              <a:rPr lang="en-US" sz="2800" b="1" dirty="0">
+              <a:rPr lang="en-US" sz="2200" b="1" dirty="0">
                 <a:solidFill>
                   <a:srgbClr val="FFFFFF"/>
                 </a:solidFill>
@@ -9447,14 +9447,14 @@
               </a:rPr>
               <a:t>Do I need to know</a:t>
             </a:r>
-            <a:endParaRPr lang="en-US" sz="2800" dirty="0"/>
+            <a:endParaRPr lang="en-US" sz="2200" dirty="0"/>
           </a:p>
           <a:p>
             <a:pPr indent="0" marL="0">
               <a:buNone/>
             </a:pPr>
             <a:r>
-              <a:rPr lang="en-US" sz="2800" b="1" dirty="0">
+              <a:rPr lang="en-US" sz="2200" b="1" dirty="0">
                 <a:solidFill>
                   <a:srgbClr val="FFFFFF"/>
                 </a:solidFill>
@@ -9464,7 +9464,7 @@
               </a:rPr>
               <a:t>what a token is?</a:t>
             </a:r>
-            <a:endParaRPr lang="en-US" sz="2800" dirty="0"/>
+            <a:endParaRPr lang="en-US" sz="2200" dirty="0"/>
           </a:p>
         </p:txBody>
       </p:sp>
@@ -11540,7 +11540,7 @@
                 <a:ea typeface="Calibri" pitchFamily="34" charset="-122"/>
                 <a:cs typeface="Calibri" pitchFamily="34" charset="-120"/>
               </a:rPr>
-              <a:t>arguing with ChatGPT.</a:t>
+              <a:t>on a one-page summary using ChatGPT.</a:t>
             </a:r>
             <a:endParaRPr lang="en-US" sz="2800" dirty="0"/>
           </a:p>
@@ -11557,7 +11557,7 @@
                 <a:ea typeface="Calibri" pitchFamily="34" charset="-122"/>
                 <a:cs typeface="Calibri" pitchFamily="34" charset="-120"/>
               </a:rPr>
-              <a:t>The same task took 2 minutes.</a:t>
+              <a:t>The right approach took 2 minutes.</a:t>
             </a:r>
             <a:endParaRPr lang="en-US" sz="2800" dirty="0"/>
           </a:p>
@@ -14886,7 +14886,7 @@
         </p:nvSpPr>
         <p:spPr>
           <a:xfrm>
-            <a:off x="457200" y="1645920"/>
+            <a:off x="457200" y="1371600"/>
             <a:ext cx="3840480" cy="914400"/>
           </a:xfrm>
           <a:prstGeom prst="rect">
@@ -14925,7 +14925,7 @@
         </p:nvSpPr>
         <p:spPr>
           <a:xfrm>
-            <a:off x="457200" y="2651760"/>
+            <a:off x="457200" y="2743200"/>
             <a:ext cx="3840480" cy="731520"/>
           </a:xfrm>
           <a:prstGeom prst="rect">
@@ -14942,7 +14942,7 @@
               <a:buNone/>
             </a:pPr>
             <a:r>
-              <a:rPr lang="en-US" sz="2800" dirty="0">
+              <a:rPr lang="en-US" sz="2400" dirty="0">
                 <a:solidFill>
                   <a:srgbClr val="94A3B8"/>
                 </a:solidFill>
@@ -14952,7 +14952,7 @@
               </a:rPr>
               <a:t>Could be for any company.</a:t>
             </a:r>
-            <a:endParaRPr lang="en-US" sz="2800" dirty="0"/>
+            <a:endParaRPr lang="en-US" sz="2400" dirty="0"/>
           </a:p>
         </p:txBody>
       </p:sp>
@@ -14987,7 +14987,7 @@
         </p:nvSpPr>
         <p:spPr>
           <a:xfrm>
-            <a:off x="4846320" y="1645920"/>
+            <a:off x="4846320" y="1371600"/>
             <a:ext cx="3840480" cy="914400"/>
           </a:xfrm>
           <a:prstGeom prst="rect">
@@ -15043,7 +15043,7 @@
         </p:nvSpPr>
         <p:spPr>
           <a:xfrm>
-            <a:off x="4846320" y="2651760"/>
+            <a:off x="4846320" y="2743200"/>
             <a:ext cx="3840480" cy="731520"/>
           </a:xfrm>
           <a:prstGeom prst="rect">
@@ -15060,7 +15060,7 @@
               <a:buNone/>
             </a:pPr>
             <a:r>
-              <a:rPr lang="en-US" sz="2800" dirty="0">
+              <a:rPr lang="en-US" sz="2400" dirty="0">
                 <a:solidFill>
                   <a:srgbClr val="00B4D8"/>
                 </a:solidFill>
@@ -15070,7 +15070,7 @@
               </a:rPr>
               <a:t>Same prompt + your context.</a:t>
             </a:r>
-            <a:endParaRPr lang="en-US" sz="2800" dirty="0"/>
+            <a:endParaRPr lang="en-US" sz="2400" dirty="0"/>
           </a:p>
         </p:txBody>
       </p:sp>
@@ -17554,7 +17554,7 @@
         </p:nvSpPr>
         <p:spPr>
           <a:xfrm>
-            <a:off x="457200" y="1554480"/>
+            <a:off x="457200" y="1737360"/>
             <a:ext cx="3840480" cy="2286000"/>
           </a:xfrm>
           <a:prstGeom prst="rect">
@@ -17689,7 +17689,7 @@
         </p:nvSpPr>
         <p:spPr>
           <a:xfrm>
-            <a:off x="4846320" y="1554480"/>
+            <a:off x="4846320" y="1737360"/>
             <a:ext cx="3840480" cy="2286000"/>
           </a:xfrm>
           <a:prstGeom prst="rect">
@@ -17816,7 +17816,7 @@
         </p:nvSpPr>
         <p:spPr>
           <a:xfrm>
-            <a:off x="914400" y="548640"/>
+            <a:off x="914400" y="365760"/>
             <a:ext cx="7315200" cy="1828800"/>
           </a:xfrm>
           <a:prstGeom prst="rect">
@@ -17855,7 +17855,7 @@
         </p:nvSpPr>
         <p:spPr>
           <a:xfrm>
-            <a:off x="1371600" y="2560320"/>
+            <a:off x="1371600" y="2377440"/>
             <a:ext cx="6400800" cy="1828800"/>
           </a:xfrm>
           <a:prstGeom prst="rect">
@@ -21489,13 +21489,52 @@
       </p:sp>
       <p:sp>
         <p:nvSpPr>
-          <p:cNvPr id="3" name="Shape 1"/>
-          <p:cNvSpPr/>
-          <p:nvPr/>
-        </p:nvSpPr>
-        <p:spPr>
-          <a:xfrm>
-            <a:off x="457200" y="2377440"/>
+          <p:cNvPr id="3" name="Text 1"/>
+          <p:cNvSpPr/>
+          <p:nvPr/>
+        </p:nvSpPr>
+        <p:spPr>
+          <a:xfrm>
+            <a:off x="914400" y="365760"/>
+            <a:ext cx="7315200" cy="731520"/>
+          </a:xfrm>
+          <a:prstGeom prst="rect">
+            <a:avLst/>
+          </a:prstGeom>
+          <a:noFill/>
+          <a:ln/>
+        </p:spPr>
+        <p:txBody>
+          <a:bodyPr wrap="square" lIns="0" tIns="0" rIns="0" bIns="0" rtlCol="0" anchor="ctr"/>
+          <a:lstStyle/>
+          <a:p>
+            <a:pPr algn="ctr" indent="0" marL="0">
+              <a:buNone/>
+            </a:pPr>
+            <a:r>
+              <a:rPr lang="en-US" sz="3600" b="1" dirty="0">
+                <a:solidFill>
+                  <a:srgbClr val="FFFFFF"/>
+                </a:solidFill>
+                <a:latin typeface="Georgia" pitchFamily="34" charset="0"/>
+                <a:ea typeface="Georgia" pitchFamily="34" charset="-122"/>
+                <a:cs typeface="Georgia" pitchFamily="34" charset="-120"/>
+              </a:rPr>
+              <a:t>Look how far you've come.</a:t>
+            </a:r>
+            <a:endParaRPr lang="en-US" sz="3600" dirty="0"/>
+          </a:p>
+        </p:txBody>
+      </p:sp>
+      <p:sp>
+        <p:nvSpPr>
+          <p:cNvPr id="4" name="Shape 2"/>
+          <p:cNvSpPr/>
+          <p:nvPr/>
+        </p:nvSpPr>
+        <p:spPr>
+          <a:xfrm>
+            <a:off x="457200" y="2560320"/>
             <a:ext cx="8229600" cy="54864"/>
           </a:xfrm>
           <a:prstGeom prst="rect">
@@ -21509,13 +21548,13 @@
       </p:sp>
       <p:sp>
         <p:nvSpPr>
-          <p:cNvPr id="4" name="Text 2"/>
-          <p:cNvSpPr/>
-          <p:nvPr/>
-        </p:nvSpPr>
-        <p:spPr>
-          <a:xfrm>
-            <a:off x="457200" y="1280160"/>
+          <p:cNvPr id="5" name="Text 3"/>
+          <p:cNvSpPr/>
+          <p:nvPr/>
+        </p:nvSpPr>
+        <p:spPr>
+          <a:xfrm>
+            <a:off x="457200" y="1463040"/>
             <a:ext cx="1920240" cy="914400"/>
           </a:xfrm>
           <a:prstGeom prst="rect">
@@ -21548,13 +21587,13 @@
       </p:sp>
       <p:sp>
         <p:nvSpPr>
-          <p:cNvPr id="5" name="Text 3"/>
-          <p:cNvSpPr/>
-          <p:nvPr/>
-        </p:nvSpPr>
-        <p:spPr>
-          <a:xfrm>
-            <a:off x="457200" y="2560320"/>
+          <p:cNvPr id="6" name="Text 4"/>
+          <p:cNvSpPr/>
+          <p:nvPr/>
+        </p:nvSpPr>
+        <p:spPr>
+          <a:xfrm>
+            <a:off x="457200" y="2743200"/>
             <a:ext cx="1920240" cy="731520"/>
           </a:xfrm>
           <a:prstGeom prst="rect">
@@ -21587,13 +21626,13 @@
       </p:sp>
       <p:sp>
         <p:nvSpPr>
-          <p:cNvPr id="6" name="Text 4"/>
-          <p:cNvSpPr/>
-          <p:nvPr/>
-        </p:nvSpPr>
-        <p:spPr>
-          <a:xfrm>
-            <a:off x="2377440" y="1737360"/>
+          <p:cNvPr id="7" name="Text 5"/>
+          <p:cNvSpPr/>
+          <p:nvPr/>
+        </p:nvSpPr>
+        <p:spPr>
+          <a:xfrm>
+            <a:off x="2377440" y="1920240"/>
             <a:ext cx="182880" cy="548640"/>
           </a:xfrm>
           <a:prstGeom prst="rect">
@@ -21626,13 +21665,13 @@
       </p:sp>
       <p:sp>
         <p:nvSpPr>
-          <p:cNvPr id="7" name="Text 5"/>
-          <p:cNvSpPr/>
-          <p:nvPr/>
-        </p:nvSpPr>
-        <p:spPr>
-          <a:xfrm>
-            <a:off x="2560320" y="1280160"/>
+          <p:cNvPr id="8" name="Text 6"/>
+          <p:cNvSpPr/>
+          <p:nvPr/>
+        </p:nvSpPr>
+        <p:spPr>
+          <a:xfrm>
+            <a:off x="2560320" y="1463040"/>
             <a:ext cx="1920240" cy="914400"/>
           </a:xfrm>
           <a:prstGeom prst="rect">
@@ -21665,13 +21704,13 @@
       </p:sp>
       <p:sp>
         <p:nvSpPr>
-          <p:cNvPr id="8" name="Text 6"/>
-          <p:cNvSpPr/>
-          <p:nvPr/>
-        </p:nvSpPr>
-        <p:spPr>
-          <a:xfrm>
-            <a:off x="2560320" y="2560320"/>
+          <p:cNvPr id="9" name="Text 7"/>
+          <p:cNvSpPr/>
+          <p:nvPr/>
+        </p:nvSpPr>
+        <p:spPr>
+          <a:xfrm>
+            <a:off x="2560320" y="2743200"/>
             <a:ext cx="1920240" cy="731520"/>
           </a:xfrm>
           <a:prstGeom prst="rect">
@@ -21704,13 +21743,13 @@
       </p:sp>
       <p:sp>
         <p:nvSpPr>
-          <p:cNvPr id="9" name="Text 7"/>
-          <p:cNvSpPr/>
-          <p:nvPr/>
-        </p:nvSpPr>
-        <p:spPr>
-          <a:xfrm>
-            <a:off x="4480560" y="1737360"/>
+          <p:cNvPr id="10" name="Text 8"/>
+          <p:cNvSpPr/>
+          <p:nvPr/>
+        </p:nvSpPr>
+        <p:spPr>
+          <a:xfrm>
+            <a:off x="4480560" y="1920240"/>
             <a:ext cx="182880" cy="548640"/>
           </a:xfrm>
           <a:prstGeom prst="rect">
@@ -21743,13 +21782,13 @@
       </p:sp>
       <p:sp>
         <p:nvSpPr>
-          <p:cNvPr id="10" name="Text 8"/>
-          <p:cNvSpPr/>
-          <p:nvPr/>
-        </p:nvSpPr>
-        <p:spPr>
-          <a:xfrm>
-            <a:off x="4663440" y="1280160"/>
+          <p:cNvPr id="11" name="Text 9"/>
+          <p:cNvSpPr/>
+          <p:nvPr/>
+        </p:nvSpPr>
+        <p:spPr>
+          <a:xfrm>
+            <a:off x="4663440" y="1463040"/>
             <a:ext cx="1920240" cy="914400"/>
           </a:xfrm>
           <a:prstGeom prst="rect">
@@ -21782,13 +21821,13 @@
       </p:sp>
       <p:sp>
         <p:nvSpPr>
-          <p:cNvPr id="11" name="Text 9"/>
-          <p:cNvSpPr/>
-          <p:nvPr/>
-        </p:nvSpPr>
-        <p:spPr>
-          <a:xfrm>
-            <a:off x="4663440" y="2560320"/>
+          <p:cNvPr id="12" name="Text 10"/>
+          <p:cNvSpPr/>
+          <p:nvPr/>
+        </p:nvSpPr>
+        <p:spPr>
+          <a:xfrm>
+            <a:off x="4663440" y="2743200"/>
             <a:ext cx="1920240" cy="731520"/>
           </a:xfrm>
           <a:prstGeom prst="rect">
@@ -21821,13 +21860,13 @@
       </p:sp>
       <p:sp>
         <p:nvSpPr>
-          <p:cNvPr id="12" name="Text 10"/>
-          <p:cNvSpPr/>
-          <p:nvPr/>
-        </p:nvSpPr>
-        <p:spPr>
-          <a:xfrm>
-            <a:off x="6583680" y="1737360"/>
+          <p:cNvPr id="13" name="Text 11"/>
+          <p:cNvSpPr/>
+          <p:nvPr/>
+        </p:nvSpPr>
+        <p:spPr>
+          <a:xfrm>
+            <a:off x="6583680" y="1920240"/>
             <a:ext cx="182880" cy="548640"/>
           </a:xfrm>
           <a:prstGeom prst="rect">
@@ -21860,13 +21899,13 @@
       </p:sp>
       <p:sp>
         <p:nvSpPr>
-          <p:cNvPr id="13" name="Text 11"/>
-          <p:cNvSpPr/>
-          <p:nvPr/>
-        </p:nvSpPr>
-        <p:spPr>
-          <a:xfrm>
-            <a:off x="6766560" y="1280160"/>
+          <p:cNvPr id="14" name="Text 12"/>
+          <p:cNvSpPr/>
+          <p:nvPr/>
+        </p:nvSpPr>
+        <p:spPr>
+          <a:xfrm>
+            <a:off x="6766560" y="1463040"/>
             <a:ext cx="1920240" cy="914400"/>
           </a:xfrm>
           <a:prstGeom prst="rect">
@@ -21899,13 +21938,13 @@
       </p:sp>
       <p:sp>
         <p:nvSpPr>
-          <p:cNvPr id="14" name="Text 12"/>
-          <p:cNvSpPr/>
-          <p:nvPr/>
-        </p:nvSpPr>
-        <p:spPr>
-          <a:xfrm>
-            <a:off x="6766560" y="2560320"/>
+          <p:cNvPr id="15" name="Text 13"/>
+          <p:cNvSpPr/>
+          <p:nvPr/>
+        </p:nvSpPr>
+        <p:spPr>
+          <a:xfrm>
+            <a:off x="6766560" y="2743200"/>
             <a:ext cx="1920240" cy="731520"/>
           </a:xfrm>
           <a:prstGeom prst="rect">

</xml_diff>

<commit_message>
Cut closing reference slides, add source attributions for PDF sharing
Closing pacing: Remove slides 65-67 (spectrum recap, toolkit table,
30-day challenge) — they broke emotional momentum between Level 5
climax and the callback/punchline. 71 → 68 slides.

Source attributions: Add subtle bottom-right source citations to all
stat slides (11pt muted) so claims remain credible when the deck
circulates as a PDF without speaker notes. Sources added to bigNum
helper via optional `source` parameter.

Co-Authored-By: Claude Opus 4.6 (1M context) <noreply@anthropic.com>
</commit_message>
<xml_diff>
--- a/Getting-Agents-to-Give-Up-Their-Secrets.pptx
+++ b/Getting-Agents-to-Give-Up-Their-Secrets.pptx
@@ -73,12 +73,9 @@
     <p:sldId id="321" r:id="rId67"/>
     <p:sldId id="322" r:id="rId68"/>
     <p:sldId id="323" r:id="rId69"/>
-    <p:sldId id="324" r:id="rId70"/>
-    <p:sldId id="325" r:id="rId71"/>
-    <p:sldId id="326" r:id="rId72"/>
   </p:sldIdLst>
   <p:notesMasterIdLst>
-    <p:notesMasterId r:id="rId73"/>
+    <p:notesMasterId r:id="rId70"/>
   </p:notesMasterIdLst>
   <p:sldSz cx="9144000" cy="5143500"/>
   <p:notesSz cx="5143500" cy="9144000"/>
@@ -6022,12 +6019,7 @@
           <a:p>
             <a:r>
               <a:rPr lang="en-US" dirty="0"/>
-              <a:t>Don't rush this — let the audience see how far they've come. The spectrum from slide 4 is now a journey they've completed.
-• AI Skeptic — Levels 0–1 got you past this
-• AI Questioner — Levels 2–3 got you past this
-• AI Viber — Level 4 got you past this
-• AI-First — Level 5 brought you here
-You walked in as a Questioner. This deck just showed you the path to AI-First. Transition: Here are the tools to keep going.</a:t>
+              <a:t>Emotional reset before the callback. Pause. Let the pacing shift.</a:t>
             </a:r>
             <a:endParaRPr lang="en-US" dirty="0"/>
           </a:p>
@@ -6115,12 +6107,7 @@
           <a:p>
             <a:r>
               <a:rPr lang="en-US" dirty="0"/>
-              <a:t>Practical, not exhaustive. Know which tool to try first for your role:
-• General purpose — ChatGPT, Claude, Gemini. Free tiers available. Start here.
-• In your workflow — Microsoft Copilot, Gemini in Workspace. Already in your work tools.
-• For developers — GitHub Copilot, Cursor, Claude Code. AI-first coding.
-• For connections — MCP servers, Zapier AI, custom integrations. Level 4–5 territory.
-Transition: Here's your challenge.</a:t>
+              <a:t>Callback to slide 2. The person who spent 45 minutes copy-pasting into ChatGPT. They learned to prompt with specificity (became a Viber, Levels 2–3). They let the agent find what it needed (started going AI-First, Level 4). They chained the whole workflow (full AI-First, Level 5). They were a Questioner who became AI-First. Transition: The punchline.</a:t>
             </a:r>
             <a:endParaRPr lang="en-US" dirty="0"/>
           </a:p>
@@ -6208,12 +6195,7 @@
           <a:p>
             <a:r>
               <a:rPr lang="en-US" dirty="0"/>
-              <a:t>One task. Four weeks. Four persona crossings.
-• Week 1 (Questioner) — Level 2. Specific, structured prompt. Compare to manual. Notice the phrasing difference.
-• Week 2 (Viber) — Level 3. Add context. Ask AI to ask clarifying questions. Notice the jump.
-• Week 3 (AI-First) — Level 4. Agent with connections. Let it pull context itself. Notice what it finds.
-• Week 4 (Orchestrator) — Level 5. Break into phases. Chain them. Compare to Week 1. You're orchestrating.
-Four weeks. One task. Same journey this deck just took you on. Most actionable takeaway. Transition: Let's come back to where we started.</a:t>
+              <a:t>The same task. Two minutes. That's the trick. Now you know it too. Let this land. Long pause. This is the emotional peak of the entire deck. Everything from slide 1 has been building to this moment. Transition: One final thought.</a:t>
             </a:r>
             <a:endParaRPr lang="en-US" dirty="0"/>
           </a:p>
@@ -6301,7 +6283,7 @@
           <a:p>
             <a:r>
               <a:rPr lang="en-US" dirty="0"/>
-              <a:t>Emotional reset before the callback. Pause. Let the pacing shift.</a:t>
+              <a:t>Clean exit. The secret was in knowing how to work with it. One task, this week — not 'transform everything.' Getting Agents to Give Up Their Secrets.</a:t>
             </a:r>
             <a:endParaRPr lang="en-US" dirty="0"/>
           </a:p>
@@ -6325,94 +6307,6 @@
             <a:fld id="{F7021451-1387-4CA6-816F-3879F97B5CBC}" type="slidenum">
               <a:rPr lang="en-US"/>
               <a:t>68</a:t>
-            </a:fld>
-            <a:endParaRPr lang="en-US"/>
-          </a:p>
-        </p:txBody>
-      </p:sp>
-    </p:spTree>
-    <p:extLst>
-      <p:ext uri="{BB962C8B-B14F-4D97-AF65-F5344CB8AC3E}">
-        <p14:creationId xmlns:p14="http://schemas.microsoft.com/office/powerpoint/2010/main" val="1024086991"/>
-      </p:ext>
-    </p:extLst>
-  </p:cSld>
-  <p:clrMapOvr>
-    <a:masterClrMapping/>
-  </p:clrMapOvr>
-</p:notes>
-</file>
-
-<file path=ppt/notesSlides/notesSlide69.xml><?xml version="1.0" encoding="utf-8"?>
-<p:notes xmlns:a="http://schemas.openxmlformats.org/drawingml/2006/main" xmlns:r="http://schemas.openxmlformats.org/officeDocument/2006/relationships" xmlns:p="http://schemas.openxmlformats.org/presentationml/2006/main">
-  <p:cSld>
-    <p:spTree>
-      <p:nvGrpSpPr>
-        <p:cNvPr id="1" name=""/>
-        <p:cNvGrpSpPr/>
-        <p:nvPr/>
-      </p:nvGrpSpPr>
-      <p:grpSpPr>
-        <a:xfrm>
-          <a:off x="0" y="0"/>
-          <a:ext cx="0" cy="0"/>
-          <a:chOff x="0" y="0"/>
-          <a:chExt cx="0" cy="0"/>
-        </a:xfrm>
-      </p:grpSpPr>
-      <p:sp>
-        <p:nvSpPr>
-          <p:cNvPr id="2" name="Slide Image Placeholder 1"/>
-          <p:cNvSpPr>
-            <a:spLocks noGrp="1" noRot="1" noChangeAspect="1"/>
-          </p:cNvSpPr>
-          <p:nvPr>
-            <p:ph type="sldImg"/>
-          </p:nvPr>
-        </p:nvSpPr>
-        <p:spPr/>
-      </p:sp>
-      <p:sp>
-        <p:nvSpPr>
-          <p:cNvPr id="3" name="Notes Placeholder 2"/>
-          <p:cNvSpPr>
-            <a:spLocks noGrp="1"/>
-          </p:cNvSpPr>
-          <p:nvPr>
-            <p:ph type="body" idx="1"/>
-          </p:nvPr>
-        </p:nvSpPr>
-        <p:spPr/>
-        <p:txBody>
-          <a:bodyPr/>
-          <a:lstStyle/>
-          <a:p>
-            <a:r>
-              <a:rPr lang="en-US" dirty="0"/>
-              <a:t>Callback to slide 2. The person who spent 45 minutes copy-pasting into ChatGPT. They learned to prompt with specificity (became a Viber, Levels 2–3). They let the agent find what it needed (started going AI-First, Level 4). They chained the whole workflow (full AI-First, Level 5). They were a Questioner who became AI-First. Transition: The punchline.</a:t>
-            </a:r>
-            <a:endParaRPr lang="en-US" dirty="0"/>
-          </a:p>
-        </p:txBody>
-      </p:sp>
-      <p:sp>
-        <p:nvSpPr>
-          <p:cNvPr id="4" name="Slide Number Placeholder 3"/>
-          <p:cNvSpPr>
-            <a:spLocks noGrp="1"/>
-          </p:cNvSpPr>
-          <p:nvPr>
-            <p:ph type="sldNum" sz="quarter" idx="10"/>
-          </p:nvPr>
-        </p:nvSpPr>
-        <p:spPr/>
-        <p:txBody>
-          <a:bodyPr/>
-          <a:lstStyle/>
-          <a:p>
-            <a:fld id="{F7021451-1387-4CA6-816F-3879F97B5CBC}" type="slidenum">
-              <a:rPr lang="en-US"/>
-              <a:t>69</a:t>
             </a:fld>
             <a:endParaRPr lang="en-US"/>
           </a:p>
@@ -6501,182 +6395,6 @@
             <a:fld id="{F7021451-1387-4CA6-816F-3879F97B5CBC}" type="slidenum">
               <a:rPr lang="en-US"/>
               <a:t>7</a:t>
-            </a:fld>
-            <a:endParaRPr lang="en-US"/>
-          </a:p>
-        </p:txBody>
-      </p:sp>
-    </p:spTree>
-    <p:extLst>
-      <p:ext uri="{BB962C8B-B14F-4D97-AF65-F5344CB8AC3E}">
-        <p14:creationId xmlns:p14="http://schemas.microsoft.com/office/powerpoint/2010/main" val="1024086991"/>
-      </p:ext>
-    </p:extLst>
-  </p:cSld>
-  <p:clrMapOvr>
-    <a:masterClrMapping/>
-  </p:clrMapOvr>
-</p:notes>
-</file>
-
-<file path=ppt/notesSlides/notesSlide70.xml><?xml version="1.0" encoding="utf-8"?>
-<p:notes xmlns:a="http://schemas.openxmlformats.org/drawingml/2006/main" xmlns:r="http://schemas.openxmlformats.org/officeDocument/2006/relationships" xmlns:p="http://schemas.openxmlformats.org/presentationml/2006/main">
-  <p:cSld>
-    <p:spTree>
-      <p:nvGrpSpPr>
-        <p:cNvPr id="1" name=""/>
-        <p:cNvGrpSpPr/>
-        <p:nvPr/>
-      </p:nvGrpSpPr>
-      <p:grpSpPr>
-        <a:xfrm>
-          <a:off x="0" y="0"/>
-          <a:ext cx="0" cy="0"/>
-          <a:chOff x="0" y="0"/>
-          <a:chExt cx="0" cy="0"/>
-        </a:xfrm>
-      </p:grpSpPr>
-      <p:sp>
-        <p:nvSpPr>
-          <p:cNvPr id="2" name="Slide Image Placeholder 1"/>
-          <p:cNvSpPr>
-            <a:spLocks noGrp="1" noRot="1" noChangeAspect="1"/>
-          </p:cNvSpPr>
-          <p:nvPr>
-            <p:ph type="sldImg"/>
-          </p:nvPr>
-        </p:nvSpPr>
-        <p:spPr/>
-      </p:sp>
-      <p:sp>
-        <p:nvSpPr>
-          <p:cNvPr id="3" name="Notes Placeholder 2"/>
-          <p:cNvSpPr>
-            <a:spLocks noGrp="1"/>
-          </p:cNvSpPr>
-          <p:nvPr>
-            <p:ph type="body" idx="1"/>
-          </p:nvPr>
-        </p:nvSpPr>
-        <p:spPr/>
-        <p:txBody>
-          <a:bodyPr/>
-          <a:lstStyle/>
-          <a:p>
-            <a:r>
-              <a:rPr lang="en-US" dirty="0"/>
-              <a:t>The same task. Two minutes. That's the trick. Now you know it too. Let this land. Long pause. This is the emotional peak of the entire deck. Everything from slide 1 has been building to this moment. Transition: One final thought.</a:t>
-            </a:r>
-            <a:endParaRPr lang="en-US" dirty="0"/>
-          </a:p>
-        </p:txBody>
-      </p:sp>
-      <p:sp>
-        <p:nvSpPr>
-          <p:cNvPr id="4" name="Slide Number Placeholder 3"/>
-          <p:cNvSpPr>
-            <a:spLocks noGrp="1"/>
-          </p:cNvSpPr>
-          <p:nvPr>
-            <p:ph type="sldNum" sz="quarter" idx="10"/>
-          </p:nvPr>
-        </p:nvSpPr>
-        <p:spPr/>
-        <p:txBody>
-          <a:bodyPr/>
-          <a:lstStyle/>
-          <a:p>
-            <a:fld id="{F7021451-1387-4CA6-816F-3879F97B5CBC}" type="slidenum">
-              <a:rPr lang="en-US"/>
-              <a:t>70</a:t>
-            </a:fld>
-            <a:endParaRPr lang="en-US"/>
-          </a:p>
-        </p:txBody>
-      </p:sp>
-    </p:spTree>
-    <p:extLst>
-      <p:ext uri="{BB962C8B-B14F-4D97-AF65-F5344CB8AC3E}">
-        <p14:creationId xmlns:p14="http://schemas.microsoft.com/office/powerpoint/2010/main" val="1024086991"/>
-      </p:ext>
-    </p:extLst>
-  </p:cSld>
-  <p:clrMapOvr>
-    <a:masterClrMapping/>
-  </p:clrMapOvr>
-</p:notes>
-</file>
-
-<file path=ppt/notesSlides/notesSlide71.xml><?xml version="1.0" encoding="utf-8"?>
-<p:notes xmlns:a="http://schemas.openxmlformats.org/drawingml/2006/main" xmlns:r="http://schemas.openxmlformats.org/officeDocument/2006/relationships" xmlns:p="http://schemas.openxmlformats.org/presentationml/2006/main">
-  <p:cSld>
-    <p:spTree>
-      <p:nvGrpSpPr>
-        <p:cNvPr id="1" name=""/>
-        <p:cNvGrpSpPr/>
-        <p:nvPr/>
-      </p:nvGrpSpPr>
-      <p:grpSpPr>
-        <a:xfrm>
-          <a:off x="0" y="0"/>
-          <a:ext cx="0" cy="0"/>
-          <a:chOff x="0" y="0"/>
-          <a:chExt cx="0" cy="0"/>
-        </a:xfrm>
-      </p:grpSpPr>
-      <p:sp>
-        <p:nvSpPr>
-          <p:cNvPr id="2" name="Slide Image Placeholder 1"/>
-          <p:cNvSpPr>
-            <a:spLocks noGrp="1" noRot="1" noChangeAspect="1"/>
-          </p:cNvSpPr>
-          <p:nvPr>
-            <p:ph type="sldImg"/>
-          </p:nvPr>
-        </p:nvSpPr>
-        <p:spPr/>
-      </p:sp>
-      <p:sp>
-        <p:nvSpPr>
-          <p:cNvPr id="3" name="Notes Placeholder 2"/>
-          <p:cNvSpPr>
-            <a:spLocks noGrp="1"/>
-          </p:cNvSpPr>
-          <p:nvPr>
-            <p:ph type="body" idx="1"/>
-          </p:nvPr>
-        </p:nvSpPr>
-        <p:spPr/>
-        <p:txBody>
-          <a:bodyPr/>
-          <a:lstStyle/>
-          <a:p>
-            <a:r>
-              <a:rPr lang="en-US" dirty="0"/>
-              <a:t>Clean exit. The secret was in knowing how to work with it. One task, this week — not 'transform everything.' Getting Agents to Give Up Their Secrets.</a:t>
-            </a:r>
-            <a:endParaRPr lang="en-US" dirty="0"/>
-          </a:p>
-        </p:txBody>
-      </p:sp>
-      <p:sp>
-        <p:nvSpPr>
-          <p:cNvPr id="4" name="Slide Number Placeholder 3"/>
-          <p:cNvSpPr>
-            <a:spLocks noGrp="1"/>
-          </p:cNvSpPr>
-          <p:nvPr>
-            <p:ph type="sldNum" sz="quarter" idx="10"/>
-          </p:nvPr>
-        </p:nvSpPr>
-        <p:spPr/>
-        <p:txBody>
-          <a:bodyPr/>
-          <a:lstStyle/>
-          <a:p>
-            <a:fld id="{F7021451-1387-4CA6-816F-3879F97B5CBC}" type="slidenum">
-              <a:rPr lang="en-US"/>
-              <a:t>71</a:t>
             </a:fld>
             <a:endParaRPr lang="en-US"/>
           </a:p>
@@ -11270,6 +10988,45 @@
           </a:p>
         </p:txBody>
       </p:sp>
+      <p:sp>
+        <p:nvSpPr>
+          <p:cNvPr id="5" name="Text 3"/>
+          <p:cNvSpPr/>
+          <p:nvPr/>
+        </p:nvSpPr>
+        <p:spPr>
+          <a:xfrm>
+            <a:off x="457200" y="4572000"/>
+            <a:ext cx="8229600" cy="365760"/>
+          </a:xfrm>
+          <a:prstGeom prst="rect">
+            <a:avLst/>
+          </a:prstGeom>
+          <a:noFill/>
+          <a:ln/>
+        </p:spPr>
+        <p:txBody>
+          <a:bodyPr wrap="square" lIns="0" tIns="0" rIns="0" bIns="0" rtlCol="0" anchor="b"/>
+          <a:lstStyle/>
+          <a:p>
+            <a:pPr algn="r" indent="0" marL="0">
+              <a:buNone/>
+            </a:pPr>
+            <a:r>
+              <a:rPr lang="en-US" sz="1100" dirty="0">
+                <a:solidFill>
+                  <a:srgbClr val="94A3B8"/>
+                </a:solidFill>
+                <a:latin typeface="Calibri" pitchFamily="34" charset="0"/>
+                <a:ea typeface="Calibri" pitchFamily="34" charset="-122"/>
+                <a:cs typeface="Calibri" pitchFamily="34" charset="-120"/>
+              </a:rPr>
+              <a:t>Second Talent</a:t>
+            </a:r>
+            <a:endParaRPr lang="en-US" sz="1100" dirty="0"/>
+          </a:p>
+        </p:txBody>
+      </p:sp>
     </p:spTree>
   </p:cSld>
   <p:clrMapOvr>
@@ -11436,6 +11193,45 @@
           </a:p>
         </p:txBody>
       </p:sp>
+      <p:sp>
+        <p:nvSpPr>
+          <p:cNvPr id="5" name="Text 3"/>
+          <p:cNvSpPr/>
+          <p:nvPr/>
+        </p:nvSpPr>
+        <p:spPr>
+          <a:xfrm>
+            <a:off x="457200" y="4572000"/>
+            <a:ext cx="8229600" cy="365760"/>
+          </a:xfrm>
+          <a:prstGeom prst="rect">
+            <a:avLst/>
+          </a:prstGeom>
+          <a:noFill/>
+          <a:ln/>
+        </p:spPr>
+        <p:txBody>
+          <a:bodyPr wrap="square" lIns="0" tIns="0" rIns="0" bIns="0" rtlCol="0" anchor="b"/>
+          <a:lstStyle/>
+          <a:p>
+            <a:pPr algn="r" indent="0" marL="0">
+              <a:buNone/>
+            </a:pPr>
+            <a:r>
+              <a:rPr lang="en-US" sz="1100" dirty="0">
+                <a:solidFill>
+                  <a:srgbClr val="94A3B8"/>
+                </a:solidFill>
+                <a:latin typeface="Calibri" pitchFamily="34" charset="0"/>
+                <a:ea typeface="Calibri" pitchFamily="34" charset="-122"/>
+                <a:cs typeface="Calibri" pitchFamily="34" charset="-120"/>
+              </a:rPr>
+              <a:t>Addy Osmani</a:t>
+            </a:r>
+            <a:endParaRPr lang="en-US" sz="1100" dirty="0"/>
+          </a:p>
+        </p:txBody>
+      </p:sp>
     </p:spTree>
   </p:cSld>
   <p:clrMapOvr>
@@ -11839,6 +11635,45 @@
           </a:p>
         </p:txBody>
       </p:sp>
+      <p:sp>
+        <p:nvSpPr>
+          <p:cNvPr id="5" name="Text 3"/>
+          <p:cNvSpPr/>
+          <p:nvPr/>
+        </p:nvSpPr>
+        <p:spPr>
+          <a:xfrm>
+            <a:off x="457200" y="4572000"/>
+            <a:ext cx="8229600" cy="365760"/>
+          </a:xfrm>
+          <a:prstGeom prst="rect">
+            <a:avLst/>
+          </a:prstGeom>
+          <a:noFill/>
+          <a:ln/>
+        </p:spPr>
+        <p:txBody>
+          <a:bodyPr wrap="square" lIns="0" tIns="0" rIns="0" bIns="0" rtlCol="0" anchor="b"/>
+          <a:lstStyle/>
+          <a:p>
+            <a:pPr algn="r" indent="0" marL="0">
+              <a:buNone/>
+            </a:pPr>
+            <a:r>
+              <a:rPr lang="en-US" sz="1100" dirty="0">
+                <a:solidFill>
+                  <a:srgbClr val="94A3B8"/>
+                </a:solidFill>
+                <a:latin typeface="Calibri" pitchFamily="34" charset="0"/>
+                <a:ea typeface="Calibri" pitchFamily="34" charset="-122"/>
+                <a:cs typeface="Calibri" pitchFamily="34" charset="-120"/>
+              </a:rPr>
+              <a:t>Microsoft Q2 2026 earnings</a:t>
+            </a:r>
+            <a:endParaRPr lang="en-US" sz="1100" dirty="0"/>
+          </a:p>
+        </p:txBody>
+      </p:sp>
     </p:spTree>
   </p:cSld>
   <p:clrMapOvr>
@@ -20648,6 +20483,45 @@
           </a:p>
         </p:txBody>
       </p:sp>
+      <p:sp>
+        <p:nvSpPr>
+          <p:cNvPr id="5" name="Text 3"/>
+          <p:cNvSpPr/>
+          <p:nvPr/>
+        </p:nvSpPr>
+        <p:spPr>
+          <a:xfrm>
+            <a:off x="457200" y="4572000"/>
+            <a:ext cx="8229600" cy="365760"/>
+          </a:xfrm>
+          <a:prstGeom prst="rect">
+            <a:avLst/>
+          </a:prstGeom>
+          <a:noFill/>
+          <a:ln/>
+        </p:spPr>
+        <p:txBody>
+          <a:bodyPr wrap="square" lIns="0" tIns="0" rIns="0" bIns="0" rtlCol="0" anchor="b"/>
+          <a:lstStyle/>
+          <a:p>
+            <a:pPr algn="r" indent="0" marL="0">
+              <a:buNone/>
+            </a:pPr>
+            <a:r>
+              <a:rPr lang="en-US" sz="1100" dirty="0">
+                <a:solidFill>
+                  <a:srgbClr val="94A3B8"/>
+                </a:solidFill>
+                <a:latin typeface="Calibri" pitchFamily="34" charset="0"/>
+                <a:ea typeface="Calibri" pitchFamily="34" charset="-122"/>
+                <a:cs typeface="Calibri" pitchFamily="34" charset="-120"/>
+              </a:rPr>
+              <a:t>DataReportal 2026</a:t>
+            </a:r>
+            <a:endParaRPr lang="en-US" sz="1100" dirty="0"/>
+          </a:p>
+        </p:txBody>
+      </p:sp>
     </p:spTree>
   </p:cSld>
   <p:clrMapOvr>
@@ -21135,6 +21009,45 @@
           </a:p>
         </p:txBody>
       </p:sp>
+      <p:sp>
+        <p:nvSpPr>
+          <p:cNvPr id="5" name="Text 3"/>
+          <p:cNvSpPr/>
+          <p:nvPr/>
+        </p:nvSpPr>
+        <p:spPr>
+          <a:xfrm>
+            <a:off x="457200" y="4572000"/>
+            <a:ext cx="8229600" cy="365760"/>
+          </a:xfrm>
+          <a:prstGeom prst="rect">
+            <a:avLst/>
+          </a:prstGeom>
+          <a:noFill/>
+          <a:ln/>
+        </p:spPr>
+        <p:txBody>
+          <a:bodyPr wrap="square" lIns="0" tIns="0" rIns="0" bIns="0" rtlCol="0" anchor="b"/>
+          <a:lstStyle/>
+          <a:p>
+            <a:pPr algn="r" indent="0" marL="0">
+              <a:buNone/>
+            </a:pPr>
+            <a:r>
+              <a:rPr lang="en-US" sz="1100" dirty="0">
+                <a:solidFill>
+                  <a:srgbClr val="94A3B8"/>
+                </a:solidFill>
+                <a:latin typeface="Calibri" pitchFamily="34" charset="0"/>
+                <a:ea typeface="Calibri" pitchFamily="34" charset="-122"/>
+                <a:cs typeface="Calibri" pitchFamily="34" charset="-120"/>
+              </a:rPr>
+              <a:t>Illustrative estimate</a:t>
+            </a:r>
+            <a:endParaRPr lang="en-US" sz="1100" dirty="0"/>
+          </a:p>
+        </p:txBody>
+      </p:sp>
     </p:spTree>
   </p:cSld>
   <p:clrMapOvr>
@@ -21495,8 +21408,8 @@
         </p:nvSpPr>
         <p:spPr>
           <a:xfrm>
-            <a:off x="914400" y="365760"/>
-            <a:ext cx="7315200" cy="731520"/>
+            <a:off x="1371600" y="1828800"/>
+            <a:ext cx="6400800" cy="1463040"/>
           </a:xfrm>
           <a:prstGeom prst="rect">
             <a:avLst/>
@@ -21512,466 +21425,17 @@
               <a:buNone/>
             </a:pPr>
             <a:r>
-              <a:rPr lang="en-US" sz="3600" b="1" dirty="0">
-                <a:solidFill>
-                  <a:srgbClr val="FFFFFF"/>
+              <a:rPr lang="en-US" sz="2800" i="1" dirty="0">
+                <a:solidFill>
+                  <a:srgbClr val="00B4D8"/>
                 </a:solidFill>
                 <a:latin typeface="Georgia" pitchFamily="34" charset="0"/>
                 <a:ea typeface="Georgia" pitchFamily="34" charset="-122"/>
                 <a:cs typeface="Georgia" pitchFamily="34" charset="-120"/>
               </a:rPr>
-              <a:t>Look how far you've come.</a:t>
-            </a:r>
-            <a:endParaRPr lang="en-US" sz="3600" dirty="0"/>
-          </a:p>
-        </p:txBody>
-      </p:sp>
-      <p:sp>
-        <p:nvSpPr>
-          <p:cNvPr id="4" name="Shape 2"/>
-          <p:cNvSpPr/>
-          <p:nvPr/>
-        </p:nvSpPr>
-        <p:spPr>
-          <a:xfrm>
-            <a:off x="457200" y="2560320"/>
-            <a:ext cx="8229600" cy="54864"/>
-          </a:xfrm>
-          <a:prstGeom prst="rect">
-            <a:avLst/>
-          </a:prstGeom>
-          <a:solidFill>
-            <a:srgbClr val="00B4D8"/>
-          </a:solidFill>
-          <a:ln/>
-        </p:spPr>
-      </p:sp>
-      <p:sp>
-        <p:nvSpPr>
-          <p:cNvPr id="5" name="Text 3"/>
-          <p:cNvSpPr/>
-          <p:nvPr/>
-        </p:nvSpPr>
-        <p:spPr>
-          <a:xfrm>
-            <a:off x="457200" y="1463040"/>
-            <a:ext cx="1920240" cy="914400"/>
-          </a:xfrm>
-          <a:prstGeom prst="rect">
-            <a:avLst/>
-          </a:prstGeom>
-          <a:noFill/>
-          <a:ln/>
-        </p:spPr>
-        <p:txBody>
-          <a:bodyPr wrap="square" lIns="0" tIns="0" rIns="0" bIns="0" rtlCol="0" anchor="b"/>
-          <a:lstStyle/>
-          <a:p>
-            <a:pPr algn="ctr" indent="0" marL="0">
-              <a:buNone/>
-            </a:pPr>
-            <a:r>
-              <a:rPr lang="en-US" sz="2200" b="1" dirty="0">
-                <a:solidFill>
-                  <a:srgbClr val="9CA3AF"/>
-                </a:solidFill>
-                <a:latin typeface="Georgia" pitchFamily="34" charset="0"/>
-                <a:ea typeface="Georgia" pitchFamily="34" charset="-122"/>
-                <a:cs typeface="Georgia" pitchFamily="34" charset="-120"/>
-              </a:rPr>
-              <a:t>AI Skeptic</a:t>
-            </a:r>
-            <a:endParaRPr lang="en-US" sz="2200" dirty="0"/>
-          </a:p>
-        </p:txBody>
-      </p:sp>
-      <p:sp>
-        <p:nvSpPr>
-          <p:cNvPr id="6" name="Text 4"/>
-          <p:cNvSpPr/>
-          <p:nvPr/>
-        </p:nvSpPr>
-        <p:spPr>
-          <a:xfrm>
-            <a:off x="457200" y="2743200"/>
-            <a:ext cx="1920240" cy="731520"/>
-          </a:xfrm>
-          <a:prstGeom prst="rect">
-            <a:avLst/>
-          </a:prstGeom>
-          <a:noFill/>
-          <a:ln/>
-        </p:spPr>
-        <p:txBody>
-          <a:bodyPr wrap="square" lIns="0" tIns="0" rIns="0" bIns="0" rtlCol="0" anchor="t"/>
-          <a:lstStyle/>
-          <a:p>
-            <a:pPr algn="ctr" indent="0" marL="0">
-              <a:buNone/>
-            </a:pPr>
-            <a:r>
-              <a:rPr lang="en-US" sz="2000" i="1" dirty="0">
-                <a:solidFill>
-                  <a:srgbClr val="9CA3AF"/>
-                </a:solidFill>
-                <a:latin typeface="Calibri" pitchFamily="34" charset="0"/>
-                <a:ea typeface="Calibri" pitchFamily="34" charset="-122"/>
-                <a:cs typeface="Calibri" pitchFamily="34" charset="-120"/>
-              </a:rPr>
-              <a:t>Levels 0–1</a:t>
-            </a:r>
-            <a:endParaRPr lang="en-US" sz="2000" dirty="0"/>
-          </a:p>
-        </p:txBody>
-      </p:sp>
-      <p:sp>
-        <p:nvSpPr>
-          <p:cNvPr id="7" name="Text 5"/>
-          <p:cNvSpPr/>
-          <p:nvPr/>
-        </p:nvSpPr>
-        <p:spPr>
-          <a:xfrm>
-            <a:off x="2377440" y="1920240"/>
-            <a:ext cx="182880" cy="548640"/>
-          </a:xfrm>
-          <a:prstGeom prst="rect">
-            <a:avLst/>
-          </a:prstGeom>
-          <a:noFill/>
-          <a:ln/>
-        </p:spPr>
-        <p:txBody>
-          <a:bodyPr wrap="square" lIns="0" tIns="0" rIns="0" bIns="0" rtlCol="0" anchor="ctr"/>
-          <a:lstStyle/>
-          <a:p>
-            <a:pPr algn="ctr" indent="0" marL="0">
-              <a:buNone/>
-            </a:pPr>
-            <a:r>
-              <a:rPr lang="en-US" sz="2800" dirty="0">
-                <a:solidFill>
-                  <a:srgbClr val="00B4D8"/>
-                </a:solidFill>
-                <a:latin typeface="Calibri" pitchFamily="34" charset="0"/>
-                <a:ea typeface="Calibri" pitchFamily="34" charset="-122"/>
-                <a:cs typeface="Calibri" pitchFamily="34" charset="-120"/>
-              </a:rPr>
-              <a:t>→</a:t>
+              <a:t>Let's come back to where we started.</a:t>
             </a:r>
             <a:endParaRPr lang="en-US" sz="2800" dirty="0"/>
-          </a:p>
-        </p:txBody>
-      </p:sp>
-      <p:sp>
-        <p:nvSpPr>
-          <p:cNvPr id="8" name="Text 6"/>
-          <p:cNvSpPr/>
-          <p:nvPr/>
-        </p:nvSpPr>
-        <p:spPr>
-          <a:xfrm>
-            <a:off x="2560320" y="1463040"/>
-            <a:ext cx="1920240" cy="914400"/>
-          </a:xfrm>
-          <a:prstGeom prst="rect">
-            <a:avLst/>
-          </a:prstGeom>
-          <a:noFill/>
-          <a:ln/>
-        </p:spPr>
-        <p:txBody>
-          <a:bodyPr wrap="square" lIns="0" tIns="0" rIns="0" bIns="0" rtlCol="0" anchor="b"/>
-          <a:lstStyle/>
-          <a:p>
-            <a:pPr algn="ctr" indent="0" marL="0">
-              <a:buNone/>
-            </a:pPr>
-            <a:r>
-              <a:rPr lang="en-US" sz="2200" b="1" dirty="0">
-                <a:solidFill>
-                  <a:srgbClr val="6B7280"/>
-                </a:solidFill>
-                <a:latin typeface="Georgia" pitchFamily="34" charset="0"/>
-                <a:ea typeface="Georgia" pitchFamily="34" charset="-122"/>
-                <a:cs typeface="Georgia" pitchFamily="34" charset="-120"/>
-              </a:rPr>
-              <a:t>AI Questioner</a:t>
-            </a:r>
-            <a:endParaRPr lang="en-US" sz="2200" dirty="0"/>
-          </a:p>
-        </p:txBody>
-      </p:sp>
-      <p:sp>
-        <p:nvSpPr>
-          <p:cNvPr id="9" name="Text 7"/>
-          <p:cNvSpPr/>
-          <p:nvPr/>
-        </p:nvSpPr>
-        <p:spPr>
-          <a:xfrm>
-            <a:off x="2560320" y="2743200"/>
-            <a:ext cx="1920240" cy="731520"/>
-          </a:xfrm>
-          <a:prstGeom prst="rect">
-            <a:avLst/>
-          </a:prstGeom>
-          <a:noFill/>
-          <a:ln/>
-        </p:spPr>
-        <p:txBody>
-          <a:bodyPr wrap="square" lIns="0" tIns="0" rIns="0" bIns="0" rtlCol="0" anchor="t"/>
-          <a:lstStyle/>
-          <a:p>
-            <a:pPr algn="ctr" indent="0" marL="0">
-              <a:buNone/>
-            </a:pPr>
-            <a:r>
-              <a:rPr lang="en-US" sz="2000" i="1" dirty="0">
-                <a:solidFill>
-                  <a:srgbClr val="6B7280"/>
-                </a:solidFill>
-                <a:latin typeface="Calibri" pitchFamily="34" charset="0"/>
-                <a:ea typeface="Calibri" pitchFamily="34" charset="-122"/>
-                <a:cs typeface="Calibri" pitchFamily="34" charset="-120"/>
-              </a:rPr>
-              <a:t>Levels 2–3</a:t>
-            </a:r>
-            <a:endParaRPr lang="en-US" sz="2000" dirty="0"/>
-          </a:p>
-        </p:txBody>
-      </p:sp>
-      <p:sp>
-        <p:nvSpPr>
-          <p:cNvPr id="10" name="Text 8"/>
-          <p:cNvSpPr/>
-          <p:nvPr/>
-        </p:nvSpPr>
-        <p:spPr>
-          <a:xfrm>
-            <a:off x="4480560" y="1920240"/>
-            <a:ext cx="182880" cy="548640"/>
-          </a:xfrm>
-          <a:prstGeom prst="rect">
-            <a:avLst/>
-          </a:prstGeom>
-          <a:noFill/>
-          <a:ln/>
-        </p:spPr>
-        <p:txBody>
-          <a:bodyPr wrap="square" lIns="0" tIns="0" rIns="0" bIns="0" rtlCol="0" anchor="ctr"/>
-          <a:lstStyle/>
-          <a:p>
-            <a:pPr algn="ctr" indent="0" marL="0">
-              <a:buNone/>
-            </a:pPr>
-            <a:r>
-              <a:rPr lang="en-US" sz="2800" dirty="0">
-                <a:solidFill>
-                  <a:srgbClr val="00B4D8"/>
-                </a:solidFill>
-                <a:latin typeface="Calibri" pitchFamily="34" charset="0"/>
-                <a:ea typeface="Calibri" pitchFamily="34" charset="-122"/>
-                <a:cs typeface="Calibri" pitchFamily="34" charset="-120"/>
-              </a:rPr>
-              <a:t>→</a:t>
-            </a:r>
-            <a:endParaRPr lang="en-US" sz="2800" dirty="0"/>
-          </a:p>
-        </p:txBody>
-      </p:sp>
-      <p:sp>
-        <p:nvSpPr>
-          <p:cNvPr id="11" name="Text 9"/>
-          <p:cNvSpPr/>
-          <p:nvPr/>
-        </p:nvSpPr>
-        <p:spPr>
-          <a:xfrm>
-            <a:off x="4663440" y="1463040"/>
-            <a:ext cx="1920240" cy="914400"/>
-          </a:xfrm>
-          <a:prstGeom prst="rect">
-            <a:avLst/>
-          </a:prstGeom>
-          <a:noFill/>
-          <a:ln/>
-        </p:spPr>
-        <p:txBody>
-          <a:bodyPr wrap="square" lIns="0" tIns="0" rIns="0" bIns="0" rtlCol="0" anchor="b"/>
-          <a:lstStyle/>
-          <a:p>
-            <a:pPr algn="ctr" indent="0" marL="0">
-              <a:buNone/>
-            </a:pPr>
-            <a:r>
-              <a:rPr lang="en-US" sz="2200" b="1" dirty="0">
-                <a:solidFill>
-                  <a:srgbClr val="00B4D8"/>
-                </a:solidFill>
-                <a:latin typeface="Georgia" pitchFamily="34" charset="0"/>
-                <a:ea typeface="Georgia" pitchFamily="34" charset="-122"/>
-                <a:cs typeface="Georgia" pitchFamily="34" charset="-120"/>
-              </a:rPr>
-              <a:t>AI Viber</a:t>
-            </a:r>
-            <a:endParaRPr lang="en-US" sz="2200" dirty="0"/>
-          </a:p>
-        </p:txBody>
-      </p:sp>
-      <p:sp>
-        <p:nvSpPr>
-          <p:cNvPr id="12" name="Text 10"/>
-          <p:cNvSpPr/>
-          <p:nvPr/>
-        </p:nvSpPr>
-        <p:spPr>
-          <a:xfrm>
-            <a:off x="4663440" y="2743200"/>
-            <a:ext cx="1920240" cy="731520"/>
-          </a:xfrm>
-          <a:prstGeom prst="rect">
-            <a:avLst/>
-          </a:prstGeom>
-          <a:noFill/>
-          <a:ln/>
-        </p:spPr>
-        <p:txBody>
-          <a:bodyPr wrap="square" lIns="0" tIns="0" rIns="0" bIns="0" rtlCol="0" anchor="t"/>
-          <a:lstStyle/>
-          <a:p>
-            <a:pPr algn="ctr" indent="0" marL="0">
-              <a:buNone/>
-            </a:pPr>
-            <a:r>
-              <a:rPr lang="en-US" sz="2000" i="1" dirty="0">
-                <a:solidFill>
-                  <a:srgbClr val="00B4D8"/>
-                </a:solidFill>
-                <a:latin typeface="Calibri" pitchFamily="34" charset="0"/>
-                <a:ea typeface="Calibri" pitchFamily="34" charset="-122"/>
-                <a:cs typeface="Calibri" pitchFamily="34" charset="-120"/>
-              </a:rPr>
-              <a:t>Level 4</a:t>
-            </a:r>
-            <a:endParaRPr lang="en-US" sz="2000" dirty="0"/>
-          </a:p>
-        </p:txBody>
-      </p:sp>
-      <p:sp>
-        <p:nvSpPr>
-          <p:cNvPr id="13" name="Text 11"/>
-          <p:cNvSpPr/>
-          <p:nvPr/>
-        </p:nvSpPr>
-        <p:spPr>
-          <a:xfrm>
-            <a:off x="6583680" y="1920240"/>
-            <a:ext cx="182880" cy="548640"/>
-          </a:xfrm>
-          <a:prstGeom prst="rect">
-            <a:avLst/>
-          </a:prstGeom>
-          <a:noFill/>
-          <a:ln/>
-        </p:spPr>
-        <p:txBody>
-          <a:bodyPr wrap="square" lIns="0" tIns="0" rIns="0" bIns="0" rtlCol="0" anchor="ctr"/>
-          <a:lstStyle/>
-          <a:p>
-            <a:pPr algn="ctr" indent="0" marL="0">
-              <a:buNone/>
-            </a:pPr>
-            <a:r>
-              <a:rPr lang="en-US" sz="2800" dirty="0">
-                <a:solidFill>
-                  <a:srgbClr val="00B4D8"/>
-                </a:solidFill>
-                <a:latin typeface="Calibri" pitchFamily="34" charset="0"/>
-                <a:ea typeface="Calibri" pitchFamily="34" charset="-122"/>
-                <a:cs typeface="Calibri" pitchFamily="34" charset="-120"/>
-              </a:rPr>
-              <a:t>→</a:t>
-            </a:r>
-            <a:endParaRPr lang="en-US" sz="2800" dirty="0"/>
-          </a:p>
-        </p:txBody>
-      </p:sp>
-      <p:sp>
-        <p:nvSpPr>
-          <p:cNvPr id="14" name="Text 12"/>
-          <p:cNvSpPr/>
-          <p:nvPr/>
-        </p:nvSpPr>
-        <p:spPr>
-          <a:xfrm>
-            <a:off x="6766560" y="1463040"/>
-            <a:ext cx="1920240" cy="914400"/>
-          </a:xfrm>
-          <a:prstGeom prst="rect">
-            <a:avLst/>
-          </a:prstGeom>
-          <a:noFill/>
-          <a:ln/>
-        </p:spPr>
-        <p:txBody>
-          <a:bodyPr wrap="square" lIns="0" tIns="0" rIns="0" bIns="0" rtlCol="0" anchor="b"/>
-          <a:lstStyle/>
-          <a:p>
-            <a:pPr algn="ctr" indent="0" marL="0">
-              <a:buNone/>
-            </a:pPr>
-            <a:r>
-              <a:rPr lang="en-US" sz="2200" b="1" dirty="0">
-                <a:solidFill>
-                  <a:srgbClr val="00B4D8"/>
-                </a:solidFill>
-                <a:latin typeface="Georgia" pitchFamily="34" charset="0"/>
-                <a:ea typeface="Georgia" pitchFamily="34" charset="-122"/>
-                <a:cs typeface="Georgia" pitchFamily="34" charset="-120"/>
-              </a:rPr>
-              <a:t>AI-First</a:t>
-            </a:r>
-            <a:endParaRPr lang="en-US" sz="2200" dirty="0"/>
-          </a:p>
-        </p:txBody>
-      </p:sp>
-      <p:sp>
-        <p:nvSpPr>
-          <p:cNvPr id="15" name="Text 13"/>
-          <p:cNvSpPr/>
-          <p:nvPr/>
-        </p:nvSpPr>
-        <p:spPr>
-          <a:xfrm>
-            <a:off x="6766560" y="2743200"/>
-            <a:ext cx="1920240" cy="731520"/>
-          </a:xfrm>
-          <a:prstGeom prst="rect">
-            <a:avLst/>
-          </a:prstGeom>
-          <a:noFill/>
-          <a:ln/>
-        </p:spPr>
-        <p:txBody>
-          <a:bodyPr wrap="square" lIns="0" tIns="0" rIns="0" bIns="0" rtlCol="0" anchor="t"/>
-          <a:lstStyle/>
-          <a:p>
-            <a:pPr algn="ctr" indent="0" marL="0">
-              <a:buNone/>
-            </a:pPr>
-            <a:r>
-              <a:rPr lang="en-US" sz="2000" i="1" dirty="0">
-                <a:solidFill>
-                  <a:srgbClr val="00B4D8"/>
-                </a:solidFill>
-                <a:latin typeface="Calibri" pitchFamily="34" charset="0"/>
-                <a:ea typeface="Calibri" pitchFamily="34" charset="-122"/>
-                <a:cs typeface="Calibri" pitchFamily="34" charset="-120"/>
-              </a:rPr>
-              <a:t>Level 5</a:t>
-            </a:r>
-            <a:endParaRPr lang="en-US" sz="2000" dirty="0"/>
           </a:p>
         </p:txBody>
       </p:sp>
@@ -22037,8 +21501,8 @@
         </p:nvSpPr>
         <p:spPr>
           <a:xfrm>
-            <a:off x="457200" y="365760"/>
-            <a:ext cx="8229600" cy="731520"/>
+            <a:off x="914400" y="1097280"/>
+            <a:ext cx="7315200" cy="2560320"/>
           </a:xfrm>
           <a:prstGeom prst="rect">
             <a:avLst/>
@@ -22054,7 +21518,7 @@
               <a:buNone/>
             </a:pPr>
             <a:r>
-              <a:rPr lang="en-US" sz="4400" b="1" dirty="0">
+              <a:rPr lang="en-US" sz="4800" b="1" dirty="0">
                 <a:solidFill>
                   <a:srgbClr val="FFFFFF"/>
                 </a:solidFill>
@@ -22062,1037 +21526,29 @@
                 <a:ea typeface="Georgia" pitchFamily="34" charset="-122"/>
                 <a:cs typeface="Georgia" pitchFamily="34" charset="-120"/>
               </a:rPr>
-              <a:t>Your AI Toolkit</a:t>
-            </a:r>
-            <a:endParaRPr lang="en-US" sz="4400" dirty="0"/>
-          </a:p>
-        </p:txBody>
-      </p:sp>
-      <p:graphicFrame>
-        <p:nvGraphicFramePr>
-          <p:cNvPr id="67" name="Table 0"/>
-          <p:cNvGraphicFramePr>
-            <a:graphicFrameLocks noGrp="1"/>
-          </p:cNvGraphicFramePr>
-          <p:nvPr>
-            <p:extLst>
-              <p:ext uri="{D42A27DB-BD31-4B8C-83A1-F6EECF244321}">
-                <p14:modId xmlns:p14="http://schemas.microsoft.com/office/powerpoint/2010/main" val="1579011935"/>
-              </p:ext>
-            </p:extLst>
-          </p:nvPr>
-        </p:nvGraphicFramePr>
-        <p:xfrm>
-          <a:off x="457200" y="1280160"/>
-          <a:ext cx="8229600" cy="914400"/>
-        </p:xfrm>
-        <a:graphic>
-          <a:graphicData uri="http://schemas.openxmlformats.org/drawingml/2006/table">
-            <a:tbl>
-              <a:tblPr/>
-              <a:tblGrid>
-                <a:gridCol w="2011680"/>
-                <a:gridCol w="3474720"/>
-                <a:gridCol w="2743200"/>
-              </a:tblGrid>
-              <a:tr h="548640">
-                <a:tc>
-                  <a:txBody>
-                    <a:bodyPr/>
-                    <a:lstStyle/>
-                    <a:p>
-                      <a:pPr indent="0" marL="0">
-                        <a:buNone/>
-                      </a:pPr>
-                      <a:r>
-                        <a:rPr lang="en-US" sz="2000" b="1" dirty="0">
-                          <a:solidFill>
-                            <a:srgbClr val="FFFFFF"/>
-                          </a:solidFill>
-                          <a:latin typeface="Calibri" pitchFamily="34" charset="0"/>
-                          <a:ea typeface="Calibri" pitchFamily="34" charset="-122"/>
-                          <a:cs typeface="Calibri" pitchFamily="34" charset="-120"/>
-                        </a:rPr>
-                        <a:t>Category</a:t>
-                      </a:r>
-                      <a:endParaRPr lang="en-US" sz="2000" dirty="0">
-                        <a:latin typeface="Calibri" charset="0"/>
-                        <a:ea typeface="Calibri" charset="0"/>
-                        <a:cs typeface="Calibri" charset="0"/>
-                      </a:endParaRPr>
-                    </a:p>
-                  </a:txBody>
-                  <a:tcPr marL="91440" marR="91440" marT="45720" marB="45720">
-                    <a:lnL w="12700" cap="flat" cmpd="sng" algn="ctr">
-                      <a:solidFill>
-                        <a:srgbClr val="3A3A5E"/>
-                      </a:solidFill>
-                      <a:prstDash val="solid"/>
-                      <a:round/>
-                      <a:headEnd type="none" w="med" len="med"/>
-                      <a:tailEnd type="none" w="med" len="med"/>
-                    </a:lnL>
-                    <a:lnR w="12700" cap="flat" cmpd="sng" algn="ctr">
-                      <a:solidFill>
-                        <a:srgbClr val="3A3A5E"/>
-                      </a:solidFill>
-                      <a:prstDash val="solid"/>
-                      <a:round/>
-                      <a:headEnd type="none" w="med" len="med"/>
-                      <a:tailEnd type="none" w="med" len="med"/>
-                    </a:lnR>
-                    <a:lnT w="12700" cap="flat" cmpd="sng" algn="ctr">
-                      <a:solidFill>
-                        <a:srgbClr val="3A3A5E"/>
-                      </a:solidFill>
-                      <a:prstDash val="solid"/>
-                      <a:round/>
-                      <a:headEnd type="none" w="med" len="med"/>
-                      <a:tailEnd type="none" w="med" len="med"/>
-                    </a:lnT>
-                    <a:lnB w="12700" cap="flat" cmpd="sng" algn="ctr">
-                      <a:solidFill>
-                        <a:srgbClr val="3A3A5E"/>
-                      </a:solidFill>
-                      <a:prstDash val="solid"/>
-                      <a:round/>
-                      <a:headEnd type="none" w="med" len="med"/>
-                      <a:tailEnd type="none" w="med" len="med"/>
-                    </a:lnB>
-                    <a:solidFill>
-                      <a:srgbClr val="00B4D8"/>
-                    </a:solidFill>
-                  </a:tcPr>
-                </a:tc>
-                <a:tc>
-                  <a:txBody>
-                    <a:bodyPr/>
-                    <a:lstStyle/>
-                    <a:p>
-                      <a:pPr indent="0" marL="0">
-                        <a:buNone/>
-                      </a:pPr>
-                      <a:r>
-                        <a:rPr lang="en-US" sz="2000" b="1" dirty="0">
-                          <a:solidFill>
-                            <a:srgbClr val="FFFFFF"/>
-                          </a:solidFill>
-                          <a:latin typeface="Calibri" pitchFamily="34" charset="0"/>
-                          <a:ea typeface="Calibri" pitchFamily="34" charset="-122"/>
-                          <a:cs typeface="Calibri" pitchFamily="34" charset="-120"/>
-                        </a:rPr>
-                        <a:t>Tools</a:t>
-                      </a:r>
-                      <a:endParaRPr lang="en-US" sz="2000" dirty="0">
-                        <a:latin typeface="Calibri" charset="0"/>
-                        <a:ea typeface="Calibri" charset="0"/>
-                        <a:cs typeface="Calibri" charset="0"/>
-                      </a:endParaRPr>
-                    </a:p>
-                  </a:txBody>
-                  <a:tcPr marL="91440" marR="91440" marT="45720" marB="45720">
-                    <a:lnL w="12700" cap="flat" cmpd="sng" algn="ctr">
-                      <a:solidFill>
-                        <a:srgbClr val="3A3A5E"/>
-                      </a:solidFill>
-                      <a:prstDash val="solid"/>
-                      <a:round/>
-                      <a:headEnd type="none" w="med" len="med"/>
-                      <a:tailEnd type="none" w="med" len="med"/>
-                    </a:lnL>
-                    <a:lnR w="12700" cap="flat" cmpd="sng" algn="ctr">
-                      <a:solidFill>
-                        <a:srgbClr val="3A3A5E"/>
-                      </a:solidFill>
-                      <a:prstDash val="solid"/>
-                      <a:round/>
-                      <a:headEnd type="none" w="med" len="med"/>
-                      <a:tailEnd type="none" w="med" len="med"/>
-                    </a:lnR>
-                    <a:lnT w="12700" cap="flat" cmpd="sng" algn="ctr">
-                      <a:solidFill>
-                        <a:srgbClr val="3A3A5E"/>
-                      </a:solidFill>
-                      <a:prstDash val="solid"/>
-                      <a:round/>
-                      <a:headEnd type="none" w="med" len="med"/>
-                      <a:tailEnd type="none" w="med" len="med"/>
-                    </a:lnT>
-                    <a:lnB w="12700" cap="flat" cmpd="sng" algn="ctr">
-                      <a:solidFill>
-                        <a:srgbClr val="3A3A5E"/>
-                      </a:solidFill>
-                      <a:prstDash val="solid"/>
-                      <a:round/>
-                      <a:headEnd type="none" w="med" len="med"/>
-                      <a:tailEnd type="none" w="med" len="med"/>
-                    </a:lnB>
-                    <a:solidFill>
-                      <a:srgbClr val="00B4D8"/>
-                    </a:solidFill>
-                  </a:tcPr>
-                </a:tc>
-                <a:tc>
-                  <a:txBody>
-                    <a:bodyPr/>
-                    <a:lstStyle/>
-                    <a:p>
-                      <a:pPr indent="0" marL="0">
-                        <a:buNone/>
-                      </a:pPr>
-                      <a:r>
-                        <a:rPr lang="en-US" sz="2000" b="1" dirty="0">
-                          <a:solidFill>
-                            <a:srgbClr val="FFFFFF"/>
-                          </a:solidFill>
-                          <a:latin typeface="Calibri" pitchFamily="34" charset="0"/>
-                          <a:ea typeface="Calibri" pitchFamily="34" charset="-122"/>
-                          <a:cs typeface="Calibri" pitchFamily="34" charset="-120"/>
-                        </a:rPr>
-                        <a:t>Notes</a:t>
-                      </a:r>
-                      <a:endParaRPr lang="en-US" sz="2000" dirty="0">
-                        <a:latin typeface="Calibri" charset="0"/>
-                        <a:ea typeface="Calibri" charset="0"/>
-                        <a:cs typeface="Calibri" charset="0"/>
-                      </a:endParaRPr>
-                    </a:p>
-                  </a:txBody>
-                  <a:tcPr marL="91440" marR="91440" marT="45720" marB="45720">
-                    <a:lnL w="12700" cap="flat" cmpd="sng" algn="ctr">
-                      <a:solidFill>
-                        <a:srgbClr val="3A3A5E"/>
-                      </a:solidFill>
-                      <a:prstDash val="solid"/>
-                      <a:round/>
-                      <a:headEnd type="none" w="med" len="med"/>
-                      <a:tailEnd type="none" w="med" len="med"/>
-                    </a:lnL>
-                    <a:lnR w="12700" cap="flat" cmpd="sng" algn="ctr">
-                      <a:solidFill>
-                        <a:srgbClr val="3A3A5E"/>
-                      </a:solidFill>
-                      <a:prstDash val="solid"/>
-                      <a:round/>
-                      <a:headEnd type="none" w="med" len="med"/>
-                      <a:tailEnd type="none" w="med" len="med"/>
-                    </a:lnR>
-                    <a:lnT w="12700" cap="flat" cmpd="sng" algn="ctr">
-                      <a:solidFill>
-                        <a:srgbClr val="3A3A5E"/>
-                      </a:solidFill>
-                      <a:prstDash val="solid"/>
-                      <a:round/>
-                      <a:headEnd type="none" w="med" len="med"/>
-                      <a:tailEnd type="none" w="med" len="med"/>
-                    </a:lnT>
-                    <a:lnB w="12700" cap="flat" cmpd="sng" algn="ctr">
-                      <a:solidFill>
-                        <a:srgbClr val="3A3A5E"/>
-                      </a:solidFill>
-                      <a:prstDash val="solid"/>
-                      <a:round/>
-                      <a:headEnd type="none" w="med" len="med"/>
-                      <a:tailEnd type="none" w="med" len="med"/>
-                    </a:lnB>
-                    <a:solidFill>
-                      <a:srgbClr val="00B4D8"/>
-                    </a:solidFill>
-                  </a:tcPr>
-                </a:tc>
-              </a:tr>
-              <a:tr h="640080">
-                <a:tc>
-                  <a:txBody>
-                    <a:bodyPr/>
-                    <a:lstStyle/>
-                    <a:p>
-                      <a:pPr indent="0" marL="0">
-                        <a:buNone/>
-                      </a:pPr>
-                      <a:r>
-                        <a:rPr lang="en-US" sz="2000" dirty="0">
-                          <a:solidFill>
-                            <a:srgbClr val="E0E4E8"/>
-                          </a:solidFill>
-                          <a:latin typeface="Calibri" pitchFamily="34" charset="0"/>
-                          <a:ea typeface="Calibri" pitchFamily="34" charset="-122"/>
-                          <a:cs typeface="Calibri" pitchFamily="34" charset="-120"/>
-                        </a:rPr>
-                        <a:t>General</a:t>
-                      </a:r>
-                      <a:endParaRPr lang="en-US" sz="2000" dirty="0">
-                        <a:latin typeface="Calibri" charset="0"/>
-                        <a:ea typeface="Calibri" charset="0"/>
-                        <a:cs typeface="Calibri" charset="0"/>
-                      </a:endParaRPr>
-                    </a:p>
-                  </a:txBody>
-                  <a:tcPr marL="91440" marR="91440" marT="45720" marB="45720">
-                    <a:lnL w="12700" cap="flat" cmpd="sng" algn="ctr">
-                      <a:solidFill>
-                        <a:srgbClr val="3A3A5E"/>
-                      </a:solidFill>
-                      <a:prstDash val="solid"/>
-                      <a:round/>
-                      <a:headEnd type="none" w="med" len="med"/>
-                      <a:tailEnd type="none" w="med" len="med"/>
-                    </a:lnL>
-                    <a:lnR w="12700" cap="flat" cmpd="sng" algn="ctr">
-                      <a:solidFill>
-                        <a:srgbClr val="3A3A5E"/>
-                      </a:solidFill>
-                      <a:prstDash val="solid"/>
-                      <a:round/>
-                      <a:headEnd type="none" w="med" len="med"/>
-                      <a:tailEnd type="none" w="med" len="med"/>
-                    </a:lnR>
-                    <a:lnT w="12700" cap="flat" cmpd="sng" algn="ctr">
-                      <a:solidFill>
-                        <a:srgbClr val="3A3A5E"/>
-                      </a:solidFill>
-                      <a:prstDash val="solid"/>
-                      <a:round/>
-                      <a:headEnd type="none" w="med" len="med"/>
-                      <a:tailEnd type="none" w="med" len="med"/>
-                    </a:lnT>
-                    <a:lnB w="12700" cap="flat" cmpd="sng" algn="ctr">
-                      <a:solidFill>
-                        <a:srgbClr val="3A3A5E"/>
-                      </a:solidFill>
-                      <a:prstDash val="solid"/>
-                      <a:round/>
-                      <a:headEnd type="none" w="med" len="med"/>
-                      <a:tailEnd type="none" w="med" len="med"/>
-                    </a:lnB>
-                  </a:tcPr>
-                </a:tc>
-                <a:tc>
-                  <a:txBody>
-                    <a:bodyPr/>
-                    <a:lstStyle/>
-                    <a:p>
-                      <a:pPr indent="0" marL="0">
-                        <a:buNone/>
-                      </a:pPr>
-                      <a:r>
-                        <a:rPr lang="en-US" sz="2000" dirty="0">
-                          <a:solidFill>
-                            <a:srgbClr val="E0E4E8"/>
-                          </a:solidFill>
-                          <a:latin typeface="Calibri" pitchFamily="34" charset="0"/>
-                          <a:ea typeface="Calibri" pitchFamily="34" charset="-122"/>
-                          <a:cs typeface="Calibri" pitchFamily="34" charset="-120"/>
-                        </a:rPr>
-                        <a:t>ChatGPT, Claude, Gemini</a:t>
-                      </a:r>
-                      <a:endParaRPr lang="en-US" sz="2000" dirty="0">
-                        <a:latin typeface="Calibri" charset="0"/>
-                        <a:ea typeface="Calibri" charset="0"/>
-                        <a:cs typeface="Calibri" charset="0"/>
-                      </a:endParaRPr>
-                    </a:p>
-                  </a:txBody>
-                  <a:tcPr marL="91440" marR="91440" marT="45720" marB="45720">
-                    <a:lnL w="12700" cap="flat" cmpd="sng" algn="ctr">
-                      <a:solidFill>
-                        <a:srgbClr val="3A3A5E"/>
-                      </a:solidFill>
-                      <a:prstDash val="solid"/>
-                      <a:round/>
-                      <a:headEnd type="none" w="med" len="med"/>
-                      <a:tailEnd type="none" w="med" len="med"/>
-                    </a:lnL>
-                    <a:lnR w="12700" cap="flat" cmpd="sng" algn="ctr">
-                      <a:solidFill>
-                        <a:srgbClr val="3A3A5E"/>
-                      </a:solidFill>
-                      <a:prstDash val="solid"/>
-                      <a:round/>
-                      <a:headEnd type="none" w="med" len="med"/>
-                      <a:tailEnd type="none" w="med" len="med"/>
-                    </a:lnR>
-                    <a:lnT w="12700" cap="flat" cmpd="sng" algn="ctr">
-                      <a:solidFill>
-                        <a:srgbClr val="3A3A5E"/>
-                      </a:solidFill>
-                      <a:prstDash val="solid"/>
-                      <a:round/>
-                      <a:headEnd type="none" w="med" len="med"/>
-                      <a:tailEnd type="none" w="med" len="med"/>
-                    </a:lnT>
-                    <a:lnB w="12700" cap="flat" cmpd="sng" algn="ctr">
-                      <a:solidFill>
-                        <a:srgbClr val="3A3A5E"/>
-                      </a:solidFill>
-                      <a:prstDash val="solid"/>
-                      <a:round/>
-                      <a:headEnd type="none" w="med" len="med"/>
-                      <a:tailEnd type="none" w="med" len="med"/>
-                    </a:lnB>
-                  </a:tcPr>
-                </a:tc>
-                <a:tc>
-                  <a:txBody>
-                    <a:bodyPr/>
-                    <a:lstStyle/>
-                    <a:p>
-                      <a:pPr indent="0" marL="0">
-                        <a:buNone/>
-                      </a:pPr>
-                      <a:r>
-                        <a:rPr lang="en-US" sz="2000" dirty="0">
-                          <a:solidFill>
-                            <a:srgbClr val="E0E4E8"/>
-                          </a:solidFill>
-                          <a:latin typeface="Calibri" pitchFamily="34" charset="0"/>
-                          <a:ea typeface="Calibri" pitchFamily="34" charset="-122"/>
-                          <a:cs typeface="Calibri" pitchFamily="34" charset="-120"/>
-                        </a:rPr>
-                        <a:t>Start here</a:t>
-                      </a:r>
-                      <a:endParaRPr lang="en-US" sz="2000" dirty="0">
-                        <a:latin typeface="Calibri" charset="0"/>
-                        <a:ea typeface="Calibri" charset="0"/>
-                        <a:cs typeface="Calibri" charset="0"/>
-                      </a:endParaRPr>
-                    </a:p>
-                  </a:txBody>
-                  <a:tcPr marL="91440" marR="91440" marT="45720" marB="45720">
-                    <a:lnL w="12700" cap="flat" cmpd="sng" algn="ctr">
-                      <a:solidFill>
-                        <a:srgbClr val="3A3A5E"/>
-                      </a:solidFill>
-                      <a:prstDash val="solid"/>
-                      <a:round/>
-                      <a:headEnd type="none" w="med" len="med"/>
-                      <a:tailEnd type="none" w="med" len="med"/>
-                    </a:lnL>
-                    <a:lnR w="12700" cap="flat" cmpd="sng" algn="ctr">
-                      <a:solidFill>
-                        <a:srgbClr val="3A3A5E"/>
-                      </a:solidFill>
-                      <a:prstDash val="solid"/>
-                      <a:round/>
-                      <a:headEnd type="none" w="med" len="med"/>
-                      <a:tailEnd type="none" w="med" len="med"/>
-                    </a:lnR>
-                    <a:lnT w="12700" cap="flat" cmpd="sng" algn="ctr">
-                      <a:solidFill>
-                        <a:srgbClr val="3A3A5E"/>
-                      </a:solidFill>
-                      <a:prstDash val="solid"/>
-                      <a:round/>
-                      <a:headEnd type="none" w="med" len="med"/>
-                      <a:tailEnd type="none" w="med" len="med"/>
-                    </a:lnT>
-                    <a:lnB w="12700" cap="flat" cmpd="sng" algn="ctr">
-                      <a:solidFill>
-                        <a:srgbClr val="3A3A5E"/>
-                      </a:solidFill>
-                      <a:prstDash val="solid"/>
-                      <a:round/>
-                      <a:headEnd type="none" w="med" len="med"/>
-                      <a:tailEnd type="none" w="med" len="med"/>
-                    </a:lnB>
-                  </a:tcPr>
-                </a:tc>
-              </a:tr>
-              <a:tr h="640080">
-                <a:tc>
-                  <a:txBody>
-                    <a:bodyPr/>
-                    <a:lstStyle/>
-                    <a:p>
-                      <a:pPr indent="0" marL="0">
-                        <a:buNone/>
-                      </a:pPr>
-                      <a:r>
-                        <a:rPr lang="en-US" sz="2000" dirty="0">
-                          <a:solidFill>
-                            <a:srgbClr val="E0E4E8"/>
-                          </a:solidFill>
-                          <a:latin typeface="Calibri" pitchFamily="34" charset="0"/>
-                          <a:ea typeface="Calibri" pitchFamily="34" charset="-122"/>
-                          <a:cs typeface="Calibri" pitchFamily="34" charset="-120"/>
-                        </a:rPr>
-                        <a:t>Workflow</a:t>
-                      </a:r>
-                      <a:endParaRPr lang="en-US" sz="2000" dirty="0">
-                        <a:latin typeface="Calibri" charset="0"/>
-                        <a:ea typeface="Calibri" charset="0"/>
-                        <a:cs typeface="Calibri" charset="0"/>
-                      </a:endParaRPr>
-                    </a:p>
-                  </a:txBody>
-                  <a:tcPr marL="91440" marR="91440" marT="45720" marB="45720">
-                    <a:lnL w="12700" cap="flat" cmpd="sng" algn="ctr">
-                      <a:solidFill>
-                        <a:srgbClr val="3A3A5E"/>
-                      </a:solidFill>
-                      <a:prstDash val="solid"/>
-                      <a:round/>
-                      <a:headEnd type="none" w="med" len="med"/>
-                      <a:tailEnd type="none" w="med" len="med"/>
-                    </a:lnL>
-                    <a:lnR w="12700" cap="flat" cmpd="sng" algn="ctr">
-                      <a:solidFill>
-                        <a:srgbClr val="3A3A5E"/>
-                      </a:solidFill>
-                      <a:prstDash val="solid"/>
-                      <a:round/>
-                      <a:headEnd type="none" w="med" len="med"/>
-                      <a:tailEnd type="none" w="med" len="med"/>
-                    </a:lnR>
-                    <a:lnT w="12700" cap="flat" cmpd="sng" algn="ctr">
-                      <a:solidFill>
-                        <a:srgbClr val="3A3A5E"/>
-                      </a:solidFill>
-                      <a:prstDash val="solid"/>
-                      <a:round/>
-                      <a:headEnd type="none" w="med" len="med"/>
-                      <a:tailEnd type="none" w="med" len="med"/>
-                    </a:lnT>
-                    <a:lnB w="12700" cap="flat" cmpd="sng" algn="ctr">
-                      <a:solidFill>
-                        <a:srgbClr val="3A3A5E"/>
-                      </a:solidFill>
-                      <a:prstDash val="solid"/>
-                      <a:round/>
-                      <a:headEnd type="none" w="med" len="med"/>
-                      <a:tailEnd type="none" w="med" len="med"/>
-                    </a:lnB>
-                  </a:tcPr>
-                </a:tc>
-                <a:tc>
-                  <a:txBody>
-                    <a:bodyPr/>
-                    <a:lstStyle/>
-                    <a:p>
-                      <a:pPr indent="0" marL="0">
-                        <a:buNone/>
-                      </a:pPr>
-                      <a:r>
-                        <a:rPr lang="en-US" sz="2000" dirty="0">
-                          <a:solidFill>
-                            <a:srgbClr val="E0E4E8"/>
-                          </a:solidFill>
-                          <a:latin typeface="Calibri" pitchFamily="34" charset="0"/>
-                          <a:ea typeface="Calibri" pitchFamily="34" charset="-122"/>
-                          <a:cs typeface="Calibri" pitchFamily="34" charset="-120"/>
-                        </a:rPr>
-                        <a:t>Copilot, Gemini Workspace</a:t>
-                      </a:r>
-                      <a:endParaRPr lang="en-US" sz="2000" dirty="0">
-                        <a:latin typeface="Calibri" charset="0"/>
-                        <a:ea typeface="Calibri" charset="0"/>
-                        <a:cs typeface="Calibri" charset="0"/>
-                      </a:endParaRPr>
-                    </a:p>
-                  </a:txBody>
-                  <a:tcPr marL="91440" marR="91440" marT="45720" marB="45720">
-                    <a:lnL w="12700" cap="flat" cmpd="sng" algn="ctr">
-                      <a:solidFill>
-                        <a:srgbClr val="3A3A5E"/>
-                      </a:solidFill>
-                      <a:prstDash val="solid"/>
-                      <a:round/>
-                      <a:headEnd type="none" w="med" len="med"/>
-                      <a:tailEnd type="none" w="med" len="med"/>
-                    </a:lnL>
-                    <a:lnR w="12700" cap="flat" cmpd="sng" algn="ctr">
-                      <a:solidFill>
-                        <a:srgbClr val="3A3A5E"/>
-                      </a:solidFill>
-                      <a:prstDash val="solid"/>
-                      <a:round/>
-                      <a:headEnd type="none" w="med" len="med"/>
-                      <a:tailEnd type="none" w="med" len="med"/>
-                    </a:lnR>
-                    <a:lnT w="12700" cap="flat" cmpd="sng" algn="ctr">
-                      <a:solidFill>
-                        <a:srgbClr val="3A3A5E"/>
-                      </a:solidFill>
-                      <a:prstDash val="solid"/>
-                      <a:round/>
-                      <a:headEnd type="none" w="med" len="med"/>
-                      <a:tailEnd type="none" w="med" len="med"/>
-                    </a:lnT>
-                    <a:lnB w="12700" cap="flat" cmpd="sng" algn="ctr">
-                      <a:solidFill>
-                        <a:srgbClr val="3A3A5E"/>
-                      </a:solidFill>
-                      <a:prstDash val="solid"/>
-                      <a:round/>
-                      <a:headEnd type="none" w="med" len="med"/>
-                      <a:tailEnd type="none" w="med" len="med"/>
-                    </a:lnB>
-                  </a:tcPr>
-                </a:tc>
-                <a:tc>
-                  <a:txBody>
-                    <a:bodyPr/>
-                    <a:lstStyle/>
-                    <a:p>
-                      <a:pPr indent="0" marL="0">
-                        <a:buNone/>
-                      </a:pPr>
-                      <a:r>
-                        <a:rPr lang="en-US" sz="2000" dirty="0">
-                          <a:solidFill>
-                            <a:srgbClr val="E0E4E8"/>
-                          </a:solidFill>
-                          <a:latin typeface="Calibri" pitchFamily="34" charset="0"/>
-                          <a:ea typeface="Calibri" pitchFamily="34" charset="-122"/>
-                          <a:cs typeface="Calibri" pitchFamily="34" charset="-120"/>
-                        </a:rPr>
-                        <a:t>In your tools</a:t>
-                      </a:r>
-                      <a:endParaRPr lang="en-US" sz="2000" dirty="0">
-                        <a:latin typeface="Calibri" charset="0"/>
-                        <a:ea typeface="Calibri" charset="0"/>
-                        <a:cs typeface="Calibri" charset="0"/>
-                      </a:endParaRPr>
-                    </a:p>
-                  </a:txBody>
-                  <a:tcPr marL="91440" marR="91440" marT="45720" marB="45720">
-                    <a:lnL w="12700" cap="flat" cmpd="sng" algn="ctr">
-                      <a:solidFill>
-                        <a:srgbClr val="3A3A5E"/>
-                      </a:solidFill>
-                      <a:prstDash val="solid"/>
-                      <a:round/>
-                      <a:headEnd type="none" w="med" len="med"/>
-                      <a:tailEnd type="none" w="med" len="med"/>
-                    </a:lnL>
-                    <a:lnR w="12700" cap="flat" cmpd="sng" algn="ctr">
-                      <a:solidFill>
-                        <a:srgbClr val="3A3A5E"/>
-                      </a:solidFill>
-                      <a:prstDash val="solid"/>
-                      <a:round/>
-                      <a:headEnd type="none" w="med" len="med"/>
-                      <a:tailEnd type="none" w="med" len="med"/>
-                    </a:lnR>
-                    <a:lnT w="12700" cap="flat" cmpd="sng" algn="ctr">
-                      <a:solidFill>
-                        <a:srgbClr val="3A3A5E"/>
-                      </a:solidFill>
-                      <a:prstDash val="solid"/>
-                      <a:round/>
-                      <a:headEnd type="none" w="med" len="med"/>
-                      <a:tailEnd type="none" w="med" len="med"/>
-                    </a:lnT>
-                    <a:lnB w="12700" cap="flat" cmpd="sng" algn="ctr">
-                      <a:solidFill>
-                        <a:srgbClr val="3A3A5E"/>
-                      </a:solidFill>
-                      <a:prstDash val="solid"/>
-                      <a:round/>
-                      <a:headEnd type="none" w="med" len="med"/>
-                      <a:tailEnd type="none" w="med" len="med"/>
-                    </a:lnB>
-                  </a:tcPr>
-                </a:tc>
-              </a:tr>
-              <a:tr h="640080">
-                <a:tc>
-                  <a:txBody>
-                    <a:bodyPr/>
-                    <a:lstStyle/>
-                    <a:p>
-                      <a:pPr indent="0" marL="0">
-                        <a:buNone/>
-                      </a:pPr>
-                      <a:r>
-                        <a:rPr lang="en-US" sz="2000" dirty="0">
-                          <a:solidFill>
-                            <a:srgbClr val="E0E4E8"/>
-                          </a:solidFill>
-                          <a:latin typeface="Calibri" pitchFamily="34" charset="0"/>
-                          <a:ea typeface="Calibri" pitchFamily="34" charset="-122"/>
-                          <a:cs typeface="Calibri" pitchFamily="34" charset="-120"/>
-                        </a:rPr>
-                        <a:t>Dev</a:t>
-                      </a:r>
-                      <a:endParaRPr lang="en-US" sz="2000" dirty="0">
-                        <a:latin typeface="Calibri" charset="0"/>
-                        <a:ea typeface="Calibri" charset="0"/>
-                        <a:cs typeface="Calibri" charset="0"/>
-                      </a:endParaRPr>
-                    </a:p>
-                  </a:txBody>
-                  <a:tcPr marL="91440" marR="91440" marT="45720" marB="45720">
-                    <a:lnL w="12700" cap="flat" cmpd="sng" algn="ctr">
-                      <a:solidFill>
-                        <a:srgbClr val="3A3A5E"/>
-                      </a:solidFill>
-                      <a:prstDash val="solid"/>
-                      <a:round/>
-                      <a:headEnd type="none" w="med" len="med"/>
-                      <a:tailEnd type="none" w="med" len="med"/>
-                    </a:lnL>
-                    <a:lnR w="12700" cap="flat" cmpd="sng" algn="ctr">
-                      <a:solidFill>
-                        <a:srgbClr val="3A3A5E"/>
-                      </a:solidFill>
-                      <a:prstDash val="solid"/>
-                      <a:round/>
-                      <a:headEnd type="none" w="med" len="med"/>
-                      <a:tailEnd type="none" w="med" len="med"/>
-                    </a:lnR>
-                    <a:lnT w="12700" cap="flat" cmpd="sng" algn="ctr">
-                      <a:solidFill>
-                        <a:srgbClr val="3A3A5E"/>
-                      </a:solidFill>
-                      <a:prstDash val="solid"/>
-                      <a:round/>
-                      <a:headEnd type="none" w="med" len="med"/>
-                      <a:tailEnd type="none" w="med" len="med"/>
-                    </a:lnT>
-                    <a:lnB w="12700" cap="flat" cmpd="sng" algn="ctr">
-                      <a:solidFill>
-                        <a:srgbClr val="3A3A5E"/>
-                      </a:solidFill>
-                      <a:prstDash val="solid"/>
-                      <a:round/>
-                      <a:headEnd type="none" w="med" len="med"/>
-                      <a:tailEnd type="none" w="med" len="med"/>
-                    </a:lnB>
-                  </a:tcPr>
-                </a:tc>
-                <a:tc>
-                  <a:txBody>
-                    <a:bodyPr/>
-                    <a:lstStyle/>
-                    <a:p>
-                      <a:pPr indent="0" marL="0">
-                        <a:buNone/>
-                      </a:pPr>
-                      <a:r>
-                        <a:rPr lang="en-US" sz="2000" dirty="0">
-                          <a:solidFill>
-                            <a:srgbClr val="E0E4E8"/>
-                          </a:solidFill>
-                          <a:latin typeface="Calibri" pitchFamily="34" charset="0"/>
-                          <a:ea typeface="Calibri" pitchFamily="34" charset="-122"/>
-                          <a:cs typeface="Calibri" pitchFamily="34" charset="-120"/>
-                        </a:rPr>
-                        <a:t>Copilot, Cursor, Claude Code</a:t>
-                      </a:r>
-                      <a:endParaRPr lang="en-US" sz="2000" dirty="0">
-                        <a:latin typeface="Calibri" charset="0"/>
-                        <a:ea typeface="Calibri" charset="0"/>
-                        <a:cs typeface="Calibri" charset="0"/>
-                      </a:endParaRPr>
-                    </a:p>
-                  </a:txBody>
-                  <a:tcPr marL="91440" marR="91440" marT="45720" marB="45720">
-                    <a:lnL w="12700" cap="flat" cmpd="sng" algn="ctr">
-                      <a:solidFill>
-                        <a:srgbClr val="3A3A5E"/>
-                      </a:solidFill>
-                      <a:prstDash val="solid"/>
-                      <a:round/>
-                      <a:headEnd type="none" w="med" len="med"/>
-                      <a:tailEnd type="none" w="med" len="med"/>
-                    </a:lnL>
-                    <a:lnR w="12700" cap="flat" cmpd="sng" algn="ctr">
-                      <a:solidFill>
-                        <a:srgbClr val="3A3A5E"/>
-                      </a:solidFill>
-                      <a:prstDash val="solid"/>
-                      <a:round/>
-                      <a:headEnd type="none" w="med" len="med"/>
-                      <a:tailEnd type="none" w="med" len="med"/>
-                    </a:lnR>
-                    <a:lnT w="12700" cap="flat" cmpd="sng" algn="ctr">
-                      <a:solidFill>
-                        <a:srgbClr val="3A3A5E"/>
-                      </a:solidFill>
-                      <a:prstDash val="solid"/>
-                      <a:round/>
-                      <a:headEnd type="none" w="med" len="med"/>
-                      <a:tailEnd type="none" w="med" len="med"/>
-                    </a:lnT>
-                    <a:lnB w="12700" cap="flat" cmpd="sng" algn="ctr">
-                      <a:solidFill>
-                        <a:srgbClr val="3A3A5E"/>
-                      </a:solidFill>
-                      <a:prstDash val="solid"/>
-                      <a:round/>
-                      <a:headEnd type="none" w="med" len="med"/>
-                      <a:tailEnd type="none" w="med" len="med"/>
-                    </a:lnB>
-                  </a:tcPr>
-                </a:tc>
-                <a:tc>
-                  <a:txBody>
-                    <a:bodyPr/>
-                    <a:lstStyle/>
-                    <a:p>
-                      <a:pPr indent="0" marL="0">
-                        <a:buNone/>
-                      </a:pPr>
-                      <a:r>
-                        <a:rPr lang="en-US" sz="2000" dirty="0">
-                          <a:solidFill>
-                            <a:srgbClr val="E0E4E8"/>
-                          </a:solidFill>
-                          <a:latin typeface="Calibri" pitchFamily="34" charset="0"/>
-                          <a:ea typeface="Calibri" pitchFamily="34" charset="-122"/>
-                          <a:cs typeface="Calibri" pitchFamily="34" charset="-120"/>
-                        </a:rPr>
-                        <a:t>AI-first coding</a:t>
-                      </a:r>
-                      <a:endParaRPr lang="en-US" sz="2000" dirty="0">
-                        <a:latin typeface="Calibri" charset="0"/>
-                        <a:ea typeface="Calibri" charset="0"/>
-                        <a:cs typeface="Calibri" charset="0"/>
-                      </a:endParaRPr>
-                    </a:p>
-                  </a:txBody>
-                  <a:tcPr marL="91440" marR="91440" marT="45720" marB="45720">
-                    <a:lnL w="12700" cap="flat" cmpd="sng" algn="ctr">
-                      <a:solidFill>
-                        <a:srgbClr val="3A3A5E"/>
-                      </a:solidFill>
-                      <a:prstDash val="solid"/>
-                      <a:round/>
-                      <a:headEnd type="none" w="med" len="med"/>
-                      <a:tailEnd type="none" w="med" len="med"/>
-                    </a:lnL>
-                    <a:lnR w="12700" cap="flat" cmpd="sng" algn="ctr">
-                      <a:solidFill>
-                        <a:srgbClr val="3A3A5E"/>
-                      </a:solidFill>
-                      <a:prstDash val="solid"/>
-                      <a:round/>
-                      <a:headEnd type="none" w="med" len="med"/>
-                      <a:tailEnd type="none" w="med" len="med"/>
-                    </a:lnR>
-                    <a:lnT w="12700" cap="flat" cmpd="sng" algn="ctr">
-                      <a:solidFill>
-                        <a:srgbClr val="3A3A5E"/>
-                      </a:solidFill>
-                      <a:prstDash val="solid"/>
-                      <a:round/>
-                      <a:headEnd type="none" w="med" len="med"/>
-                      <a:tailEnd type="none" w="med" len="med"/>
-                    </a:lnT>
-                    <a:lnB w="12700" cap="flat" cmpd="sng" algn="ctr">
-                      <a:solidFill>
-                        <a:srgbClr val="3A3A5E"/>
-                      </a:solidFill>
-                      <a:prstDash val="solid"/>
-                      <a:round/>
-                      <a:headEnd type="none" w="med" len="med"/>
-                      <a:tailEnd type="none" w="med" len="med"/>
-                    </a:lnB>
-                  </a:tcPr>
-                </a:tc>
-              </a:tr>
-              <a:tr h="640080">
-                <a:tc>
-                  <a:txBody>
-                    <a:bodyPr/>
-                    <a:lstStyle/>
-                    <a:p>
-                      <a:pPr indent="0" marL="0">
-                        <a:buNone/>
-                      </a:pPr>
-                      <a:r>
-                        <a:rPr lang="en-US" sz="2000" dirty="0">
-                          <a:solidFill>
-                            <a:srgbClr val="E0E4E8"/>
-                          </a:solidFill>
-                          <a:latin typeface="Calibri" pitchFamily="34" charset="0"/>
-                          <a:ea typeface="Calibri" pitchFamily="34" charset="-122"/>
-                          <a:cs typeface="Calibri" pitchFamily="34" charset="-120"/>
-                        </a:rPr>
-                        <a:t>Connections</a:t>
-                      </a:r>
-                      <a:endParaRPr lang="en-US" sz="2000" dirty="0">
-                        <a:latin typeface="Calibri" charset="0"/>
-                        <a:ea typeface="Calibri" charset="0"/>
-                        <a:cs typeface="Calibri" charset="0"/>
-                      </a:endParaRPr>
-                    </a:p>
-                  </a:txBody>
-                  <a:tcPr marL="91440" marR="91440" marT="45720" marB="45720">
-                    <a:lnL w="12700" cap="flat" cmpd="sng" algn="ctr">
-                      <a:solidFill>
-                        <a:srgbClr val="3A3A5E"/>
-                      </a:solidFill>
-                      <a:prstDash val="solid"/>
-                      <a:round/>
-                      <a:headEnd type="none" w="med" len="med"/>
-                      <a:tailEnd type="none" w="med" len="med"/>
-                    </a:lnL>
-                    <a:lnR w="12700" cap="flat" cmpd="sng" algn="ctr">
-                      <a:solidFill>
-                        <a:srgbClr val="3A3A5E"/>
-                      </a:solidFill>
-                      <a:prstDash val="solid"/>
-                      <a:round/>
-                      <a:headEnd type="none" w="med" len="med"/>
-                      <a:tailEnd type="none" w="med" len="med"/>
-                    </a:lnR>
-                    <a:lnT w="12700" cap="flat" cmpd="sng" algn="ctr">
-                      <a:solidFill>
-                        <a:srgbClr val="3A3A5E"/>
-                      </a:solidFill>
-                      <a:prstDash val="solid"/>
-                      <a:round/>
-                      <a:headEnd type="none" w="med" len="med"/>
-                      <a:tailEnd type="none" w="med" len="med"/>
-                    </a:lnT>
-                    <a:lnB w="12700" cap="flat" cmpd="sng" algn="ctr">
-                      <a:solidFill>
-                        <a:srgbClr val="3A3A5E"/>
-                      </a:solidFill>
-                      <a:prstDash val="solid"/>
-                      <a:round/>
-                      <a:headEnd type="none" w="med" len="med"/>
-                      <a:tailEnd type="none" w="med" len="med"/>
-                    </a:lnB>
-                  </a:tcPr>
-                </a:tc>
-                <a:tc>
-                  <a:txBody>
-                    <a:bodyPr/>
-                    <a:lstStyle/>
-                    <a:p>
-                      <a:pPr indent="0" marL="0">
-                        <a:buNone/>
-                      </a:pPr>
-                      <a:r>
-                        <a:rPr lang="en-US" sz="2000" dirty="0">
-                          <a:solidFill>
-                            <a:srgbClr val="E0E4E8"/>
-                          </a:solidFill>
-                          <a:latin typeface="Calibri" pitchFamily="34" charset="0"/>
-                          <a:ea typeface="Calibri" pitchFamily="34" charset="-122"/>
-                          <a:cs typeface="Calibri" pitchFamily="34" charset="-120"/>
-                        </a:rPr>
-                        <a:t>MCP, Zapier AI, custom</a:t>
-                      </a:r>
-                      <a:endParaRPr lang="en-US" sz="2000" dirty="0">
-                        <a:latin typeface="Calibri" charset="0"/>
-                        <a:ea typeface="Calibri" charset="0"/>
-                        <a:cs typeface="Calibri" charset="0"/>
-                      </a:endParaRPr>
-                    </a:p>
-                  </a:txBody>
-                  <a:tcPr marL="91440" marR="91440" marT="45720" marB="45720">
-                    <a:lnL w="12700" cap="flat" cmpd="sng" algn="ctr">
-                      <a:solidFill>
-                        <a:srgbClr val="3A3A5E"/>
-                      </a:solidFill>
-                      <a:prstDash val="solid"/>
-                      <a:round/>
-                      <a:headEnd type="none" w="med" len="med"/>
-                      <a:tailEnd type="none" w="med" len="med"/>
-                    </a:lnL>
-                    <a:lnR w="12700" cap="flat" cmpd="sng" algn="ctr">
-                      <a:solidFill>
-                        <a:srgbClr val="3A3A5E"/>
-                      </a:solidFill>
-                      <a:prstDash val="solid"/>
-                      <a:round/>
-                      <a:headEnd type="none" w="med" len="med"/>
-                      <a:tailEnd type="none" w="med" len="med"/>
-                    </a:lnR>
-                    <a:lnT w="12700" cap="flat" cmpd="sng" algn="ctr">
-                      <a:solidFill>
-                        <a:srgbClr val="3A3A5E"/>
-                      </a:solidFill>
-                      <a:prstDash val="solid"/>
-                      <a:round/>
-                      <a:headEnd type="none" w="med" len="med"/>
-                      <a:tailEnd type="none" w="med" len="med"/>
-                    </a:lnT>
-                    <a:lnB w="12700" cap="flat" cmpd="sng" algn="ctr">
-                      <a:solidFill>
-                        <a:srgbClr val="3A3A5E"/>
-                      </a:solidFill>
-                      <a:prstDash val="solid"/>
-                      <a:round/>
-                      <a:headEnd type="none" w="med" len="med"/>
-                      <a:tailEnd type="none" w="med" len="med"/>
-                    </a:lnB>
-                  </a:tcPr>
-                </a:tc>
-                <a:tc>
-                  <a:txBody>
-                    <a:bodyPr/>
-                    <a:lstStyle/>
-                    <a:p>
-                      <a:pPr indent="0" marL="0">
-                        <a:buNone/>
-                      </a:pPr>
-                      <a:r>
-                        <a:rPr lang="en-US" sz="2000" dirty="0">
-                          <a:solidFill>
-                            <a:srgbClr val="E0E4E8"/>
-                          </a:solidFill>
-                          <a:latin typeface="Calibri" pitchFamily="34" charset="0"/>
-                          <a:ea typeface="Calibri" pitchFamily="34" charset="-122"/>
-                          <a:cs typeface="Calibri" pitchFamily="34" charset="-120"/>
-                        </a:rPr>
-                        <a:t>Level 4–5</a:t>
-                      </a:r>
-                      <a:endParaRPr lang="en-US" sz="2000" dirty="0">
-                        <a:latin typeface="Calibri" charset="0"/>
-                        <a:ea typeface="Calibri" charset="0"/>
-                        <a:cs typeface="Calibri" charset="0"/>
-                      </a:endParaRPr>
-                    </a:p>
-                  </a:txBody>
-                  <a:tcPr marL="91440" marR="91440" marT="45720" marB="45720">
-                    <a:lnL w="12700" cap="flat" cmpd="sng" algn="ctr">
-                      <a:solidFill>
-                        <a:srgbClr val="3A3A5E"/>
-                      </a:solidFill>
-                      <a:prstDash val="solid"/>
-                      <a:round/>
-                      <a:headEnd type="none" w="med" len="med"/>
-                      <a:tailEnd type="none" w="med" len="med"/>
-                    </a:lnL>
-                    <a:lnR w="12700" cap="flat" cmpd="sng" algn="ctr">
-                      <a:solidFill>
-                        <a:srgbClr val="3A3A5E"/>
-                      </a:solidFill>
-                      <a:prstDash val="solid"/>
-                      <a:round/>
-                      <a:headEnd type="none" w="med" len="med"/>
-                      <a:tailEnd type="none" w="med" len="med"/>
-                    </a:lnR>
-                    <a:lnT w="12700" cap="flat" cmpd="sng" algn="ctr">
-                      <a:solidFill>
-                        <a:srgbClr val="3A3A5E"/>
-                      </a:solidFill>
-                      <a:prstDash val="solid"/>
-                      <a:round/>
-                      <a:headEnd type="none" w="med" len="med"/>
-                      <a:tailEnd type="none" w="med" len="med"/>
-                    </a:lnT>
-                    <a:lnB w="12700" cap="flat" cmpd="sng" algn="ctr">
-                      <a:solidFill>
-                        <a:srgbClr val="3A3A5E"/>
-                      </a:solidFill>
-                      <a:prstDash val="solid"/>
-                      <a:round/>
-                      <a:headEnd type="none" w="med" len="med"/>
-                      <a:tailEnd type="none" w="med" len="med"/>
-                    </a:lnB>
-                  </a:tcPr>
-                </a:tc>
-              </a:tr>
-            </a:tbl>
-          </a:graphicData>
-        </a:graphic>
-      </p:graphicFrame>
+              <a:t>Remember the</a:t>
+            </a:r>
+            <a:endParaRPr lang="en-US" sz="4800" dirty="0"/>
+          </a:p>
+          <a:p>
+            <a:pPr algn="ctr" indent="0" marL="0">
+              <a:buNone/>
+            </a:pPr>
+            <a:r>
+              <a:rPr lang="en-US" sz="4800" b="1" dirty="0">
+                <a:solidFill>
+                  <a:srgbClr val="FFFFFF"/>
+                </a:solidFill>
+                <a:latin typeface="Georgia" pitchFamily="34" charset="0"/>
+                <a:ea typeface="Georgia" pitchFamily="34" charset="-122"/>
+                <a:cs typeface="Georgia" pitchFamily="34" charset="-120"/>
+              </a:rPr>
+              <a:t>45-minute conversation?</a:t>
+            </a:r>
+            <a:endParaRPr lang="en-US" sz="4800" dirty="0"/>
+          </a:p>
+        </p:txBody>
+      </p:sp>
     </p:spTree>
   </p:cSld>
   <p:clrMapOvr>
@@ -23149,54 +21605,14 @@
       </p:sp>
       <p:sp>
         <p:nvSpPr>
-          <p:cNvPr id="3" name="Shape 1"/>
-          <p:cNvSpPr/>
-          <p:nvPr/>
-        </p:nvSpPr>
-        <p:spPr>
-          <a:xfrm>
-            <a:off x="457200" y="2377440"/>
-            <a:ext cx="8229600" cy="54864"/>
-          </a:xfrm>
-          <a:prstGeom prst="rect">
-            <a:avLst/>
-          </a:prstGeom>
-          <a:solidFill>
-            <a:srgbClr val="00B4D8"/>
-          </a:solidFill>
-          <a:ln/>
-        </p:spPr>
-      </p:sp>
-      <p:sp>
-        <p:nvSpPr>
-          <p:cNvPr id="4" name="Shape 2"/>
-          <p:cNvSpPr/>
-          <p:nvPr/>
-        </p:nvSpPr>
-        <p:spPr>
-          <a:xfrm>
-            <a:off x="1280160" y="2130552"/>
-            <a:ext cx="548640" cy="548640"/>
-          </a:xfrm>
-          <a:prstGeom prst="ellipse">
-            <a:avLst/>
-          </a:prstGeom>
-          <a:solidFill>
-            <a:srgbClr val="00B4D8"/>
-          </a:solidFill>
-          <a:ln/>
-        </p:spPr>
-      </p:sp>
-      <p:sp>
-        <p:nvSpPr>
-          <p:cNvPr id="5" name="Text 3"/>
-          <p:cNvSpPr/>
-          <p:nvPr/>
-        </p:nvSpPr>
-        <p:spPr>
-          <a:xfrm>
-            <a:off x="640080" y="2926080"/>
-            <a:ext cx="1828800" cy="1097280"/>
+          <p:cNvPr id="3" name="Text 1"/>
+          <p:cNvSpPr/>
+          <p:nvPr/>
+        </p:nvSpPr>
+        <p:spPr>
+          <a:xfrm>
+            <a:off x="914400" y="1097280"/>
+            <a:ext cx="7315200" cy="2560320"/>
           </a:xfrm>
           <a:prstGeom prst="rect">
             <a:avLst/>
@@ -23205,269 +21621,41 @@
           <a:ln/>
         </p:spPr>
         <p:txBody>
-          <a:bodyPr wrap="square" lIns="0" tIns="0" rIns="0" bIns="0" rtlCol="0" anchor="t"/>
+          <a:bodyPr wrap="square" lIns="0" tIns="0" rIns="0" bIns="0" rtlCol="0" anchor="ctr"/>
           <a:lstStyle/>
           <a:p>
             <a:pPr algn="ctr" indent="0" marL="0">
               <a:buNone/>
             </a:pPr>
             <a:r>
-              <a:rPr lang="en-US" sz="2400" dirty="0">
-                <a:solidFill>
-                  <a:srgbClr val="00B4D8"/>
-                </a:solidFill>
-                <a:latin typeface="Calibri" pitchFamily="34" charset="0"/>
-                <a:ea typeface="Calibri" pitchFamily="34" charset="-122"/>
-                <a:cs typeface="Calibri" pitchFamily="34" charset="-120"/>
-              </a:rPr>
-              <a:t>Week 1</a:t>
-            </a:r>
-            <a:endParaRPr lang="en-US" sz="2400" dirty="0"/>
+              <a:rPr lang="en-US" sz="7200" b="1" dirty="0">
+                <a:solidFill>
+                  <a:srgbClr val="FFFFFF"/>
+                </a:solidFill>
+                <a:latin typeface="Georgia" pitchFamily="34" charset="0"/>
+                <a:ea typeface="Georgia" pitchFamily="34" charset="-122"/>
+                <a:cs typeface="Georgia" pitchFamily="34" charset="-120"/>
+              </a:rPr>
+              <a:t>Two minutes.</a:t>
+            </a:r>
+            <a:endParaRPr lang="en-US" sz="7200" dirty="0"/>
           </a:p>
           <a:p>
             <a:pPr algn="ctr" indent="0" marL="0">
               <a:buNone/>
             </a:pPr>
             <a:r>
-              <a:rPr lang="en-US" sz="2400" dirty="0">
-                <a:solidFill>
-                  <a:srgbClr val="00B4D8"/>
-                </a:solidFill>
-                <a:latin typeface="Calibri" pitchFamily="34" charset="0"/>
-                <a:ea typeface="Calibri" pitchFamily="34" charset="-122"/>
-                <a:cs typeface="Calibri" pitchFamily="34" charset="-120"/>
-              </a:rPr>
-              <a:t>Questioner</a:t>
-            </a:r>
-            <a:endParaRPr lang="en-US" sz="2400" dirty="0"/>
-          </a:p>
-        </p:txBody>
-      </p:sp>
-      <p:sp>
-        <p:nvSpPr>
-          <p:cNvPr id="6" name="Shape 4"/>
-          <p:cNvSpPr/>
-          <p:nvPr/>
-        </p:nvSpPr>
-        <p:spPr>
-          <a:xfrm>
-            <a:off x="3291840" y="2130552"/>
-            <a:ext cx="548640" cy="548640"/>
-          </a:xfrm>
-          <a:prstGeom prst="ellipse">
-            <a:avLst/>
-          </a:prstGeom>
-          <a:solidFill>
-            <a:srgbClr val="00B4D8"/>
-          </a:solidFill>
-          <a:ln/>
-        </p:spPr>
-      </p:sp>
-      <p:sp>
-        <p:nvSpPr>
-          <p:cNvPr id="7" name="Text 5"/>
-          <p:cNvSpPr/>
-          <p:nvPr/>
-        </p:nvSpPr>
-        <p:spPr>
-          <a:xfrm>
-            <a:off x="2651760" y="2926080"/>
-            <a:ext cx="1828800" cy="1097280"/>
-          </a:xfrm>
-          <a:prstGeom prst="rect">
-            <a:avLst/>
-          </a:prstGeom>
-          <a:noFill/>
-          <a:ln/>
-        </p:spPr>
-        <p:txBody>
-          <a:bodyPr wrap="square" lIns="0" tIns="0" rIns="0" bIns="0" rtlCol="0" anchor="t"/>
-          <a:lstStyle/>
-          <a:p>
-            <a:pPr algn="ctr" indent="0" marL="0">
-              <a:buNone/>
-            </a:pPr>
-            <a:r>
-              <a:rPr lang="en-US" sz="2400" dirty="0">
-                <a:solidFill>
-                  <a:srgbClr val="00B4D8"/>
-                </a:solidFill>
-                <a:latin typeface="Calibri" pitchFamily="34" charset="0"/>
-                <a:ea typeface="Calibri" pitchFamily="34" charset="-122"/>
-                <a:cs typeface="Calibri" pitchFamily="34" charset="-120"/>
-              </a:rPr>
-              <a:t>Week 2</a:t>
-            </a:r>
-            <a:endParaRPr lang="en-US" sz="2400" dirty="0"/>
-          </a:p>
-          <a:p>
-            <a:pPr algn="ctr" indent="0" marL="0">
-              <a:buNone/>
-            </a:pPr>
-            <a:r>
-              <a:rPr lang="en-US" sz="2400" dirty="0">
-                <a:solidFill>
-                  <a:srgbClr val="00B4D8"/>
-                </a:solidFill>
-                <a:latin typeface="Calibri" pitchFamily="34" charset="0"/>
-                <a:ea typeface="Calibri" pitchFamily="34" charset="-122"/>
-                <a:cs typeface="Calibri" pitchFamily="34" charset="-120"/>
-              </a:rPr>
-              <a:t>Viber</a:t>
-            </a:r>
-            <a:endParaRPr lang="en-US" sz="2400" dirty="0"/>
-          </a:p>
-        </p:txBody>
-      </p:sp>
-      <p:sp>
-        <p:nvSpPr>
-          <p:cNvPr id="8" name="Shape 6"/>
-          <p:cNvSpPr/>
-          <p:nvPr/>
-        </p:nvSpPr>
-        <p:spPr>
-          <a:xfrm>
-            <a:off x="5303520" y="2130552"/>
-            <a:ext cx="548640" cy="548640"/>
-          </a:xfrm>
-          <a:prstGeom prst="ellipse">
-            <a:avLst/>
-          </a:prstGeom>
-          <a:solidFill>
-            <a:srgbClr val="00B4D8"/>
-          </a:solidFill>
-          <a:ln/>
-        </p:spPr>
-      </p:sp>
-      <p:sp>
-        <p:nvSpPr>
-          <p:cNvPr id="9" name="Text 7"/>
-          <p:cNvSpPr/>
-          <p:nvPr/>
-        </p:nvSpPr>
-        <p:spPr>
-          <a:xfrm>
-            <a:off x="4663440" y="2926080"/>
-            <a:ext cx="1828800" cy="1097280"/>
-          </a:xfrm>
-          <a:prstGeom prst="rect">
-            <a:avLst/>
-          </a:prstGeom>
-          <a:noFill/>
-          <a:ln/>
-        </p:spPr>
-        <p:txBody>
-          <a:bodyPr wrap="square" lIns="0" tIns="0" rIns="0" bIns="0" rtlCol="0" anchor="t"/>
-          <a:lstStyle/>
-          <a:p>
-            <a:pPr algn="ctr" indent="0" marL="0">
-              <a:buNone/>
-            </a:pPr>
-            <a:r>
-              <a:rPr lang="en-US" sz="2400" dirty="0">
-                <a:solidFill>
-                  <a:srgbClr val="00B4D8"/>
-                </a:solidFill>
-                <a:latin typeface="Calibri" pitchFamily="34" charset="0"/>
-                <a:ea typeface="Calibri" pitchFamily="34" charset="-122"/>
-                <a:cs typeface="Calibri" pitchFamily="34" charset="-120"/>
-              </a:rPr>
-              <a:t>Week 3</a:t>
-            </a:r>
-            <a:endParaRPr lang="en-US" sz="2400" dirty="0"/>
-          </a:p>
-          <a:p>
-            <a:pPr algn="ctr" indent="0" marL="0">
-              <a:buNone/>
-            </a:pPr>
-            <a:r>
-              <a:rPr lang="en-US" sz="2400" dirty="0">
-                <a:solidFill>
-                  <a:srgbClr val="00B4D8"/>
-                </a:solidFill>
-                <a:latin typeface="Calibri" pitchFamily="34" charset="0"/>
-                <a:ea typeface="Calibri" pitchFamily="34" charset="-122"/>
-                <a:cs typeface="Calibri" pitchFamily="34" charset="-120"/>
-              </a:rPr>
-              <a:t>AI-First</a:t>
-            </a:r>
-            <a:endParaRPr lang="en-US" sz="2400" dirty="0"/>
-          </a:p>
-        </p:txBody>
-      </p:sp>
-      <p:sp>
-        <p:nvSpPr>
-          <p:cNvPr id="10" name="Shape 8"/>
-          <p:cNvSpPr/>
-          <p:nvPr/>
-        </p:nvSpPr>
-        <p:spPr>
-          <a:xfrm>
-            <a:off x="7315200" y="2130552"/>
-            <a:ext cx="548640" cy="548640"/>
-          </a:xfrm>
-          <a:prstGeom prst="ellipse">
-            <a:avLst/>
-          </a:prstGeom>
-          <a:solidFill>
-            <a:srgbClr val="2D936C"/>
-          </a:solidFill>
-          <a:ln/>
-        </p:spPr>
-      </p:sp>
-      <p:sp>
-        <p:nvSpPr>
-          <p:cNvPr id="11" name="Text 9"/>
-          <p:cNvSpPr/>
-          <p:nvPr/>
-        </p:nvSpPr>
-        <p:spPr>
-          <a:xfrm>
-            <a:off x="6675120" y="2926080"/>
-            <a:ext cx="1828800" cy="1097280"/>
-          </a:xfrm>
-          <a:prstGeom prst="rect">
-            <a:avLst/>
-          </a:prstGeom>
-          <a:noFill/>
-          <a:ln/>
-        </p:spPr>
-        <p:txBody>
-          <a:bodyPr wrap="square" lIns="0" tIns="0" rIns="0" bIns="0" rtlCol="0" anchor="t"/>
-          <a:lstStyle/>
-          <a:p>
-            <a:pPr algn="ctr" indent="0" marL="0">
-              <a:buNone/>
-            </a:pPr>
-            <a:r>
-              <a:rPr lang="en-US" sz="2400" dirty="0">
-                <a:solidFill>
-                  <a:srgbClr val="2D936C"/>
-                </a:solidFill>
-                <a:latin typeface="Calibri" pitchFamily="34" charset="0"/>
-                <a:ea typeface="Calibri" pitchFamily="34" charset="-122"/>
-                <a:cs typeface="Calibri" pitchFamily="34" charset="-120"/>
-              </a:rPr>
-              <a:t>Week 4</a:t>
-            </a:r>
-            <a:endParaRPr lang="en-US" sz="2400" dirty="0"/>
-          </a:p>
-          <a:p>
-            <a:pPr algn="ctr" indent="0" marL="0">
-              <a:buNone/>
-            </a:pPr>
-            <a:r>
-              <a:rPr lang="en-US" sz="2400" dirty="0">
-                <a:solidFill>
-                  <a:srgbClr val="2D936C"/>
-                </a:solidFill>
-                <a:latin typeface="Calibri" pitchFamily="34" charset="0"/>
-                <a:ea typeface="Calibri" pitchFamily="34" charset="-122"/>
-                <a:cs typeface="Calibri" pitchFamily="34" charset="-120"/>
-              </a:rPr>
-              <a:t>Orchestrator</a:t>
-            </a:r>
-            <a:endParaRPr lang="en-US" sz="2400" dirty="0"/>
+              <a:rPr lang="en-US" sz="7200" b="1" dirty="0">
+                <a:solidFill>
+                  <a:srgbClr val="FFFFFF"/>
+                </a:solidFill>
+                <a:latin typeface="Georgia" pitchFamily="34" charset="0"/>
+                <a:ea typeface="Georgia" pitchFamily="34" charset="-122"/>
+                <a:cs typeface="Georgia" pitchFamily="34" charset="-120"/>
+              </a:rPr>
+              <a:t>That’s the trick.</a:t>
+            </a:r>
+            <a:endParaRPr lang="en-US" sz="7200" dirty="0"/>
           </a:p>
         </p:txBody>
       </p:sp>
@@ -23533,8 +21721,8 @@
         </p:nvSpPr>
         <p:spPr>
           <a:xfrm>
-            <a:off x="1371600" y="1828800"/>
-            <a:ext cx="6400800" cy="1463040"/>
+            <a:off x="914400" y="1097280"/>
+            <a:ext cx="7315200" cy="2560320"/>
           </a:xfrm>
           <a:prstGeom prst="rect">
             <a:avLst/>
@@ -23550,100 +21738,24 @@
               <a:buNone/>
             </a:pPr>
             <a:r>
-              <a:rPr lang="en-US" sz="2800" i="1" dirty="0">
-                <a:solidFill>
-                  <a:srgbClr val="00B4D8"/>
+              <a:rPr lang="en-US" sz="4400" b="1" dirty="0">
+                <a:solidFill>
+                  <a:srgbClr val="FFFFFF"/>
                 </a:solidFill>
                 <a:latin typeface="Georgia" pitchFamily="34" charset="0"/>
                 <a:ea typeface="Georgia" pitchFamily="34" charset="-122"/>
                 <a:cs typeface="Georgia" pitchFamily="34" charset="-120"/>
               </a:rPr>
-              <a:t>Let's come back to where we started.</a:t>
-            </a:r>
-            <a:endParaRPr lang="en-US" sz="2800" dirty="0"/>
-          </a:p>
-        </p:txBody>
-      </p:sp>
-    </p:spTree>
-  </p:cSld>
-  <p:clrMapOvr>
-    <a:masterClrMapping/>
-  </p:clrMapOvr>
-</p:sld>
-</file>
-
-<file path=ppt/slides/slide69.xml><?xml version="1.0" encoding="utf-8"?>
-<p:sld xmlns:a="http://schemas.openxmlformats.org/drawingml/2006/main" xmlns:r="http://schemas.openxmlformats.org/officeDocument/2006/relationships" xmlns:p="http://schemas.openxmlformats.org/presentationml/2006/main">
-  <p:cSld name="Slide 69">
-    <p:bg>
-      <p:bgPr>
-        <a:solidFill>
-          <a:srgbClr val="0F0F1A"/>
-        </a:solidFill>
-      </p:bgPr>
-    </p:bg>
-    <p:spTree>
-      <p:nvGrpSpPr>
-        <p:cNvPr id="1" name=""/>
-        <p:cNvGrpSpPr/>
-        <p:nvPr/>
-      </p:nvGrpSpPr>
-      <p:grpSpPr>
-        <a:xfrm>
-          <a:off x="0" y="0"/>
-          <a:ext cx="0" cy="0"/>
-          <a:chOff x="0" y="0"/>
-          <a:chExt cx="0" cy="0"/>
-        </a:xfrm>
-      </p:grpSpPr>
-      <p:sp>
-        <p:nvSpPr>
-          <p:cNvPr id="2" name="Shape 0"/>
-          <p:cNvSpPr/>
-          <p:nvPr/>
-        </p:nvSpPr>
-        <p:spPr>
-          <a:xfrm>
-            <a:off x="4572000" y="2286000"/>
-            <a:ext cx="7315200" cy="5486400"/>
-          </a:xfrm>
-          <a:prstGeom prst="ellipse">
-            <a:avLst/>
-          </a:prstGeom>
-          <a:solidFill>
-            <a:srgbClr val="00B4D8">
-              <a:alpha val="4000"/>
-            </a:srgbClr>
-          </a:solidFill>
-          <a:ln/>
-        </p:spPr>
-      </p:sp>
-      <p:sp>
-        <p:nvSpPr>
-          <p:cNvPr id="3" name="Text 1"/>
-          <p:cNvSpPr/>
-          <p:nvPr/>
-        </p:nvSpPr>
-        <p:spPr>
-          <a:xfrm>
-            <a:off x="914400" y="1097280"/>
-            <a:ext cx="7315200" cy="2560320"/>
-          </a:xfrm>
-          <a:prstGeom prst="rect">
-            <a:avLst/>
-          </a:prstGeom>
-          <a:noFill/>
-          <a:ln/>
-        </p:spPr>
-        <p:txBody>
-          <a:bodyPr wrap="square" lIns="0" tIns="0" rIns="0" bIns="0" rtlCol="0" anchor="ctr"/>
-          <a:lstStyle/>
+              <a:t>The secret was never</a:t>
+            </a:r>
+            <a:endParaRPr lang="en-US" sz="4400" dirty="0"/>
+          </a:p>
           <a:p>
             <a:pPr algn="ctr" indent="0" marL="0">
               <a:buNone/>
             </a:pPr>
             <a:r>
-              <a:rPr lang="en-US" sz="4800" b="1" dirty="0">
+              <a:rPr lang="en-US" sz="4400" b="1" dirty="0">
                 <a:solidFill>
                   <a:srgbClr val="FFFFFF"/>
                 </a:solidFill>
@@ -23651,26 +21763,48 @@
                 <a:ea typeface="Georgia" pitchFamily="34" charset="-122"/>
                 <a:cs typeface="Georgia" pitchFamily="34" charset="-120"/>
               </a:rPr>
-              <a:t>Remember the</a:t>
-            </a:r>
-            <a:endParaRPr lang="en-US" sz="4800" dirty="0"/>
-          </a:p>
+              <a:t>in the AI.</a:t>
+            </a:r>
+            <a:endParaRPr lang="en-US" sz="4400" dirty="0"/>
+          </a:p>
+        </p:txBody>
+      </p:sp>
+      <p:sp>
+        <p:nvSpPr>
+          <p:cNvPr id="4" name="Text 2"/>
+          <p:cNvSpPr/>
+          <p:nvPr/>
+        </p:nvSpPr>
+        <p:spPr>
+          <a:xfrm>
+            <a:off x="1371600" y="3657600"/>
+            <a:ext cx="6400800" cy="731520"/>
+          </a:xfrm>
+          <a:prstGeom prst="rect">
+            <a:avLst/>
+          </a:prstGeom>
+          <a:noFill/>
+          <a:ln/>
+        </p:spPr>
+        <p:txBody>
+          <a:bodyPr wrap="square" lIns="0" tIns="0" rIns="0" bIns="0" rtlCol="0" anchor="t"/>
+          <a:lstStyle/>
           <a:p>
             <a:pPr algn="ctr" indent="0" marL="0">
               <a:buNone/>
             </a:pPr>
             <a:r>
-              <a:rPr lang="en-US" sz="4800" b="1" dirty="0">
-                <a:solidFill>
-                  <a:srgbClr val="FFFFFF"/>
-                </a:solidFill>
-                <a:latin typeface="Georgia" pitchFamily="34" charset="0"/>
-                <a:ea typeface="Georgia" pitchFamily="34" charset="-122"/>
-                <a:cs typeface="Georgia" pitchFamily="34" charset="-120"/>
-              </a:rPr>
-              <a:t>45-minute conversation?</a:t>
-            </a:r>
-            <a:endParaRPr lang="en-US" sz="4800" dirty="0"/>
+              <a:rPr lang="en-US" sz="2800" dirty="0">
+                <a:solidFill>
+                  <a:srgbClr val="94A3B8"/>
+                </a:solidFill>
+                <a:latin typeface="Calibri" pitchFamily="34" charset="0"/>
+                <a:ea typeface="Calibri" pitchFamily="34" charset="-122"/>
+                <a:cs typeface="Calibri" pitchFamily="34" charset="-120"/>
+              </a:rPr>
+              <a:t>Now go try it — one task, this week.</a:t>
+            </a:r>
+            <a:endParaRPr lang="en-US" sz="2800" dirty="0"/>
           </a:p>
         </p:txBody>
       </p:sp>
@@ -23806,70 +21940,16 @@
           </a:p>
         </p:txBody>
       </p:sp>
-    </p:spTree>
-  </p:cSld>
-  <p:clrMapOvr>
-    <a:masterClrMapping/>
-  </p:clrMapOvr>
-</p:sld>
-</file>
-
-<file path=ppt/slides/slide70.xml><?xml version="1.0" encoding="utf-8"?>
-<p:sld xmlns:a="http://schemas.openxmlformats.org/drawingml/2006/main" xmlns:r="http://schemas.openxmlformats.org/officeDocument/2006/relationships" xmlns:p="http://schemas.openxmlformats.org/presentationml/2006/main">
-  <p:cSld name="Slide 70">
-    <p:bg>
-      <p:bgPr>
-        <a:solidFill>
-          <a:srgbClr val="0F0F1A"/>
-        </a:solidFill>
-      </p:bgPr>
-    </p:bg>
-    <p:spTree>
-      <p:nvGrpSpPr>
-        <p:cNvPr id="1" name=""/>
-        <p:cNvGrpSpPr/>
-        <p:nvPr/>
-      </p:nvGrpSpPr>
-      <p:grpSpPr>
-        <a:xfrm>
-          <a:off x="0" y="0"/>
-          <a:ext cx="0" cy="0"/>
-          <a:chOff x="0" y="0"/>
-          <a:chExt cx="0" cy="0"/>
-        </a:xfrm>
-      </p:grpSpPr>
-      <p:sp>
-        <p:nvSpPr>
-          <p:cNvPr id="2" name="Shape 0"/>
-          <p:cNvSpPr/>
-          <p:nvPr/>
-        </p:nvSpPr>
-        <p:spPr>
-          <a:xfrm>
-            <a:off x="4572000" y="2286000"/>
-            <a:ext cx="7315200" cy="5486400"/>
-          </a:xfrm>
-          <a:prstGeom prst="ellipse">
-            <a:avLst/>
-          </a:prstGeom>
-          <a:solidFill>
-            <a:srgbClr val="00B4D8">
-              <a:alpha val="4000"/>
-            </a:srgbClr>
-          </a:solidFill>
-          <a:ln/>
-        </p:spPr>
-      </p:sp>
-      <p:sp>
-        <p:nvSpPr>
-          <p:cNvPr id="3" name="Text 1"/>
-          <p:cNvSpPr/>
-          <p:nvPr/>
-        </p:nvSpPr>
-        <p:spPr>
-          <a:xfrm>
-            <a:off x="914400" y="1097280"/>
-            <a:ext cx="7315200" cy="2560320"/>
+      <p:sp>
+        <p:nvSpPr>
+          <p:cNvPr id="5" name="Text 3"/>
+          <p:cNvSpPr/>
+          <p:nvPr/>
+        </p:nvSpPr>
+        <p:spPr>
+          <a:xfrm>
+            <a:off x="457200" y="4572000"/>
+            <a:ext cx="8229600" cy="365760"/>
           </a:xfrm>
           <a:prstGeom prst="rect">
             <a:avLst/>
@@ -23878,180 +21958,14 @@
           <a:ln/>
         </p:spPr>
         <p:txBody>
-          <a:bodyPr wrap="square" lIns="0" tIns="0" rIns="0" bIns="0" rtlCol="0" anchor="ctr"/>
-          <a:lstStyle/>
-          <a:p>
-            <a:pPr algn="ctr" indent="0" marL="0">
-              <a:buNone/>
-            </a:pPr>
-            <a:r>
-              <a:rPr lang="en-US" sz="7200" b="1" dirty="0">
-                <a:solidFill>
-                  <a:srgbClr val="FFFFFF"/>
-                </a:solidFill>
-                <a:latin typeface="Georgia" pitchFamily="34" charset="0"/>
-                <a:ea typeface="Georgia" pitchFamily="34" charset="-122"/>
-                <a:cs typeface="Georgia" pitchFamily="34" charset="-120"/>
-              </a:rPr>
-              <a:t>Two minutes.</a:t>
-            </a:r>
-            <a:endParaRPr lang="en-US" sz="7200" dirty="0"/>
-          </a:p>
-          <a:p>
-            <a:pPr algn="ctr" indent="0" marL="0">
-              <a:buNone/>
-            </a:pPr>
-            <a:r>
-              <a:rPr lang="en-US" sz="7200" b="1" dirty="0">
-                <a:solidFill>
-                  <a:srgbClr val="FFFFFF"/>
-                </a:solidFill>
-                <a:latin typeface="Georgia" pitchFamily="34" charset="0"/>
-                <a:ea typeface="Georgia" pitchFamily="34" charset="-122"/>
-                <a:cs typeface="Georgia" pitchFamily="34" charset="-120"/>
-              </a:rPr>
-              <a:t>That’s the trick.</a:t>
-            </a:r>
-            <a:endParaRPr lang="en-US" sz="7200" dirty="0"/>
-          </a:p>
-        </p:txBody>
-      </p:sp>
-    </p:spTree>
-  </p:cSld>
-  <p:clrMapOvr>
-    <a:masterClrMapping/>
-  </p:clrMapOvr>
-</p:sld>
-</file>
-
-<file path=ppt/slides/slide71.xml><?xml version="1.0" encoding="utf-8"?>
-<p:sld xmlns:a="http://schemas.openxmlformats.org/drawingml/2006/main" xmlns:r="http://schemas.openxmlformats.org/officeDocument/2006/relationships" xmlns:p="http://schemas.openxmlformats.org/presentationml/2006/main">
-  <p:cSld name="Slide 71">
-    <p:bg>
-      <p:bgPr>
-        <a:solidFill>
-          <a:srgbClr val="0F0F1A"/>
-        </a:solidFill>
-      </p:bgPr>
-    </p:bg>
-    <p:spTree>
-      <p:nvGrpSpPr>
-        <p:cNvPr id="1" name=""/>
-        <p:cNvGrpSpPr/>
-        <p:nvPr/>
-      </p:nvGrpSpPr>
-      <p:grpSpPr>
-        <a:xfrm>
-          <a:off x="0" y="0"/>
-          <a:ext cx="0" cy="0"/>
-          <a:chOff x="0" y="0"/>
-          <a:chExt cx="0" cy="0"/>
-        </a:xfrm>
-      </p:grpSpPr>
-      <p:sp>
-        <p:nvSpPr>
-          <p:cNvPr id="2" name="Shape 0"/>
-          <p:cNvSpPr/>
-          <p:nvPr/>
-        </p:nvSpPr>
-        <p:spPr>
-          <a:xfrm>
-            <a:off x="4572000" y="2286000"/>
-            <a:ext cx="7315200" cy="5486400"/>
-          </a:xfrm>
-          <a:prstGeom prst="ellipse">
-            <a:avLst/>
-          </a:prstGeom>
-          <a:solidFill>
-            <a:srgbClr val="00B4D8">
-              <a:alpha val="4000"/>
-            </a:srgbClr>
-          </a:solidFill>
-          <a:ln/>
-        </p:spPr>
-      </p:sp>
-      <p:sp>
-        <p:nvSpPr>
-          <p:cNvPr id="3" name="Text 1"/>
-          <p:cNvSpPr/>
-          <p:nvPr/>
-        </p:nvSpPr>
-        <p:spPr>
-          <a:xfrm>
-            <a:off x="914400" y="1097280"/>
-            <a:ext cx="7315200" cy="2560320"/>
-          </a:xfrm>
-          <a:prstGeom prst="rect">
-            <a:avLst/>
-          </a:prstGeom>
-          <a:noFill/>
-          <a:ln/>
-        </p:spPr>
-        <p:txBody>
-          <a:bodyPr wrap="square" lIns="0" tIns="0" rIns="0" bIns="0" rtlCol="0" anchor="ctr"/>
-          <a:lstStyle/>
-          <a:p>
-            <a:pPr algn="ctr" indent="0" marL="0">
-              <a:buNone/>
-            </a:pPr>
-            <a:r>
-              <a:rPr lang="en-US" sz="4400" b="1" dirty="0">
-                <a:solidFill>
-                  <a:srgbClr val="FFFFFF"/>
-                </a:solidFill>
-                <a:latin typeface="Georgia" pitchFamily="34" charset="0"/>
-                <a:ea typeface="Georgia" pitchFamily="34" charset="-122"/>
-                <a:cs typeface="Georgia" pitchFamily="34" charset="-120"/>
-              </a:rPr>
-              <a:t>The secret was never</a:t>
-            </a:r>
-            <a:endParaRPr lang="en-US" sz="4400" dirty="0"/>
-          </a:p>
-          <a:p>
-            <a:pPr algn="ctr" indent="0" marL="0">
-              <a:buNone/>
-            </a:pPr>
-            <a:r>
-              <a:rPr lang="en-US" sz="4400" b="1" dirty="0">
-                <a:solidFill>
-                  <a:srgbClr val="FFFFFF"/>
-                </a:solidFill>
-                <a:latin typeface="Georgia" pitchFamily="34" charset="0"/>
-                <a:ea typeface="Georgia" pitchFamily="34" charset="-122"/>
-                <a:cs typeface="Georgia" pitchFamily="34" charset="-120"/>
-              </a:rPr>
-              <a:t>in the AI.</a:t>
-            </a:r>
-            <a:endParaRPr lang="en-US" sz="4400" dirty="0"/>
-          </a:p>
-        </p:txBody>
-      </p:sp>
-      <p:sp>
-        <p:nvSpPr>
-          <p:cNvPr id="4" name="Text 2"/>
-          <p:cNvSpPr/>
-          <p:nvPr/>
-        </p:nvSpPr>
-        <p:spPr>
-          <a:xfrm>
-            <a:off x="1371600" y="3657600"/>
-            <a:ext cx="6400800" cy="731520"/>
-          </a:xfrm>
-          <a:prstGeom prst="rect">
-            <a:avLst/>
-          </a:prstGeom>
-          <a:noFill/>
-          <a:ln/>
-        </p:spPr>
-        <p:txBody>
-          <a:bodyPr wrap="square" lIns="0" tIns="0" rIns="0" bIns="0" rtlCol="0" anchor="t"/>
-          <a:lstStyle/>
-          <a:p>
-            <a:pPr algn="ctr" indent="0" marL="0">
-              <a:buNone/>
-            </a:pPr>
-            <a:r>
-              <a:rPr lang="en-US" sz="2800" dirty="0">
+          <a:bodyPr wrap="square" lIns="0" tIns="0" rIns="0" bIns="0" rtlCol="0" anchor="b"/>
+          <a:lstStyle/>
+          <a:p>
+            <a:pPr algn="r" indent="0" marL="0">
+              <a:buNone/>
+            </a:pPr>
+            <a:r>
+              <a:rPr lang="en-US" sz="1100" dirty="0">
                 <a:solidFill>
                   <a:srgbClr val="94A3B8"/>
                 </a:solidFill>
@@ -24059,9 +21973,9 @@
                 <a:ea typeface="Calibri" pitchFamily="34" charset="-122"/>
                 <a:cs typeface="Calibri" pitchFamily="34" charset="-120"/>
               </a:rPr>
-              <a:t>Now go try it — one task, this week.</a:t>
-            </a:r>
-            <a:endParaRPr lang="en-US" sz="2800" dirty="0"/>
+              <a:t>Reuters</a:t>
+            </a:r>
+            <a:endParaRPr lang="en-US" sz="1100" dirty="0"/>
           </a:p>
         </p:txBody>
       </p:sp>
@@ -24663,6 +22577,45 @@
               <a:t>in annual value. Only 31% in full production.</a:t>
             </a:r>
             <a:endParaRPr lang="en-US" sz="2800" dirty="0"/>
+          </a:p>
+        </p:txBody>
+      </p:sp>
+      <p:sp>
+        <p:nvSpPr>
+          <p:cNvPr id="5" name="Text 3"/>
+          <p:cNvSpPr/>
+          <p:nvPr/>
+        </p:nvSpPr>
+        <p:spPr>
+          <a:xfrm>
+            <a:off x="457200" y="4572000"/>
+            <a:ext cx="8229600" cy="365760"/>
+          </a:xfrm>
+          <a:prstGeom prst="rect">
+            <a:avLst/>
+          </a:prstGeom>
+          <a:noFill/>
+          <a:ln/>
+        </p:spPr>
+        <p:txBody>
+          <a:bodyPr wrap="square" lIns="0" tIns="0" rIns="0" bIns="0" rtlCol="0" anchor="b"/>
+          <a:lstStyle/>
+          <a:p>
+            <a:pPr algn="r" indent="0" marL="0">
+              <a:buNone/>
+            </a:pPr>
+            <a:r>
+              <a:rPr lang="en-US" sz="1100" dirty="0">
+                <a:solidFill>
+                  <a:srgbClr val="94A3B8"/>
+                </a:solidFill>
+                <a:latin typeface="Calibri" pitchFamily="34" charset="0"/>
+                <a:ea typeface="Calibri" pitchFamily="34" charset="-122"/>
+                <a:cs typeface="Calibri" pitchFamily="34" charset="-120"/>
+              </a:rPr>
+              <a:t>McKinsey Global Institute, ServiceNow</a:t>
+            </a:r>
+            <a:endParaRPr lang="en-US" sz="1100" dirty="0"/>
           </a:p>
         </p:txBody>
       </p:sp>

</xml_diff>